<commit_message>
Atualização de aula 01/02/03
</commit_message>
<xml_diff>
--- a/01 Classes/Aula 01 02 03 Programação Python.pptx
+++ b/01 Classes/Aula 01 02 03 Programação Python.pptx
@@ -5,7 +5,7 @@
     <p:sldMasterId id="2147483648" r:id="rId1"/>
   </p:sldMasterIdLst>
   <p:notesMasterIdLst>
-    <p:notesMasterId r:id="rId21"/>
+    <p:notesMasterId r:id="rId22"/>
   </p:notesMasterIdLst>
   <p:sldIdLst>
     <p:sldId id="256" r:id="rId2"/>
@@ -20,13 +20,14 @@
     <p:sldId id="336" r:id="rId11"/>
     <p:sldId id="343" r:id="rId12"/>
     <p:sldId id="344" r:id="rId13"/>
-    <p:sldId id="345" r:id="rId14"/>
-    <p:sldId id="346" r:id="rId15"/>
-    <p:sldId id="333" r:id="rId16"/>
-    <p:sldId id="323" r:id="rId17"/>
-    <p:sldId id="334" r:id="rId18"/>
-    <p:sldId id="337" r:id="rId19"/>
-    <p:sldId id="309" r:id="rId20"/>
+    <p:sldId id="346" r:id="rId14"/>
+    <p:sldId id="347" r:id="rId15"/>
+    <p:sldId id="345" r:id="rId16"/>
+    <p:sldId id="333" r:id="rId17"/>
+    <p:sldId id="323" r:id="rId18"/>
+    <p:sldId id="334" r:id="rId19"/>
+    <p:sldId id="337" r:id="rId20"/>
+    <p:sldId id="309" r:id="rId21"/>
   </p:sldIdLst>
   <p:sldSz cx="9144000" cy="5143500" type="screen16x9"/>
   <p:notesSz cx="6858000" cy="9144000"/>
@@ -761,7 +762,7 @@
     </p:spTree>
     <p:extLst>
       <p:ext uri="{BB962C8B-B14F-4D97-AF65-F5344CB8AC3E}">
-        <p14:creationId xmlns:p14="http://schemas.microsoft.com/office/powerpoint/2010/main" val="1544104169"/>
+        <p14:creationId xmlns:p14="http://schemas.microsoft.com/office/powerpoint/2010/main" val="1105166720"/>
       </p:ext>
     </p:extLst>
   </p:cSld>
@@ -827,7 +828,7 @@
     </p:spTree>
     <p:extLst>
       <p:ext uri="{BB962C8B-B14F-4D97-AF65-F5344CB8AC3E}">
-        <p14:creationId xmlns:p14="http://schemas.microsoft.com/office/powerpoint/2010/main" val="1105166720"/>
+        <p14:creationId xmlns:p14="http://schemas.microsoft.com/office/powerpoint/2010/main" val="4020379069"/>
       </p:ext>
     </p:extLst>
   </p:cSld>
@@ -893,7 +894,7 @@
     </p:spTree>
     <p:extLst>
       <p:ext uri="{BB962C8B-B14F-4D97-AF65-F5344CB8AC3E}">
-        <p14:creationId xmlns:p14="http://schemas.microsoft.com/office/powerpoint/2010/main" val="585304384"/>
+        <p14:creationId xmlns:p14="http://schemas.microsoft.com/office/powerpoint/2010/main" val="1544104169"/>
       </p:ext>
     </p:extLst>
   </p:cSld>
@@ -959,7 +960,7 @@
     </p:spTree>
     <p:extLst>
       <p:ext uri="{BB962C8B-B14F-4D97-AF65-F5344CB8AC3E}">
-        <p14:creationId xmlns:p14="http://schemas.microsoft.com/office/powerpoint/2010/main" val="2709569597"/>
+        <p14:creationId xmlns:p14="http://schemas.microsoft.com/office/powerpoint/2010/main" val="585304384"/>
       </p:ext>
     </p:extLst>
   </p:cSld>
@@ -1025,6 +1026,72 @@
     </p:spTree>
     <p:extLst>
       <p:ext uri="{BB962C8B-B14F-4D97-AF65-F5344CB8AC3E}">
+        <p14:creationId xmlns:p14="http://schemas.microsoft.com/office/powerpoint/2010/main" val="2709569597"/>
+      </p:ext>
+    </p:extLst>
+  </p:cSld>
+  <p:clrMapOvr>
+    <a:masterClrMapping/>
+  </p:clrMapOvr>
+</p:notes>
+</file>
+
+<file path=ppt/notesSlides/notesSlide17.xml><?xml version="1.0" encoding="utf-8"?>
+<p:notes xmlns:a="http://schemas.openxmlformats.org/drawingml/2006/main" xmlns:r="http://schemas.openxmlformats.org/officeDocument/2006/relationships" xmlns:p="http://schemas.openxmlformats.org/presentationml/2006/main">
+  <p:cSld>
+    <p:spTree>
+      <p:nvGrpSpPr>
+        <p:cNvPr id="1" name=""/>
+        <p:cNvGrpSpPr/>
+        <p:nvPr/>
+      </p:nvGrpSpPr>
+      <p:grpSpPr>
+        <a:xfrm>
+          <a:off x="0" y="0"/>
+          <a:ext cx="0" cy="0"/>
+          <a:chOff x="0" y="0"/>
+          <a:chExt cx="0" cy="0"/>
+        </a:xfrm>
+      </p:grpSpPr>
+      <p:sp>
+        <p:nvSpPr>
+          <p:cNvPr id="2" name="Espaço Reservado para Imagem de Slide 1"/>
+          <p:cNvSpPr>
+            <a:spLocks noGrp="1" noRot="1" noChangeAspect="1"/>
+          </p:cNvSpPr>
+          <p:nvPr>
+            <p:ph type="sldImg"/>
+          </p:nvPr>
+        </p:nvSpPr>
+        <p:spPr>
+          <a:xfrm>
+            <a:off x="381000" y="685800"/>
+            <a:ext cx="6096000" cy="3429000"/>
+          </a:xfrm>
+        </p:spPr>
+      </p:sp>
+      <p:sp>
+        <p:nvSpPr>
+          <p:cNvPr id="3" name="Espaço Reservado para Anotações 2"/>
+          <p:cNvSpPr>
+            <a:spLocks noGrp="1"/>
+          </p:cNvSpPr>
+          <p:nvPr>
+            <p:ph type="body" idx="1"/>
+          </p:nvPr>
+        </p:nvSpPr>
+        <p:spPr/>
+        <p:txBody>
+          <a:bodyPr/>
+          <a:lstStyle/>
+          <a:p>
+            <a:endParaRPr lang="pt-BR" dirty="0"/>
+          </a:p>
+        </p:txBody>
+      </p:sp>
+    </p:spTree>
+    <p:extLst>
+      <p:ext uri="{BB962C8B-B14F-4D97-AF65-F5344CB8AC3E}">
         <p14:creationId xmlns:p14="http://schemas.microsoft.com/office/powerpoint/2010/main" val="2296249050"/>
       </p:ext>
     </p:extLst>
@@ -1035,7 +1102,7 @@
 </p:notes>
 </file>
 
-<file path=ppt/notesSlides/notesSlide17.xml><?xml version="1.0" encoding="utf-8"?>
+<file path=ppt/notesSlides/notesSlide18.xml><?xml version="1.0" encoding="utf-8"?>
 <p:notes xmlns:a="http://schemas.openxmlformats.org/drawingml/2006/main" xmlns:r="http://schemas.openxmlformats.org/officeDocument/2006/relationships" xmlns:p="http://schemas.openxmlformats.org/presentationml/2006/main">
   <p:cSld>
     <p:spTree>
@@ -5146,34 +5213,11 @@
               <a:buNone/>
             </a:pPr>
             <a:r>
-              <a:rPr lang="pt-BR" sz="2400" b="1" dirty="0">
-                <a:solidFill>
-                  <a:srgbClr val="FF0000"/>
-                </a:solidFill>
-                <a:latin typeface="Times New Roman" panose="02020603050405020304" pitchFamily="18" charset="0"/>
-                <a:cs typeface="Times New Roman" panose="02020603050405020304" pitchFamily="18" charset="0"/>
-              </a:rPr>
-              <a:t>Roteiro Configuração Projeto </a:t>
-            </a:r>
-            <a:r>
-              <a:rPr lang="pt-BR" sz="2400" b="1" dirty="0" err="1">
-                <a:solidFill>
-                  <a:srgbClr val="FF0000"/>
-                </a:solidFill>
-                <a:latin typeface="Times New Roman" panose="02020603050405020304" pitchFamily="18" charset="0"/>
-                <a:cs typeface="Times New Roman" panose="02020603050405020304" pitchFamily="18" charset="0"/>
-              </a:rPr>
-              <a:t>Github</a:t>
-            </a:r>
-            <a:r>
-              <a:rPr lang="pt-BR" sz="2400" b="1" dirty="0">
-                <a:solidFill>
-                  <a:srgbClr val="FF0000"/>
-                </a:solidFill>
-                <a:latin typeface="Times New Roman" panose="02020603050405020304" pitchFamily="18" charset="0"/>
-                <a:cs typeface="Times New Roman" panose="02020603050405020304" pitchFamily="18" charset="0"/>
-              </a:rPr>
-              <a:t> </a:t>
+              <a:rPr lang="pt-BR" sz="3200" dirty="0">
+                <a:latin typeface="Times New Roman" panose="02020603050405020304" pitchFamily="18" charset="0"/>
+                <a:cs typeface="Times New Roman" panose="02020603050405020304" pitchFamily="18" charset="0"/>
+              </a:rPr>
+              <a:t>1. Cria conta no github.com (https://github.com)</a:t>
             </a:r>
           </a:p>
           <a:p>
@@ -5181,47 +5225,35 @@
               <a:buNone/>
             </a:pPr>
             <a:r>
-              <a:rPr lang="pt-BR" sz="2400" dirty="0">
-                <a:latin typeface="Times New Roman" panose="02020603050405020304" pitchFamily="18" charset="0"/>
-                <a:cs typeface="Times New Roman" panose="02020603050405020304" pitchFamily="18" charset="0"/>
-              </a:rPr>
-              <a:t>1. Cria conta no github.com (https://github.com)</a:t>
-            </a:r>
-          </a:p>
-          <a:p>
-            <a:pPr marL="0" indent="0" algn="just">
-              <a:buNone/>
-            </a:pPr>
-            <a:r>
-              <a:rPr lang="pt-BR" sz="2400" dirty="0">
+              <a:rPr lang="pt-BR" sz="3200" dirty="0">
                 <a:latin typeface="Times New Roman" panose="02020603050405020304" pitchFamily="18" charset="0"/>
                 <a:cs typeface="Times New Roman" panose="02020603050405020304" pitchFamily="18" charset="0"/>
               </a:rPr>
               <a:t>2. Download / instalar a tool </a:t>
             </a:r>
             <a:r>
-              <a:rPr lang="pt-BR" sz="2400" dirty="0" err="1">
+              <a:rPr lang="pt-BR" sz="3200" dirty="0" err="1">
                 <a:latin typeface="Times New Roman" panose="02020603050405020304" pitchFamily="18" charset="0"/>
                 <a:cs typeface="Times New Roman" panose="02020603050405020304" pitchFamily="18" charset="0"/>
               </a:rPr>
               <a:t>git</a:t>
             </a:r>
             <a:r>
-              <a:rPr lang="pt-BR" sz="2400" dirty="0">
+              <a:rPr lang="pt-BR" sz="3200" dirty="0">
                 <a:latin typeface="Times New Roman" panose="02020603050405020304" pitchFamily="18" charset="0"/>
                 <a:cs typeface="Times New Roman" panose="02020603050405020304" pitchFamily="18" charset="0"/>
               </a:rPr>
               <a:t>: </a:t>
             </a:r>
             <a:r>
-              <a:rPr lang="pt-BR" sz="2400" dirty="0">
+              <a:rPr lang="pt-BR" sz="3200" dirty="0">
                 <a:latin typeface="Times New Roman" panose="02020603050405020304" pitchFamily="18" charset="0"/>
                 <a:cs typeface="Times New Roman" panose="02020603050405020304" pitchFamily="18" charset="0"/>
                 <a:hlinkClick r:id="rId3"/>
               </a:rPr>
               <a:t>https://git-scm.com/downloads</a:t>
             </a:r>
-            <a:endParaRPr lang="pt-BR" sz="2400" dirty="0">
+            <a:endParaRPr lang="pt-BR" sz="3200" dirty="0">
               <a:latin typeface="Times New Roman" panose="02020603050405020304" pitchFamily="18" charset="0"/>
               <a:cs typeface="Times New Roman" panose="02020603050405020304" pitchFamily="18" charset="0"/>
             </a:endParaRPr>
@@ -5231,42 +5263,35 @@
               <a:buNone/>
             </a:pPr>
             <a:r>
-              <a:rPr lang="pt-BR" sz="2400" dirty="0">
+              <a:rPr lang="pt-BR" sz="3200" dirty="0">
                 <a:latin typeface="Times New Roman" panose="02020603050405020304" pitchFamily="18" charset="0"/>
                 <a:cs typeface="Times New Roman" panose="02020603050405020304" pitchFamily="18" charset="0"/>
               </a:rPr>
               <a:t>3. </a:t>
             </a:r>
             <a:r>
-              <a:rPr lang="pt-BR" sz="2400" b="1" dirty="0">
+              <a:rPr lang="pt-BR" sz="3200" b="1" dirty="0">
                 <a:latin typeface="Times New Roman" panose="02020603050405020304" pitchFamily="18" charset="0"/>
                 <a:cs typeface="Times New Roman" panose="02020603050405020304" pitchFamily="18" charset="0"/>
               </a:rPr>
               <a:t>Entrar</a:t>
             </a:r>
             <a:r>
-              <a:rPr lang="pt-BR" sz="2400" dirty="0">
+              <a:rPr lang="pt-BR" sz="3200" dirty="0">
                 <a:latin typeface="Times New Roman" panose="02020603050405020304" pitchFamily="18" charset="0"/>
                 <a:cs typeface="Times New Roman" panose="02020603050405020304" pitchFamily="18" charset="0"/>
               </a:rPr>
               <a:t> no </a:t>
             </a:r>
             <a:r>
-              <a:rPr lang="pt-BR" sz="2400" b="1" dirty="0">
-                <a:latin typeface="Times New Roman" panose="02020603050405020304" pitchFamily="18" charset="0"/>
-                <a:cs typeface="Times New Roman" panose="02020603050405020304" pitchFamily="18" charset="0"/>
-              </a:rPr>
-              <a:t>repositório </a:t>
-            </a:r>
-            <a:r>
-              <a:rPr lang="pt-BR" sz="2400" b="1" dirty="0" err="1">
-                <a:latin typeface="Times New Roman" panose="02020603050405020304" pitchFamily="18" charset="0"/>
-                <a:cs typeface="Times New Roman" panose="02020603050405020304" pitchFamily="18" charset="0"/>
-              </a:rPr>
-              <a:t>github</a:t>
-            </a:r>
-            <a:r>
-              <a:rPr lang="pt-BR" sz="2400" dirty="0">
+              <a:rPr lang="pt-BR" sz="3200" b="1" dirty="0">
+                <a:latin typeface="Times New Roman" panose="02020603050405020304" pitchFamily="18" charset="0"/>
+                <a:cs typeface="Times New Roman" panose="02020603050405020304" pitchFamily="18" charset="0"/>
+              </a:rPr>
+              <a:t>repositório GITHUB</a:t>
+            </a:r>
+            <a:r>
+              <a:rPr lang="pt-BR" sz="3200" dirty="0">
                 <a:latin typeface="Times New Roman" panose="02020603050405020304" pitchFamily="18" charset="0"/>
                 <a:cs typeface="Times New Roman" panose="02020603050405020304" pitchFamily="18" charset="0"/>
               </a:rPr>
@@ -5278,268 +5303,75 @@
               <a:buNone/>
             </a:pPr>
             <a:r>
-              <a:rPr lang="pt-BR" sz="2400" dirty="0">
+              <a:rPr lang="pt-BR" sz="3200" dirty="0">
                 <a:latin typeface="Times New Roman" panose="02020603050405020304" pitchFamily="18" charset="0"/>
                 <a:cs typeface="Times New Roman" panose="02020603050405020304" pitchFamily="18" charset="0"/>
               </a:rPr>
               <a:t>4. </a:t>
             </a:r>
             <a:r>
-              <a:rPr lang="pt-BR" sz="2400" b="1" dirty="0">
+              <a:rPr lang="pt-BR" sz="3200" b="1" dirty="0">
                 <a:latin typeface="Times New Roman" panose="02020603050405020304" pitchFamily="18" charset="0"/>
                 <a:cs typeface="Times New Roman" panose="02020603050405020304" pitchFamily="18" charset="0"/>
               </a:rPr>
               <a:t>Criar</a:t>
             </a:r>
             <a:r>
-              <a:rPr lang="pt-BR" sz="2400" dirty="0">
+              <a:rPr lang="pt-BR" sz="3200" dirty="0">
                 <a:latin typeface="Times New Roman" panose="02020603050405020304" pitchFamily="18" charset="0"/>
                 <a:cs typeface="Times New Roman" panose="02020603050405020304" pitchFamily="18" charset="0"/>
               </a:rPr>
               <a:t> um </a:t>
             </a:r>
             <a:r>
-              <a:rPr lang="pt-BR" sz="2400" b="1" dirty="0">
+              <a:rPr lang="pt-BR" sz="3200" b="1" dirty="0">
                 <a:solidFill>
                   <a:srgbClr val="FF0000"/>
                 </a:solidFill>
                 <a:latin typeface="Times New Roman" panose="02020603050405020304" pitchFamily="18" charset="0"/>
                 <a:cs typeface="Times New Roman" panose="02020603050405020304" pitchFamily="18" charset="0"/>
               </a:rPr>
-              <a:t>projeto no </a:t>
-            </a:r>
-            <a:r>
-              <a:rPr lang="pt-BR" sz="2400" b="1" dirty="0" err="1">
+              <a:t>projeto no GITHUB</a:t>
+            </a:r>
+            <a:r>
+              <a:rPr lang="pt-BR" sz="3200" dirty="0">
+                <a:latin typeface="Times New Roman" panose="02020603050405020304" pitchFamily="18" charset="0"/>
+                <a:cs typeface="Times New Roman" panose="02020603050405020304" pitchFamily="18" charset="0"/>
+              </a:rPr>
+              <a:t> na opção </a:t>
+            </a:r>
+            <a:r>
+              <a:rPr lang="pt-BR" sz="3200" b="1" dirty="0">
                 <a:solidFill>
                   <a:srgbClr val="FF0000"/>
                 </a:solidFill>
                 <a:latin typeface="Times New Roman" panose="02020603050405020304" pitchFamily="18" charset="0"/>
                 <a:cs typeface="Times New Roman" panose="02020603050405020304" pitchFamily="18" charset="0"/>
               </a:rPr>
-              <a:t>github</a:t>
-            </a:r>
-            <a:r>
-              <a:rPr lang="pt-BR" sz="2400" dirty="0">
-                <a:latin typeface="Times New Roman" panose="02020603050405020304" pitchFamily="18" charset="0"/>
-                <a:cs typeface="Times New Roman" panose="02020603050405020304" pitchFamily="18" charset="0"/>
-              </a:rPr>
-              <a:t> na opção </a:t>
-            </a:r>
-            <a:r>
-              <a:rPr lang="pt-BR" sz="2400" b="1" dirty="0">
-                <a:solidFill>
-                  <a:srgbClr val="FF0000"/>
-                </a:solidFill>
-                <a:latin typeface="Times New Roman" panose="02020603050405020304" pitchFamily="18" charset="0"/>
-                <a:cs typeface="Times New Roman" panose="02020603050405020304" pitchFamily="18" charset="0"/>
-              </a:rPr>
               <a:t>NEW</a:t>
             </a:r>
             <a:r>
-              <a:rPr lang="pt-BR" sz="2400" dirty="0">
+              <a:rPr lang="pt-BR" sz="3200" dirty="0">
                 <a:latin typeface="Times New Roman" panose="02020603050405020304" pitchFamily="18" charset="0"/>
                 <a:cs typeface="Times New Roman" panose="02020603050405020304" pitchFamily="18" charset="0"/>
               </a:rPr>
               <a:t> (</a:t>
             </a:r>
             <a:r>
-              <a:rPr lang="pt-BR" sz="2400" b="1" dirty="0">
+              <a:rPr lang="pt-BR" sz="3200" b="1" dirty="0">
                 <a:latin typeface="Times New Roman" panose="02020603050405020304" pitchFamily="18" charset="0"/>
                 <a:cs typeface="Times New Roman" panose="02020603050405020304" pitchFamily="18" charset="0"/>
               </a:rPr>
               <a:t>Definir o nome do seu projeto</a:t>
             </a:r>
             <a:r>
-              <a:rPr lang="pt-BR" sz="2400" dirty="0">
+              <a:rPr lang="pt-BR" sz="3200" dirty="0">
                 <a:latin typeface="Times New Roman" panose="02020603050405020304" pitchFamily="18" charset="0"/>
                 <a:cs typeface="Times New Roman" panose="02020603050405020304" pitchFamily="18" charset="0"/>
               </a:rPr>
               <a:t>)</a:t>
             </a:r>
-          </a:p>
-          <a:p>
-            <a:pPr marL="0" indent="0" algn="just">
-              <a:buNone/>
-            </a:pPr>
-            <a:r>
-              <a:rPr lang="pt-BR" sz="2400" dirty="0">
-                <a:latin typeface="Times New Roman" panose="02020603050405020304" pitchFamily="18" charset="0"/>
-                <a:cs typeface="Times New Roman" panose="02020603050405020304" pitchFamily="18" charset="0"/>
-              </a:rPr>
-              <a:t>5. </a:t>
-            </a:r>
-            <a:r>
-              <a:rPr lang="pt-BR" sz="2400" b="1" dirty="0">
-                <a:latin typeface="Times New Roman" panose="02020603050405020304" pitchFamily="18" charset="0"/>
-                <a:cs typeface="Times New Roman" panose="02020603050405020304" pitchFamily="18" charset="0"/>
-              </a:rPr>
-              <a:t>Criar</a:t>
-            </a:r>
-            <a:r>
-              <a:rPr lang="pt-BR" sz="2400" dirty="0">
-                <a:latin typeface="Times New Roman" panose="02020603050405020304" pitchFamily="18" charset="0"/>
-                <a:cs typeface="Times New Roman" panose="02020603050405020304" pitchFamily="18" charset="0"/>
-              </a:rPr>
-              <a:t> uma </a:t>
-            </a:r>
-            <a:r>
-              <a:rPr lang="pt-BR" sz="2400" b="1" dirty="0">
-                <a:latin typeface="Times New Roman" panose="02020603050405020304" pitchFamily="18" charset="0"/>
-                <a:cs typeface="Times New Roman" panose="02020603050405020304" pitchFamily="18" charset="0"/>
-              </a:rPr>
-              <a:t>pasta no Windows</a:t>
-            </a:r>
-            <a:r>
-              <a:rPr lang="pt-BR" sz="2400" dirty="0">
-                <a:latin typeface="Times New Roman" panose="02020603050405020304" pitchFamily="18" charset="0"/>
-                <a:cs typeface="Times New Roman" panose="02020603050405020304" pitchFamily="18" charset="0"/>
-              </a:rPr>
-              <a:t> (</a:t>
-            </a:r>
-            <a:r>
-              <a:rPr lang="pt-BR" sz="2400" b="1" dirty="0">
-                <a:solidFill>
-                  <a:srgbClr val="FF0000"/>
-                </a:solidFill>
-                <a:latin typeface="Times New Roman" panose="02020603050405020304" pitchFamily="18" charset="0"/>
-                <a:cs typeface="Times New Roman" panose="02020603050405020304" pitchFamily="18" charset="0"/>
-              </a:rPr>
-              <a:t>sugestão pasta: </a:t>
-            </a:r>
-            <a:r>
-              <a:rPr lang="pt-BR" sz="2400" b="1" dirty="0" err="1">
-                <a:solidFill>
-                  <a:srgbClr val="FF0000"/>
-                </a:solidFill>
-                <a:latin typeface="Times New Roman" panose="02020603050405020304" pitchFamily="18" charset="0"/>
-                <a:cs typeface="Times New Roman" panose="02020603050405020304" pitchFamily="18" charset="0"/>
-              </a:rPr>
-              <a:t>DisciplinaPython</a:t>
-            </a:r>
-            <a:r>
-              <a:rPr lang="pt-BR" sz="2400" dirty="0">
-                <a:latin typeface="Times New Roman" panose="02020603050405020304" pitchFamily="18" charset="0"/>
-                <a:cs typeface="Times New Roman" panose="02020603050405020304" pitchFamily="18" charset="0"/>
-              </a:rPr>
-              <a:t>)</a:t>
-            </a:r>
-          </a:p>
-          <a:p>
-            <a:pPr marL="0" indent="0" algn="just">
-              <a:buNone/>
-            </a:pPr>
-            <a:r>
-              <a:rPr lang="pt-BR" sz="2400" dirty="0">
-                <a:latin typeface="Times New Roman" panose="02020603050405020304" pitchFamily="18" charset="0"/>
-                <a:cs typeface="Times New Roman" panose="02020603050405020304" pitchFamily="18" charset="0"/>
-              </a:rPr>
-              <a:t>6. Entrar no </a:t>
-            </a:r>
-            <a:r>
-              <a:rPr lang="pt-BR" sz="2400" b="1" dirty="0">
-                <a:latin typeface="Times New Roman" panose="02020603050405020304" pitchFamily="18" charset="0"/>
-                <a:cs typeface="Times New Roman" panose="02020603050405020304" pitchFamily="18" charset="0"/>
-              </a:rPr>
-              <a:t>modo </a:t>
-            </a:r>
-            <a:r>
-              <a:rPr lang="pt-BR" sz="2400" b="1" dirty="0" err="1">
-                <a:latin typeface="Times New Roman" panose="02020603050405020304" pitchFamily="18" charset="0"/>
-                <a:cs typeface="Times New Roman" panose="02020603050405020304" pitchFamily="18" charset="0"/>
-              </a:rPr>
-              <a:t>shell</a:t>
-            </a:r>
-            <a:r>
-              <a:rPr lang="pt-BR" sz="2400" dirty="0">
-                <a:latin typeface="Times New Roman" panose="02020603050405020304" pitchFamily="18" charset="0"/>
-                <a:cs typeface="Times New Roman" panose="02020603050405020304" pitchFamily="18" charset="0"/>
-              </a:rPr>
-              <a:t> (botão direito do mouse </a:t>
-            </a:r>
-            <a:r>
-              <a:rPr lang="pt-BR" sz="2400" b="1" dirty="0" err="1">
-                <a:solidFill>
-                  <a:srgbClr val="FF0000"/>
-                </a:solidFill>
-                <a:latin typeface="Times New Roman" panose="02020603050405020304" pitchFamily="18" charset="0"/>
-                <a:cs typeface="Times New Roman" panose="02020603050405020304" pitchFamily="18" charset="0"/>
-              </a:rPr>
-              <a:t>git</a:t>
-            </a:r>
-            <a:r>
-              <a:rPr lang="pt-BR" sz="2400" b="1" dirty="0">
-                <a:solidFill>
-                  <a:srgbClr val="FF0000"/>
-                </a:solidFill>
-                <a:latin typeface="Times New Roman" panose="02020603050405020304" pitchFamily="18" charset="0"/>
-                <a:cs typeface="Times New Roman" panose="02020603050405020304" pitchFamily="18" charset="0"/>
-              </a:rPr>
-              <a:t> </a:t>
-            </a:r>
-            <a:r>
-              <a:rPr lang="pt-BR" sz="2400" b="1" dirty="0" err="1">
-                <a:solidFill>
-                  <a:srgbClr val="FF0000"/>
-                </a:solidFill>
-                <a:latin typeface="Times New Roman" panose="02020603050405020304" pitchFamily="18" charset="0"/>
-                <a:cs typeface="Times New Roman" panose="02020603050405020304" pitchFamily="18" charset="0"/>
-              </a:rPr>
-              <a:t>bash</a:t>
-            </a:r>
-            <a:r>
-              <a:rPr lang="pt-BR" sz="2400" b="1" dirty="0">
-                <a:solidFill>
-                  <a:srgbClr val="FF0000"/>
-                </a:solidFill>
-                <a:latin typeface="Times New Roman" panose="02020603050405020304" pitchFamily="18" charset="0"/>
-                <a:cs typeface="Times New Roman" panose="02020603050405020304" pitchFamily="18" charset="0"/>
-              </a:rPr>
-              <a:t> </a:t>
-            </a:r>
-            <a:r>
-              <a:rPr lang="pt-BR" sz="2400" b="1" dirty="0" err="1">
-                <a:solidFill>
-                  <a:srgbClr val="FF0000"/>
-                </a:solidFill>
-                <a:latin typeface="Times New Roman" panose="02020603050405020304" pitchFamily="18" charset="0"/>
-                <a:cs typeface="Times New Roman" panose="02020603050405020304" pitchFamily="18" charset="0"/>
-              </a:rPr>
-              <a:t>here</a:t>
-            </a:r>
-            <a:r>
-              <a:rPr lang="pt-BR" sz="2400" dirty="0">
-                <a:latin typeface="Times New Roman" panose="02020603050405020304" pitchFamily="18" charset="0"/>
-                <a:cs typeface="Times New Roman" panose="02020603050405020304" pitchFamily="18" charset="0"/>
-              </a:rPr>
-              <a:t>)</a:t>
-            </a:r>
-          </a:p>
-          <a:p>
-            <a:pPr marL="0" indent="0" algn="just">
-              <a:buNone/>
-            </a:pPr>
-            <a:r>
-              <a:rPr lang="pt-BR" sz="2400" dirty="0">
-                <a:latin typeface="Times New Roman" panose="02020603050405020304" pitchFamily="18" charset="0"/>
-                <a:cs typeface="Times New Roman" panose="02020603050405020304" pitchFamily="18" charset="0"/>
-              </a:rPr>
-              <a:t>7. Confirmar se está dentro da </a:t>
-            </a:r>
-            <a:r>
-              <a:rPr lang="pt-BR" sz="2400" b="1" dirty="0">
-                <a:latin typeface="Times New Roman" panose="02020603050405020304" pitchFamily="18" charset="0"/>
-                <a:cs typeface="Times New Roman" panose="02020603050405020304" pitchFamily="18" charset="0"/>
-              </a:rPr>
-              <a:t>pasta </a:t>
-            </a:r>
-            <a:r>
-              <a:rPr lang="pt-BR" sz="2400" b="1" dirty="0" err="1">
-                <a:latin typeface="Times New Roman" panose="02020603050405020304" pitchFamily="18" charset="0"/>
-                <a:cs typeface="Times New Roman" panose="02020603050405020304" pitchFamily="18" charset="0"/>
-              </a:rPr>
-              <a:t>DisciplinaPython</a:t>
-            </a:r>
-            <a:endParaRPr lang="pt-BR" sz="2400" b="1" dirty="0">
+            <a:endParaRPr lang="pt-BR" sz="3200" b="1" dirty="0">
               <a:latin typeface="Times New Roman" panose="02020603050405020304" pitchFamily="18" charset="0"/>
               <a:cs typeface="Times New Roman" panose="02020603050405020304" pitchFamily="18" charset="0"/>
             </a:endParaRPr>
@@ -5644,8 +5476,8 @@
         </p:nvSpPr>
         <p:spPr>
           <a:xfrm>
-            <a:off x="142865" y="974682"/>
-            <a:ext cx="8865056" cy="3962838"/>
+            <a:off x="142865" y="1037312"/>
+            <a:ext cx="8865056" cy="3900208"/>
           </a:xfrm>
         </p:spPr>
         <p:txBody>
@@ -5658,79 +5490,60 @@
               <a:buNone/>
             </a:pPr>
             <a:r>
-              <a:rPr lang="pt-BR" sz="2000" dirty="0">
-                <a:latin typeface="Times New Roman" panose="02020603050405020304" pitchFamily="18" charset="0"/>
-                <a:cs typeface="Times New Roman" panose="02020603050405020304" pitchFamily="18" charset="0"/>
-              </a:rPr>
-              <a:t>8. </a:t>
-            </a:r>
-            <a:r>
-              <a:rPr lang="pt-BR" sz="2000" b="1" dirty="0" err="1">
+              <a:rPr lang="pt-BR" sz="2400" b="1" dirty="0">
+                <a:latin typeface="Times New Roman" panose="02020603050405020304" pitchFamily="18" charset="0"/>
+                <a:cs typeface="Times New Roman" panose="02020603050405020304" pitchFamily="18" charset="0"/>
+              </a:rPr>
+              <a:t>Criei um exemplo de projeto TESTEPYTHON no github.com</a:t>
+            </a:r>
+          </a:p>
+          <a:p>
+            <a:pPr marL="0" indent="0" algn="just">
+              <a:buNone/>
+            </a:pPr>
+            <a:r>
+              <a:rPr lang="pt-BR" sz="2400" dirty="0" err="1">
                 <a:latin typeface="Times New Roman" panose="02020603050405020304" pitchFamily="18" charset="0"/>
                 <a:cs typeface="Times New Roman" panose="02020603050405020304" pitchFamily="18" charset="0"/>
               </a:rPr>
               <a:t>git</a:t>
             </a:r>
             <a:r>
-              <a:rPr lang="pt-BR" sz="2000" b="1" dirty="0">
+              <a:rPr lang="pt-BR" sz="2400" dirty="0">
                 <a:latin typeface="Times New Roman" panose="02020603050405020304" pitchFamily="18" charset="0"/>
                 <a:cs typeface="Times New Roman" panose="02020603050405020304" pitchFamily="18" charset="0"/>
               </a:rPr>
               <a:t> </a:t>
             </a:r>
             <a:r>
-              <a:rPr lang="pt-BR" sz="2000" b="1" dirty="0" err="1">
+              <a:rPr lang="pt-BR" sz="2400" dirty="0" err="1">
                 <a:latin typeface="Times New Roman" panose="02020603050405020304" pitchFamily="18" charset="0"/>
                 <a:cs typeface="Times New Roman" panose="02020603050405020304" pitchFamily="18" charset="0"/>
               </a:rPr>
               <a:t>init</a:t>
             </a:r>
-            <a:r>
-              <a:rPr lang="pt-BR" sz="2000" dirty="0">
-                <a:latin typeface="Times New Roman" panose="02020603050405020304" pitchFamily="18" charset="0"/>
-                <a:cs typeface="Times New Roman" panose="02020603050405020304" pitchFamily="18" charset="0"/>
-              </a:rPr>
-              <a:t> (vai cria um ponteiro da pasta)</a:t>
-            </a:r>
+            <a:endParaRPr lang="pt-BR" sz="2400" dirty="0">
+              <a:latin typeface="Times New Roman" panose="02020603050405020304" pitchFamily="18" charset="0"/>
+              <a:cs typeface="Times New Roman" panose="02020603050405020304" pitchFamily="18" charset="0"/>
+            </a:endParaRPr>
           </a:p>
           <a:p>
             <a:pPr marL="0" indent="0" algn="just">
               <a:buNone/>
             </a:pPr>
             <a:r>
-              <a:rPr lang="pt-BR" sz="2000" dirty="0">
-                <a:latin typeface="Times New Roman" panose="02020603050405020304" pitchFamily="18" charset="0"/>
-                <a:cs typeface="Times New Roman" panose="02020603050405020304" pitchFamily="18" charset="0"/>
-              </a:rPr>
-              <a:t>9. </a:t>
-            </a:r>
-            <a:r>
-              <a:rPr lang="pt-BR" sz="2000" b="1" dirty="0" err="1">
+              <a:rPr lang="pt-BR" sz="2400" dirty="0" err="1">
                 <a:latin typeface="Times New Roman" panose="02020603050405020304" pitchFamily="18" charset="0"/>
                 <a:cs typeface="Times New Roman" panose="02020603050405020304" pitchFamily="18" charset="0"/>
               </a:rPr>
               <a:t>echo</a:t>
             </a:r>
             <a:r>
-              <a:rPr lang="pt-BR" sz="2000" b="1" dirty="0">
-                <a:latin typeface="Times New Roman" panose="02020603050405020304" pitchFamily="18" charset="0"/>
-                <a:cs typeface="Times New Roman" panose="02020603050405020304" pitchFamily="18" charset="0"/>
-              </a:rPr>
-              <a:t> "# </a:t>
-            </a:r>
-            <a:r>
-              <a:rPr lang="pt-BR" sz="2000" b="1" dirty="0" err="1">
-                <a:latin typeface="Times New Roman" panose="02020603050405020304" pitchFamily="18" charset="0"/>
-                <a:cs typeface="Times New Roman" panose="02020603050405020304" pitchFamily="18" charset="0"/>
-              </a:rPr>
-              <a:t>testePython</a:t>
-            </a:r>
-            <a:r>
-              <a:rPr lang="pt-BR" sz="2000" b="1" dirty="0">
-                <a:latin typeface="Times New Roman" panose="02020603050405020304" pitchFamily="18" charset="0"/>
-                <a:cs typeface="Times New Roman" panose="02020603050405020304" pitchFamily="18" charset="0"/>
-              </a:rPr>
-              <a:t>" &gt;&gt; README.md</a:t>
+              <a:rPr lang="pt-BR" sz="2400" dirty="0">
+                <a:latin typeface="Times New Roman" panose="02020603050405020304" pitchFamily="18" charset="0"/>
+                <a:cs typeface="Times New Roman" panose="02020603050405020304" pitchFamily="18" charset="0"/>
+              </a:rPr>
+              <a:t> "# TESTEPYTHON" &gt;&gt; README.md</a:t>
             </a:r>
           </a:p>
           <a:p>
@@ -5738,60 +5551,32 @@
               <a:buNone/>
             </a:pPr>
             <a:r>
-              <a:rPr lang="pt-BR" sz="2000" dirty="0">
-                <a:latin typeface="Times New Roman" panose="02020603050405020304" pitchFamily="18" charset="0"/>
-                <a:cs typeface="Times New Roman" panose="02020603050405020304" pitchFamily="18" charset="0"/>
-              </a:rPr>
-              <a:t>10. </a:t>
-            </a:r>
-            <a:r>
-              <a:rPr lang="pt-BR" sz="2000" b="1" dirty="0" err="1">
+              <a:rPr lang="pt-BR" sz="2400" dirty="0" err="1">
                 <a:latin typeface="Times New Roman" panose="02020603050405020304" pitchFamily="18" charset="0"/>
                 <a:cs typeface="Times New Roman" panose="02020603050405020304" pitchFamily="18" charset="0"/>
               </a:rPr>
               <a:t>git</a:t>
             </a:r>
             <a:r>
-              <a:rPr lang="pt-BR" sz="2000" b="1" dirty="0">
+              <a:rPr lang="pt-BR" sz="2400" dirty="0">
                 <a:latin typeface="Times New Roman" panose="02020603050405020304" pitchFamily="18" charset="0"/>
                 <a:cs typeface="Times New Roman" panose="02020603050405020304" pitchFamily="18" charset="0"/>
               </a:rPr>
               <a:t> </a:t>
             </a:r>
             <a:r>
-              <a:rPr lang="pt-BR" sz="2000" b="1" dirty="0" err="1">
+              <a:rPr lang="pt-BR" sz="2400" dirty="0" err="1">
                 <a:latin typeface="Times New Roman" panose="02020603050405020304" pitchFamily="18" charset="0"/>
                 <a:cs typeface="Times New Roman" panose="02020603050405020304" pitchFamily="18" charset="0"/>
               </a:rPr>
               <a:t>add</a:t>
             </a:r>
             <a:r>
-              <a:rPr lang="pt-BR" sz="2000" b="1" dirty="0">
-                <a:latin typeface="Times New Roman" panose="02020603050405020304" pitchFamily="18" charset="0"/>
-                <a:cs typeface="Times New Roman" panose="02020603050405020304" pitchFamily="18" charset="0"/>
-              </a:rPr>
-              <a:t> .</a:t>
-            </a:r>
-            <a:r>
-              <a:rPr lang="pt-BR" sz="2000" dirty="0">
-                <a:latin typeface="Times New Roman" panose="02020603050405020304" pitchFamily="18" charset="0"/>
-                <a:cs typeface="Times New Roman" panose="02020603050405020304" pitchFamily="18" charset="0"/>
-              </a:rPr>
-              <a:t> (Incluir todos os </a:t>
-            </a:r>
-            <a:r>
-              <a:rPr lang="pt-BR" sz="2000" dirty="0" err="1">
-                <a:latin typeface="Times New Roman" panose="02020603050405020304" pitchFamily="18" charset="0"/>
-                <a:cs typeface="Times New Roman" panose="02020603050405020304" pitchFamily="18" charset="0"/>
-              </a:rPr>
-              <a:t>aqruivos</a:t>
-            </a:r>
-            <a:r>
-              <a:rPr lang="pt-BR" sz="2000" dirty="0">
-                <a:latin typeface="Times New Roman" panose="02020603050405020304" pitchFamily="18" charset="0"/>
-                <a:cs typeface="Times New Roman" panose="02020603050405020304" pitchFamily="18" charset="0"/>
-              </a:rPr>
-              <a:t> no HEAD do repositório GIT Local)</a:t>
+              <a:rPr lang="pt-BR" sz="2400" dirty="0">
+                <a:latin typeface="Times New Roman" panose="02020603050405020304" pitchFamily="18" charset="0"/>
+                <a:cs typeface="Times New Roman" panose="02020603050405020304" pitchFamily="18" charset="0"/>
+              </a:rPr>
+              <a:t> README.md</a:t>
             </a:r>
           </a:p>
           <a:p>
@@ -5799,39 +5584,60 @@
               <a:buNone/>
             </a:pPr>
             <a:r>
-              <a:rPr lang="pt-BR" sz="2000" dirty="0">
-                <a:latin typeface="Times New Roman" panose="02020603050405020304" pitchFamily="18" charset="0"/>
-                <a:cs typeface="Times New Roman" panose="02020603050405020304" pitchFamily="18" charset="0"/>
-              </a:rPr>
-              <a:t>11. </a:t>
-            </a:r>
-            <a:r>
-              <a:rPr lang="pt-BR" sz="2000" b="1" dirty="0" err="1">
+              <a:rPr lang="pt-BR" sz="2400" dirty="0" err="1">
                 <a:latin typeface="Times New Roman" panose="02020603050405020304" pitchFamily="18" charset="0"/>
                 <a:cs typeface="Times New Roman" panose="02020603050405020304" pitchFamily="18" charset="0"/>
               </a:rPr>
               <a:t>git</a:t>
             </a:r>
             <a:r>
-              <a:rPr lang="pt-BR" sz="2000" b="1" dirty="0">
+              <a:rPr lang="pt-BR" sz="2400" dirty="0">
                 <a:latin typeface="Times New Roman" panose="02020603050405020304" pitchFamily="18" charset="0"/>
                 <a:cs typeface="Times New Roman" panose="02020603050405020304" pitchFamily="18" charset="0"/>
               </a:rPr>
               <a:t> </a:t>
             </a:r>
             <a:r>
-              <a:rPr lang="pt-BR" sz="2000" b="1" dirty="0" err="1">
+              <a:rPr lang="pt-BR" sz="2400" dirty="0" err="1">
                 <a:latin typeface="Times New Roman" panose="02020603050405020304" pitchFamily="18" charset="0"/>
                 <a:cs typeface="Times New Roman" panose="02020603050405020304" pitchFamily="18" charset="0"/>
               </a:rPr>
               <a:t>commit</a:t>
             </a:r>
             <a:r>
-              <a:rPr lang="pt-BR" sz="2000" b="1" dirty="0">
-                <a:latin typeface="Times New Roman" panose="02020603050405020304" pitchFamily="18" charset="0"/>
-                <a:cs typeface="Times New Roman" panose="02020603050405020304" pitchFamily="18" charset="0"/>
-              </a:rPr>
-              <a:t> -m "Disciplina Python"</a:t>
+              <a:rPr lang="pt-BR" sz="2400" dirty="0">
+                <a:latin typeface="Times New Roman" panose="02020603050405020304" pitchFamily="18" charset="0"/>
+                <a:cs typeface="Times New Roman" panose="02020603050405020304" pitchFamily="18" charset="0"/>
+              </a:rPr>
+              <a:t> -m "</a:t>
+            </a:r>
+            <a:r>
+              <a:rPr lang="pt-BR" sz="2400" dirty="0" err="1">
+                <a:latin typeface="Times New Roman" panose="02020603050405020304" pitchFamily="18" charset="0"/>
+                <a:cs typeface="Times New Roman" panose="02020603050405020304" pitchFamily="18" charset="0"/>
+              </a:rPr>
+              <a:t>first</a:t>
+            </a:r>
+            <a:r>
+              <a:rPr lang="pt-BR" sz="2400" dirty="0">
+                <a:latin typeface="Times New Roman" panose="02020603050405020304" pitchFamily="18" charset="0"/>
+                <a:cs typeface="Times New Roman" panose="02020603050405020304" pitchFamily="18" charset="0"/>
+              </a:rPr>
+              <a:t> </a:t>
+            </a:r>
+            <a:r>
+              <a:rPr lang="pt-BR" sz="2400" dirty="0" err="1">
+                <a:latin typeface="Times New Roman" panose="02020603050405020304" pitchFamily="18" charset="0"/>
+                <a:cs typeface="Times New Roman" panose="02020603050405020304" pitchFamily="18" charset="0"/>
+              </a:rPr>
+              <a:t>commit</a:t>
+            </a:r>
+            <a:r>
+              <a:rPr lang="pt-BR" sz="2400" dirty="0">
+                <a:latin typeface="Times New Roman" panose="02020603050405020304" pitchFamily="18" charset="0"/>
+                <a:cs typeface="Times New Roman" panose="02020603050405020304" pitchFamily="18" charset="0"/>
+              </a:rPr>
+              <a:t>"</a:t>
             </a:r>
           </a:p>
           <a:p>
@@ -5839,333 +5645,76 @@
               <a:buNone/>
             </a:pPr>
             <a:r>
-              <a:rPr lang="pt-BR" sz="2000" dirty="0">
-                <a:latin typeface="Times New Roman" panose="02020603050405020304" pitchFamily="18" charset="0"/>
-                <a:cs typeface="Times New Roman" panose="02020603050405020304" pitchFamily="18" charset="0"/>
-              </a:rPr>
-              <a:t>12. </a:t>
-            </a:r>
-            <a:r>
-              <a:rPr lang="pt-BR" sz="2000" b="1" dirty="0" err="1">
+              <a:rPr lang="pt-BR" sz="2400" b="1" dirty="0" err="1">
+                <a:solidFill>
+                  <a:srgbClr val="FF0000"/>
+                </a:solidFill>
                 <a:latin typeface="Times New Roman" panose="02020603050405020304" pitchFamily="18" charset="0"/>
                 <a:cs typeface="Times New Roman" panose="02020603050405020304" pitchFamily="18" charset="0"/>
               </a:rPr>
               <a:t>git</a:t>
             </a:r>
             <a:r>
-              <a:rPr lang="pt-BR" sz="2000" b="1" dirty="0">
+              <a:rPr lang="pt-BR" sz="2400" b="1" dirty="0">
+                <a:solidFill>
+                  <a:srgbClr val="FF0000"/>
+                </a:solidFill>
                 <a:latin typeface="Times New Roman" panose="02020603050405020304" pitchFamily="18" charset="0"/>
                 <a:cs typeface="Times New Roman" panose="02020603050405020304" pitchFamily="18" charset="0"/>
               </a:rPr>
               <a:t> </a:t>
             </a:r>
             <a:r>
-              <a:rPr lang="pt-BR" sz="2000" b="1" dirty="0" err="1">
+              <a:rPr lang="pt-BR" sz="2400" b="1" dirty="0" err="1">
+                <a:solidFill>
+                  <a:srgbClr val="FF0000"/>
+                </a:solidFill>
                 <a:latin typeface="Times New Roman" panose="02020603050405020304" pitchFamily="18" charset="0"/>
                 <a:cs typeface="Times New Roman" panose="02020603050405020304" pitchFamily="18" charset="0"/>
               </a:rPr>
               <a:t>remote</a:t>
             </a:r>
             <a:r>
-              <a:rPr lang="pt-BR" sz="2000" b="1" dirty="0">
+              <a:rPr lang="pt-BR" sz="2400" b="1" dirty="0">
+                <a:solidFill>
+                  <a:srgbClr val="FF0000"/>
+                </a:solidFill>
                 <a:latin typeface="Times New Roman" panose="02020603050405020304" pitchFamily="18" charset="0"/>
                 <a:cs typeface="Times New Roman" panose="02020603050405020304" pitchFamily="18" charset="0"/>
               </a:rPr>
               <a:t> </a:t>
             </a:r>
             <a:r>
-              <a:rPr lang="pt-BR" sz="2000" b="1" dirty="0" err="1">
+              <a:rPr lang="pt-BR" sz="2400" b="1" dirty="0" err="1">
+                <a:solidFill>
+                  <a:srgbClr val="FF0000"/>
+                </a:solidFill>
                 <a:latin typeface="Times New Roman" panose="02020603050405020304" pitchFamily="18" charset="0"/>
                 <a:cs typeface="Times New Roman" panose="02020603050405020304" pitchFamily="18" charset="0"/>
               </a:rPr>
               <a:t>add</a:t>
             </a:r>
             <a:r>
-              <a:rPr lang="pt-BR" sz="2000" b="1" dirty="0">
+              <a:rPr lang="pt-BR" sz="2400" b="1" dirty="0">
+                <a:solidFill>
+                  <a:srgbClr val="FF0000"/>
+                </a:solidFill>
                 <a:latin typeface="Times New Roman" panose="02020603050405020304" pitchFamily="18" charset="0"/>
                 <a:cs typeface="Times New Roman" panose="02020603050405020304" pitchFamily="18" charset="0"/>
               </a:rPr>
               <a:t> </a:t>
             </a:r>
             <a:r>
-              <a:rPr lang="pt-BR" sz="2000" b="1" dirty="0" err="1">
+              <a:rPr lang="pt-BR" sz="2400" b="1" dirty="0" err="1">
+                <a:solidFill>
+                  <a:srgbClr val="FF0000"/>
+                </a:solidFill>
                 <a:latin typeface="Times New Roman" panose="02020603050405020304" pitchFamily="18" charset="0"/>
                 <a:cs typeface="Times New Roman" panose="02020603050405020304" pitchFamily="18" charset="0"/>
               </a:rPr>
               <a:t>origin</a:t>
             </a:r>
-            <a:r>
-              <a:rPr lang="pt-BR" sz="2000" b="1" dirty="0">
-                <a:latin typeface="Times New Roman" panose="02020603050405020304" pitchFamily="18" charset="0"/>
-                <a:cs typeface="Times New Roman" panose="02020603050405020304" pitchFamily="18" charset="0"/>
-              </a:rPr>
-              <a:t> </a:t>
-            </a:r>
-          </a:p>
-          <a:p>
-            <a:pPr marL="0" indent="0" algn="just">
-              <a:buNone/>
-            </a:pPr>
-            <a:r>
-              <a:rPr lang="pt-BR" sz="2000" b="1" dirty="0">
-                <a:latin typeface="Times New Roman" panose="02020603050405020304" pitchFamily="18" charset="0"/>
-                <a:cs typeface="Times New Roman" panose="02020603050405020304" pitchFamily="18" charset="0"/>
-              </a:rPr>
-              <a:t>      https://github.com/CloudEducationBrazil/TESTEPYTHON.git</a:t>
-            </a:r>
-            <a:r>
-              <a:rPr lang="pt-BR" sz="2000" dirty="0">
-                <a:latin typeface="Times New Roman" panose="02020603050405020304" pitchFamily="18" charset="0"/>
-                <a:cs typeface="Times New Roman" panose="02020603050405020304" pitchFamily="18" charset="0"/>
-              </a:rPr>
-              <a:t>   </a:t>
-            </a:r>
-          </a:p>
-          <a:p>
-            <a:pPr marL="0" indent="0" algn="just">
-              <a:buNone/>
-            </a:pPr>
-            <a:r>
-              <a:rPr lang="pt-BR" sz="2000" dirty="0">
-                <a:latin typeface="Times New Roman" panose="02020603050405020304" pitchFamily="18" charset="0"/>
-                <a:cs typeface="Times New Roman" panose="02020603050405020304" pitchFamily="18" charset="0"/>
-              </a:rPr>
-              <a:t>      (associar o seu repositório LOCAL com o REMOTO)</a:t>
-            </a:r>
-          </a:p>
-          <a:p>
-            <a:pPr marL="0" indent="0" algn="just">
-              <a:buNone/>
-            </a:pPr>
-            <a:r>
-              <a:rPr lang="pt-BR" sz="2000" dirty="0">
-                <a:latin typeface="Times New Roman" panose="02020603050405020304" pitchFamily="18" charset="0"/>
-                <a:cs typeface="Times New Roman" panose="02020603050405020304" pitchFamily="18" charset="0"/>
-              </a:rPr>
-              <a:t>13. </a:t>
-            </a:r>
-            <a:r>
-              <a:rPr lang="pt-BR" sz="2000" b="1" dirty="0" err="1">
-                <a:solidFill>
-                  <a:srgbClr val="FF0000"/>
-                </a:solidFill>
-                <a:latin typeface="Times New Roman" panose="02020603050405020304" pitchFamily="18" charset="0"/>
-                <a:cs typeface="Times New Roman" panose="02020603050405020304" pitchFamily="18" charset="0"/>
-              </a:rPr>
-              <a:t>git</a:t>
-            </a:r>
-            <a:r>
-              <a:rPr lang="pt-BR" sz="2000" b="1" dirty="0">
-                <a:solidFill>
-                  <a:srgbClr val="FF0000"/>
-                </a:solidFill>
-                <a:latin typeface="Times New Roman" panose="02020603050405020304" pitchFamily="18" charset="0"/>
-                <a:cs typeface="Times New Roman" panose="02020603050405020304" pitchFamily="18" charset="0"/>
-              </a:rPr>
-              <a:t> </a:t>
-            </a:r>
-            <a:r>
-              <a:rPr lang="pt-BR" sz="2000" b="1" dirty="0" err="1">
-                <a:solidFill>
-                  <a:srgbClr val="FF0000"/>
-                </a:solidFill>
-                <a:latin typeface="Times New Roman" panose="02020603050405020304" pitchFamily="18" charset="0"/>
-                <a:cs typeface="Times New Roman" panose="02020603050405020304" pitchFamily="18" charset="0"/>
-              </a:rPr>
-              <a:t>push</a:t>
-            </a:r>
-            <a:r>
-              <a:rPr lang="pt-BR" sz="2000" b="1" dirty="0">
-                <a:solidFill>
-                  <a:srgbClr val="FF0000"/>
-                </a:solidFill>
-                <a:latin typeface="Times New Roman" panose="02020603050405020304" pitchFamily="18" charset="0"/>
-                <a:cs typeface="Times New Roman" panose="02020603050405020304" pitchFamily="18" charset="0"/>
-              </a:rPr>
-              <a:t> -u </a:t>
-            </a:r>
-            <a:r>
-              <a:rPr lang="pt-BR" sz="2000" b="1" dirty="0" err="1">
-                <a:solidFill>
-                  <a:srgbClr val="FF0000"/>
-                </a:solidFill>
-                <a:latin typeface="Times New Roman" panose="02020603050405020304" pitchFamily="18" charset="0"/>
-                <a:cs typeface="Times New Roman" panose="02020603050405020304" pitchFamily="18" charset="0"/>
-              </a:rPr>
-              <a:t>origin</a:t>
-            </a:r>
-            <a:r>
-              <a:rPr lang="pt-BR" sz="2000" b="1" dirty="0">
-                <a:solidFill>
-                  <a:srgbClr val="FF0000"/>
-                </a:solidFill>
-                <a:latin typeface="Times New Roman" panose="02020603050405020304" pitchFamily="18" charset="0"/>
-                <a:cs typeface="Times New Roman" panose="02020603050405020304" pitchFamily="18" charset="0"/>
-              </a:rPr>
-              <a:t> master</a:t>
-            </a:r>
-            <a:r>
-              <a:rPr lang="pt-BR" sz="2000" dirty="0">
-                <a:latin typeface="Times New Roman" panose="02020603050405020304" pitchFamily="18" charset="0"/>
-                <a:cs typeface="Times New Roman" panose="02020603050405020304" pitchFamily="18" charset="0"/>
-              </a:rPr>
-              <a:t> (sincronizar o repositório LOCAL com o repositório REMOTO, lembre-se, deve existir pelo menos um arquivo para sincronizar, </a:t>
-            </a:r>
-            <a:r>
-              <a:rPr lang="pt-BR" sz="2000" b="1" dirty="0">
-                <a:latin typeface="Times New Roman" panose="02020603050405020304" pitchFamily="18" charset="0"/>
-                <a:cs typeface="Times New Roman" panose="02020603050405020304" pitchFamily="18" charset="0"/>
-              </a:rPr>
-              <a:t>no caso, README.md</a:t>
-            </a:r>
-            <a:r>
-              <a:rPr lang="pt-BR" sz="2000" dirty="0">
-                <a:latin typeface="Times New Roman" panose="02020603050405020304" pitchFamily="18" charset="0"/>
-                <a:cs typeface="Times New Roman" panose="02020603050405020304" pitchFamily="18" charset="0"/>
-              </a:rPr>
-              <a:t>)</a:t>
-            </a:r>
-          </a:p>
-          <a:p>
-            <a:pPr marL="0" indent="0" algn="just">
-              <a:buNone/>
-            </a:pPr>
-            <a:r>
-              <a:rPr lang="pt-BR" sz="2000" b="1">
-                <a:solidFill>
-                  <a:srgbClr val="FF0000"/>
-                </a:solidFill>
-                <a:latin typeface="Times New Roman" panose="02020603050405020304" pitchFamily="18" charset="0"/>
-                <a:cs typeface="Times New Roman" panose="02020603050405020304" pitchFamily="18" charset="0"/>
-              </a:rPr>
-              <a:t>Atenção</a:t>
-            </a:r>
-            <a:r>
-              <a:rPr lang="pt-BR" sz="2000">
-                <a:latin typeface="Times New Roman" panose="02020603050405020304" pitchFamily="18" charset="0"/>
-                <a:cs typeface="Times New Roman" panose="02020603050405020304" pitchFamily="18" charset="0"/>
-              </a:rPr>
-              <a:t>: </a:t>
-            </a:r>
-            <a:r>
-              <a:rPr lang="pt-BR" sz="2000" b="1" dirty="0" err="1">
-                <a:solidFill>
-                  <a:srgbClr val="FF0000"/>
-                </a:solidFill>
-                <a:latin typeface="Times New Roman" panose="02020603050405020304" pitchFamily="18" charset="0"/>
-                <a:cs typeface="Times New Roman" panose="02020603050405020304" pitchFamily="18" charset="0"/>
-              </a:rPr>
-              <a:t>Branch</a:t>
-            </a:r>
-            <a:r>
-              <a:rPr lang="pt-BR" sz="2000" b="1" dirty="0">
-                <a:solidFill>
-                  <a:srgbClr val="FF0000"/>
-                </a:solidFill>
-                <a:latin typeface="Times New Roman" panose="02020603050405020304" pitchFamily="18" charset="0"/>
-                <a:cs typeface="Times New Roman" panose="02020603050405020304" pitchFamily="18" charset="0"/>
-              </a:rPr>
-              <a:t> </a:t>
-            </a:r>
-            <a:r>
-              <a:rPr lang="pt-BR" sz="2000" b="1" dirty="0">
-                <a:solidFill>
-                  <a:srgbClr val="0070C0"/>
-                </a:solidFill>
-                <a:latin typeface="Times New Roman" panose="02020603050405020304" pitchFamily="18" charset="0"/>
-                <a:cs typeface="Times New Roman" panose="02020603050405020304" pitchFamily="18" charset="0"/>
-              </a:rPr>
-              <a:t>master ou </a:t>
-            </a:r>
-            <a:r>
-              <a:rPr lang="pt-BR" sz="2000" b="1" dirty="0" err="1">
-                <a:solidFill>
-                  <a:srgbClr val="0070C0"/>
-                </a:solidFill>
-                <a:latin typeface="Times New Roman" panose="02020603050405020304" pitchFamily="18" charset="0"/>
-                <a:cs typeface="Times New Roman" panose="02020603050405020304" pitchFamily="18" charset="0"/>
-              </a:rPr>
-              <a:t>main</a:t>
-            </a:r>
-            <a:r>
-              <a:rPr lang="pt-BR" sz="2000" b="1" dirty="0">
-                <a:solidFill>
-                  <a:srgbClr val="0070C0"/>
-                </a:solidFill>
-                <a:latin typeface="Times New Roman" panose="02020603050405020304" pitchFamily="18" charset="0"/>
-                <a:cs typeface="Times New Roman" panose="02020603050405020304" pitchFamily="18" charset="0"/>
-              </a:rPr>
-              <a:t>, </a:t>
-            </a:r>
-            <a:r>
-              <a:rPr lang="pt-BR" sz="2000" dirty="0">
-                <a:latin typeface="Times New Roman" panose="02020603050405020304" pitchFamily="18" charset="0"/>
-                <a:cs typeface="Times New Roman" panose="02020603050405020304" pitchFamily="18" charset="0"/>
-              </a:rPr>
-              <a:t>aonde será </a:t>
-            </a:r>
-            <a:r>
-              <a:rPr lang="pt-BR" sz="2000" dirty="0" err="1">
-                <a:latin typeface="Times New Roman" panose="02020603050405020304" pitchFamily="18" charset="0"/>
-                <a:cs typeface="Times New Roman" panose="02020603050405020304" pitchFamily="18" charset="0"/>
-              </a:rPr>
-              <a:t>excutado</a:t>
-            </a:r>
-            <a:r>
-              <a:rPr lang="pt-BR" sz="2000" dirty="0">
-                <a:latin typeface="Times New Roman" panose="02020603050405020304" pitchFamily="18" charset="0"/>
-                <a:cs typeface="Times New Roman" panose="02020603050405020304" pitchFamily="18" charset="0"/>
-              </a:rPr>
-              <a:t> o, </a:t>
-            </a:r>
-            <a:r>
-              <a:rPr lang="pt-BR" sz="2000" b="1" dirty="0" err="1">
-                <a:solidFill>
-                  <a:srgbClr val="FF0000"/>
-                </a:solidFill>
-                <a:latin typeface="Times New Roman" panose="02020603050405020304" pitchFamily="18" charset="0"/>
-                <a:cs typeface="Times New Roman" panose="02020603050405020304" pitchFamily="18" charset="0"/>
-              </a:rPr>
-              <a:t>git</a:t>
-            </a:r>
-            <a:r>
-              <a:rPr lang="pt-BR" sz="2000" b="1" dirty="0">
-                <a:solidFill>
-                  <a:srgbClr val="FF0000"/>
-                </a:solidFill>
-                <a:latin typeface="Times New Roman" panose="02020603050405020304" pitchFamily="18" charset="0"/>
-                <a:cs typeface="Times New Roman" panose="02020603050405020304" pitchFamily="18" charset="0"/>
-              </a:rPr>
-              <a:t> </a:t>
-            </a:r>
-            <a:r>
-              <a:rPr lang="pt-BR" sz="2000" b="1" dirty="0" err="1">
-                <a:solidFill>
-                  <a:srgbClr val="FF0000"/>
-                </a:solidFill>
-                <a:latin typeface="Times New Roman" panose="02020603050405020304" pitchFamily="18" charset="0"/>
-                <a:cs typeface="Times New Roman" panose="02020603050405020304" pitchFamily="18" charset="0"/>
-              </a:rPr>
-              <a:t>push</a:t>
-            </a:r>
-            <a:r>
-              <a:rPr lang="pt-BR" sz="2000" b="1" dirty="0">
-                <a:solidFill>
-                  <a:srgbClr val="FF0000"/>
-                </a:solidFill>
-                <a:latin typeface="Times New Roman" panose="02020603050405020304" pitchFamily="18" charset="0"/>
-                <a:cs typeface="Times New Roman" panose="02020603050405020304" pitchFamily="18" charset="0"/>
-              </a:rPr>
-              <a:t> –u origin</a:t>
-            </a:r>
-            <a:r>
-              <a:rPr lang="pt-BR" sz="2000" dirty="0">
-                <a:latin typeface="Times New Roman" panose="02020603050405020304" pitchFamily="18" charset="0"/>
-                <a:cs typeface="Times New Roman" panose="02020603050405020304" pitchFamily="18" charset="0"/>
-              </a:rPr>
-              <a:t>.</a:t>
-            </a:r>
-            <a:endParaRPr lang="pt-BR" sz="2000" b="1" dirty="0">
+            <a:endParaRPr lang="pt-BR" sz="2400" b="1" dirty="0">
               <a:solidFill>
                 <a:srgbClr val="FF0000"/>
               </a:solidFill>
@@ -6173,12 +5722,140 @@
               <a:cs typeface="Times New Roman" panose="02020603050405020304" pitchFamily="18" charset="0"/>
             </a:endParaRPr>
           </a:p>
+          <a:p>
+            <a:pPr marL="0" indent="0" algn="just">
+              <a:buNone/>
+            </a:pPr>
+            <a:r>
+              <a:rPr lang="pt-BR" sz="2400" b="1" dirty="0">
+                <a:solidFill>
+                  <a:srgbClr val="FF0000"/>
+                </a:solidFill>
+                <a:latin typeface="Times New Roman" panose="02020603050405020304" pitchFamily="18" charset="0"/>
+                <a:cs typeface="Times New Roman" panose="02020603050405020304" pitchFamily="18" charset="0"/>
+              </a:rPr>
+              <a:t>https://github.com/CloudEducationBrazil/TESTEPYTHON.git</a:t>
+            </a:r>
+          </a:p>
+          <a:p>
+            <a:pPr marL="0" indent="0" algn="just">
+              <a:buNone/>
+            </a:pPr>
+            <a:r>
+              <a:rPr lang="pt-BR" sz="2400" dirty="0" err="1">
+                <a:latin typeface="Times New Roman" panose="02020603050405020304" pitchFamily="18" charset="0"/>
+                <a:cs typeface="Times New Roman" panose="02020603050405020304" pitchFamily="18" charset="0"/>
+              </a:rPr>
+              <a:t>git</a:t>
+            </a:r>
+            <a:r>
+              <a:rPr lang="pt-BR" sz="2400" dirty="0">
+                <a:latin typeface="Times New Roman" panose="02020603050405020304" pitchFamily="18" charset="0"/>
+                <a:cs typeface="Times New Roman" panose="02020603050405020304" pitchFamily="18" charset="0"/>
+              </a:rPr>
+              <a:t> </a:t>
+            </a:r>
+            <a:r>
+              <a:rPr lang="pt-BR" sz="2400" dirty="0" err="1">
+                <a:latin typeface="Times New Roman" panose="02020603050405020304" pitchFamily="18" charset="0"/>
+                <a:cs typeface="Times New Roman" panose="02020603050405020304" pitchFamily="18" charset="0"/>
+              </a:rPr>
+              <a:t>push</a:t>
+            </a:r>
+            <a:r>
+              <a:rPr lang="pt-BR" sz="2400" dirty="0">
+                <a:latin typeface="Times New Roman" panose="02020603050405020304" pitchFamily="18" charset="0"/>
+                <a:cs typeface="Times New Roman" panose="02020603050405020304" pitchFamily="18" charset="0"/>
+              </a:rPr>
+              <a:t> -u </a:t>
+            </a:r>
+            <a:r>
+              <a:rPr lang="pt-BR" sz="2400" dirty="0" err="1">
+                <a:latin typeface="Times New Roman" panose="02020603050405020304" pitchFamily="18" charset="0"/>
+                <a:cs typeface="Times New Roman" panose="02020603050405020304" pitchFamily="18" charset="0"/>
+              </a:rPr>
+              <a:t>origin</a:t>
+            </a:r>
+            <a:r>
+              <a:rPr lang="pt-BR" sz="2400" dirty="0">
+                <a:latin typeface="Times New Roman" panose="02020603050405020304" pitchFamily="18" charset="0"/>
+                <a:cs typeface="Times New Roman" panose="02020603050405020304" pitchFamily="18" charset="0"/>
+              </a:rPr>
+              <a:t> master</a:t>
+            </a:r>
+          </a:p>
+          <a:p>
+            <a:pPr marL="0" indent="0" algn="just">
+              <a:buNone/>
+            </a:pPr>
+            <a:r>
+              <a:rPr lang="pt-BR" sz="2400" b="1" dirty="0">
+                <a:solidFill>
+                  <a:srgbClr val="FF0000"/>
+                </a:solidFill>
+                <a:latin typeface="Times New Roman" panose="02020603050405020304" pitchFamily="18" charset="0"/>
+                <a:cs typeface="Times New Roman" panose="02020603050405020304" pitchFamily="18" charset="0"/>
+              </a:rPr>
+              <a:t>	Nota</a:t>
+            </a:r>
+            <a:r>
+              <a:rPr lang="pt-BR" sz="2400" dirty="0">
+                <a:latin typeface="Times New Roman" panose="02020603050405020304" pitchFamily="18" charset="0"/>
+                <a:cs typeface="Times New Roman" panose="02020603050405020304" pitchFamily="18" charset="0"/>
+              </a:rPr>
+              <a:t>: </a:t>
+            </a:r>
+            <a:r>
+              <a:rPr lang="pt-BR" sz="2400" b="1" dirty="0" err="1">
+                <a:latin typeface="Times New Roman" panose="02020603050405020304" pitchFamily="18" charset="0"/>
+                <a:cs typeface="Times New Roman" panose="02020603050405020304" pitchFamily="18" charset="0"/>
+              </a:rPr>
+              <a:t>git</a:t>
+            </a:r>
+            <a:r>
+              <a:rPr lang="pt-BR" sz="2400" b="1" dirty="0">
+                <a:latin typeface="Times New Roman" panose="02020603050405020304" pitchFamily="18" charset="0"/>
+                <a:cs typeface="Times New Roman" panose="02020603050405020304" pitchFamily="18" charset="0"/>
+              </a:rPr>
+              <a:t> status </a:t>
+            </a:r>
+            <a:r>
+              <a:rPr lang="pt-BR" sz="2400" dirty="0">
+                <a:latin typeface="Times New Roman" panose="02020603050405020304" pitchFamily="18" charset="0"/>
+                <a:cs typeface="Times New Roman" panose="02020603050405020304" pitchFamily="18" charset="0"/>
+              </a:rPr>
+              <a:t>(existe status </a:t>
+            </a:r>
+            <a:r>
+              <a:rPr lang="pt-BR" sz="2400" dirty="0" err="1">
+                <a:latin typeface="Times New Roman" panose="02020603050405020304" pitchFamily="18" charset="0"/>
+                <a:cs typeface="Times New Roman" panose="02020603050405020304" pitchFamily="18" charset="0"/>
+              </a:rPr>
+              <a:t>git</a:t>
+            </a:r>
+            <a:r>
+              <a:rPr lang="pt-BR" sz="2400" dirty="0">
+                <a:latin typeface="Times New Roman" panose="02020603050405020304" pitchFamily="18" charset="0"/>
+                <a:cs typeface="Times New Roman" panose="02020603050405020304" pitchFamily="18" charset="0"/>
+              </a:rPr>
+              <a:t>)</a:t>
+            </a:r>
+          </a:p>
+          <a:p>
+            <a:pPr marL="0" indent="0" algn="just">
+              <a:buNone/>
+            </a:pPr>
+            <a:endParaRPr lang="pt-BR" sz="2400" dirty="0">
+              <a:latin typeface="Times New Roman" panose="02020603050405020304" pitchFamily="18" charset="0"/>
+              <a:cs typeface="Times New Roman" panose="02020603050405020304" pitchFamily="18" charset="0"/>
+            </a:endParaRPr>
+          </a:p>
         </p:txBody>
       </p:sp>
     </p:spTree>
     <p:extLst>
       <p:ext uri="{BB962C8B-B14F-4D97-AF65-F5344CB8AC3E}">
-        <p14:creationId xmlns:p14="http://schemas.microsoft.com/office/powerpoint/2010/main" val="2331477641"/>
+        <p14:creationId xmlns:p14="http://schemas.microsoft.com/office/powerpoint/2010/main" val="2102522400"/>
       </p:ext>
     </p:extLst>
   </p:cSld>
@@ -6273,8 +5950,8 @@
         </p:nvSpPr>
         <p:spPr>
           <a:xfrm>
-            <a:off x="142865" y="1200150"/>
-            <a:ext cx="8865056" cy="3797735"/>
+            <a:off x="142865" y="999734"/>
+            <a:ext cx="8865056" cy="3937786"/>
           </a:xfrm>
         </p:spPr>
         <p:txBody>
@@ -6287,69 +5964,199 @@
               <a:buNone/>
             </a:pPr>
             <a:r>
-              <a:rPr lang="pt-BR" sz="2000" b="1" dirty="0">
-                <a:latin typeface="Times New Roman" panose="02020603050405020304" pitchFamily="18" charset="0"/>
-                <a:cs typeface="Times New Roman" panose="02020603050405020304" pitchFamily="18" charset="0"/>
-              </a:rPr>
-              <a:t>Criei um exemplo de projeto TESTEPYTHON no github.com</a:t>
+              <a:rPr lang="pt-BR" sz="3200" dirty="0">
+                <a:latin typeface="Times New Roman" panose="02020603050405020304" pitchFamily="18" charset="0"/>
+                <a:cs typeface="Times New Roman" panose="02020603050405020304" pitchFamily="18" charset="0"/>
+              </a:rPr>
+              <a:t>5. </a:t>
+            </a:r>
+            <a:r>
+              <a:rPr lang="pt-BR" sz="3200" b="1" dirty="0">
+                <a:latin typeface="Times New Roman" panose="02020603050405020304" pitchFamily="18" charset="0"/>
+                <a:cs typeface="Times New Roman" panose="02020603050405020304" pitchFamily="18" charset="0"/>
+              </a:rPr>
+              <a:t>Criar</a:t>
+            </a:r>
+            <a:r>
+              <a:rPr lang="pt-BR" sz="3200" dirty="0">
+                <a:latin typeface="Times New Roman" panose="02020603050405020304" pitchFamily="18" charset="0"/>
+                <a:cs typeface="Times New Roman" panose="02020603050405020304" pitchFamily="18" charset="0"/>
+              </a:rPr>
+              <a:t> uma </a:t>
+            </a:r>
+            <a:r>
+              <a:rPr lang="pt-BR" sz="3200" b="1" dirty="0">
+                <a:latin typeface="Times New Roman" panose="02020603050405020304" pitchFamily="18" charset="0"/>
+                <a:cs typeface="Times New Roman" panose="02020603050405020304" pitchFamily="18" charset="0"/>
+              </a:rPr>
+              <a:t>pasta no Windows</a:t>
+            </a:r>
+            <a:r>
+              <a:rPr lang="pt-BR" sz="3200" dirty="0">
+                <a:latin typeface="Times New Roman" panose="02020603050405020304" pitchFamily="18" charset="0"/>
+                <a:cs typeface="Times New Roman" panose="02020603050405020304" pitchFamily="18" charset="0"/>
+              </a:rPr>
+              <a:t> </a:t>
             </a:r>
           </a:p>
           <a:p>
             <a:pPr marL="0" indent="0" algn="just">
               <a:buNone/>
             </a:pPr>
-            <a:endParaRPr lang="pt-BR" sz="2000" dirty="0">
-              <a:latin typeface="Times New Roman" panose="02020603050405020304" pitchFamily="18" charset="0"/>
-              <a:cs typeface="Times New Roman" panose="02020603050405020304" pitchFamily="18" charset="0"/>
-            </a:endParaRPr>
+            <a:r>
+              <a:rPr lang="pt-BR" sz="3200" dirty="0">
+                <a:latin typeface="Times New Roman" panose="02020603050405020304" pitchFamily="18" charset="0"/>
+                <a:cs typeface="Times New Roman" panose="02020603050405020304" pitchFamily="18" charset="0"/>
+              </a:rPr>
+              <a:t>    (</a:t>
+            </a:r>
+            <a:r>
+              <a:rPr lang="pt-BR" sz="3200" b="1" dirty="0">
+                <a:solidFill>
+                  <a:srgbClr val="FF0000"/>
+                </a:solidFill>
+                <a:latin typeface="Times New Roman" panose="02020603050405020304" pitchFamily="18" charset="0"/>
+                <a:cs typeface="Times New Roman" panose="02020603050405020304" pitchFamily="18" charset="0"/>
+              </a:rPr>
+              <a:t>sugestão pasta: </a:t>
+            </a:r>
+            <a:r>
+              <a:rPr lang="pt-BR" sz="3200" b="1" dirty="0" err="1">
+                <a:solidFill>
+                  <a:srgbClr val="FF0000"/>
+                </a:solidFill>
+                <a:latin typeface="Times New Roman" panose="02020603050405020304" pitchFamily="18" charset="0"/>
+                <a:cs typeface="Times New Roman" panose="02020603050405020304" pitchFamily="18" charset="0"/>
+              </a:rPr>
+              <a:t>CursoPython</a:t>
+            </a:r>
+            <a:r>
+              <a:rPr lang="pt-BR" sz="3200" dirty="0">
+                <a:latin typeface="Times New Roman" panose="02020603050405020304" pitchFamily="18" charset="0"/>
+                <a:cs typeface="Times New Roman" panose="02020603050405020304" pitchFamily="18" charset="0"/>
+              </a:rPr>
+              <a:t>)</a:t>
+            </a:r>
           </a:p>
           <a:p>
             <a:pPr marL="0" indent="0" algn="just">
               <a:buNone/>
             </a:pPr>
             <a:r>
-              <a:rPr lang="pt-BR" sz="2000" dirty="0" err="1">
+              <a:rPr lang="pt-BR" sz="3200" dirty="0">
+                <a:latin typeface="Times New Roman" panose="02020603050405020304" pitchFamily="18" charset="0"/>
+                <a:cs typeface="Times New Roman" panose="02020603050405020304" pitchFamily="18" charset="0"/>
+              </a:rPr>
+              <a:t>6. Entrar no </a:t>
+            </a:r>
+            <a:r>
+              <a:rPr lang="pt-BR" sz="3200" b="1" dirty="0">
+                <a:latin typeface="Times New Roman" panose="02020603050405020304" pitchFamily="18" charset="0"/>
+                <a:cs typeface="Times New Roman" panose="02020603050405020304" pitchFamily="18" charset="0"/>
+              </a:rPr>
+              <a:t>modo </a:t>
+            </a:r>
+            <a:r>
+              <a:rPr lang="pt-BR" sz="3200" b="1" dirty="0" err="1">
+                <a:latin typeface="Times New Roman" panose="02020603050405020304" pitchFamily="18" charset="0"/>
+                <a:cs typeface="Times New Roman" panose="02020603050405020304" pitchFamily="18" charset="0"/>
+              </a:rPr>
+              <a:t>shell</a:t>
+            </a:r>
+            <a:r>
+              <a:rPr lang="pt-BR" sz="3200" dirty="0">
+                <a:latin typeface="Times New Roman" panose="02020603050405020304" pitchFamily="18" charset="0"/>
+                <a:cs typeface="Times New Roman" panose="02020603050405020304" pitchFamily="18" charset="0"/>
+              </a:rPr>
+              <a:t> </a:t>
+            </a:r>
+          </a:p>
+          <a:p>
+            <a:pPr marL="0" indent="0" algn="just">
+              <a:buNone/>
+            </a:pPr>
+            <a:r>
+              <a:rPr lang="pt-BR" sz="3200" dirty="0">
+                <a:latin typeface="Times New Roman" panose="02020603050405020304" pitchFamily="18" charset="0"/>
+                <a:cs typeface="Times New Roman" panose="02020603050405020304" pitchFamily="18" charset="0"/>
+              </a:rPr>
+              <a:t>   (botão direito do mouse </a:t>
+            </a:r>
+            <a:r>
+              <a:rPr lang="pt-BR" sz="3200" b="1" dirty="0" err="1">
+                <a:solidFill>
+                  <a:srgbClr val="FF0000"/>
+                </a:solidFill>
                 <a:latin typeface="Times New Roman" panose="02020603050405020304" pitchFamily="18" charset="0"/>
                 <a:cs typeface="Times New Roman" panose="02020603050405020304" pitchFamily="18" charset="0"/>
               </a:rPr>
               <a:t>git</a:t>
             </a:r>
             <a:r>
-              <a:rPr lang="pt-BR" sz="2000" dirty="0">
+              <a:rPr lang="pt-BR" sz="3200" b="1" dirty="0">
+                <a:solidFill>
+                  <a:srgbClr val="FF0000"/>
+                </a:solidFill>
                 <a:latin typeface="Times New Roman" panose="02020603050405020304" pitchFamily="18" charset="0"/>
                 <a:cs typeface="Times New Roman" panose="02020603050405020304" pitchFamily="18" charset="0"/>
               </a:rPr>
               <a:t> </a:t>
             </a:r>
             <a:r>
-              <a:rPr lang="pt-BR" sz="2000" dirty="0" err="1">
-                <a:latin typeface="Times New Roman" panose="02020603050405020304" pitchFamily="18" charset="0"/>
-                <a:cs typeface="Times New Roman" panose="02020603050405020304" pitchFamily="18" charset="0"/>
-              </a:rPr>
-              <a:t>init</a:t>
-            </a:r>
-            <a:endParaRPr lang="pt-BR" sz="2000" dirty="0">
-              <a:latin typeface="Times New Roman" panose="02020603050405020304" pitchFamily="18" charset="0"/>
-              <a:cs typeface="Times New Roman" panose="02020603050405020304" pitchFamily="18" charset="0"/>
-            </a:endParaRPr>
+              <a:rPr lang="pt-BR" sz="3200" b="1" dirty="0" err="1">
+                <a:solidFill>
+                  <a:srgbClr val="FF0000"/>
+                </a:solidFill>
+                <a:latin typeface="Times New Roman" panose="02020603050405020304" pitchFamily="18" charset="0"/>
+                <a:cs typeface="Times New Roman" panose="02020603050405020304" pitchFamily="18" charset="0"/>
+              </a:rPr>
+              <a:t>bash</a:t>
+            </a:r>
+            <a:r>
+              <a:rPr lang="pt-BR" sz="3200" b="1" dirty="0">
+                <a:solidFill>
+                  <a:srgbClr val="FF0000"/>
+                </a:solidFill>
+                <a:latin typeface="Times New Roman" panose="02020603050405020304" pitchFamily="18" charset="0"/>
+                <a:cs typeface="Times New Roman" panose="02020603050405020304" pitchFamily="18" charset="0"/>
+              </a:rPr>
+              <a:t> </a:t>
+            </a:r>
+            <a:r>
+              <a:rPr lang="pt-BR" sz="3200" b="1" dirty="0" err="1">
+                <a:solidFill>
+                  <a:srgbClr val="FF0000"/>
+                </a:solidFill>
+                <a:latin typeface="Times New Roman" panose="02020603050405020304" pitchFamily="18" charset="0"/>
+                <a:cs typeface="Times New Roman" panose="02020603050405020304" pitchFamily="18" charset="0"/>
+              </a:rPr>
+              <a:t>here</a:t>
+            </a:r>
+            <a:r>
+              <a:rPr lang="pt-BR" sz="3200" dirty="0">
+                <a:latin typeface="Times New Roman" panose="02020603050405020304" pitchFamily="18" charset="0"/>
+                <a:cs typeface="Times New Roman" panose="02020603050405020304" pitchFamily="18" charset="0"/>
+              </a:rPr>
+              <a:t>)</a:t>
+            </a:r>
           </a:p>
           <a:p>
             <a:pPr marL="0" indent="0" algn="just">
               <a:buNone/>
             </a:pPr>
             <a:r>
-              <a:rPr lang="pt-BR" sz="2000" dirty="0" err="1">
-                <a:latin typeface="Times New Roman" panose="02020603050405020304" pitchFamily="18" charset="0"/>
-                <a:cs typeface="Times New Roman" panose="02020603050405020304" pitchFamily="18" charset="0"/>
-              </a:rPr>
-              <a:t>echo</a:t>
-            </a:r>
-            <a:r>
-              <a:rPr lang="pt-BR" sz="2000" dirty="0">
-                <a:latin typeface="Times New Roman" panose="02020603050405020304" pitchFamily="18" charset="0"/>
-                <a:cs typeface="Times New Roman" panose="02020603050405020304" pitchFamily="18" charset="0"/>
-              </a:rPr>
-              <a:t> "# TESTEPYTHON" &gt;&gt; README.md</a:t>
+              <a:rPr lang="pt-BR" sz="3200" dirty="0">
+                <a:latin typeface="Times New Roman" panose="02020603050405020304" pitchFamily="18" charset="0"/>
+                <a:cs typeface="Times New Roman" panose="02020603050405020304" pitchFamily="18" charset="0"/>
+              </a:rPr>
+              <a:t>7. Confirmar se está dentro da </a:t>
+            </a:r>
+            <a:r>
+              <a:rPr lang="pt-BR" sz="3200" b="1" dirty="0">
+                <a:latin typeface="Times New Roman" panose="02020603050405020304" pitchFamily="18" charset="0"/>
+                <a:cs typeface="Times New Roman" panose="02020603050405020304" pitchFamily="18" charset="0"/>
+              </a:rPr>
+              <a:t>pasta </a:t>
             </a:r>
           </a:p>
           <a:p>
@@ -6357,284 +6164,33 @@
               <a:buNone/>
             </a:pPr>
             <a:r>
-              <a:rPr lang="pt-BR" sz="2000" dirty="0" err="1">
-                <a:latin typeface="Times New Roman" panose="02020603050405020304" pitchFamily="18" charset="0"/>
-                <a:cs typeface="Times New Roman" panose="02020603050405020304" pitchFamily="18" charset="0"/>
-              </a:rPr>
-              <a:t>git</a:t>
-            </a:r>
-            <a:r>
-              <a:rPr lang="pt-BR" sz="2000" dirty="0">
-                <a:latin typeface="Times New Roman" panose="02020603050405020304" pitchFamily="18" charset="0"/>
-                <a:cs typeface="Times New Roman" panose="02020603050405020304" pitchFamily="18" charset="0"/>
-              </a:rPr>
-              <a:t> </a:t>
-            </a:r>
-            <a:r>
-              <a:rPr lang="pt-BR" sz="2000" dirty="0" err="1">
-                <a:latin typeface="Times New Roman" panose="02020603050405020304" pitchFamily="18" charset="0"/>
-                <a:cs typeface="Times New Roman" panose="02020603050405020304" pitchFamily="18" charset="0"/>
-              </a:rPr>
-              <a:t>add</a:t>
-            </a:r>
-            <a:r>
-              <a:rPr lang="pt-BR" sz="2000" dirty="0">
-                <a:latin typeface="Times New Roman" panose="02020603050405020304" pitchFamily="18" charset="0"/>
-                <a:cs typeface="Times New Roman" panose="02020603050405020304" pitchFamily="18" charset="0"/>
-              </a:rPr>
-              <a:t> README.md</a:t>
-            </a:r>
-          </a:p>
-          <a:p>
-            <a:pPr marL="0" indent="0" algn="just">
-              <a:buNone/>
-            </a:pPr>
-            <a:r>
-              <a:rPr lang="pt-BR" sz="2000" dirty="0" err="1">
-                <a:latin typeface="Times New Roman" panose="02020603050405020304" pitchFamily="18" charset="0"/>
-                <a:cs typeface="Times New Roman" panose="02020603050405020304" pitchFamily="18" charset="0"/>
-              </a:rPr>
-              <a:t>git</a:t>
-            </a:r>
-            <a:r>
-              <a:rPr lang="pt-BR" sz="2000" dirty="0">
-                <a:latin typeface="Times New Roman" panose="02020603050405020304" pitchFamily="18" charset="0"/>
-                <a:cs typeface="Times New Roman" panose="02020603050405020304" pitchFamily="18" charset="0"/>
-              </a:rPr>
-              <a:t> </a:t>
-            </a:r>
-            <a:r>
-              <a:rPr lang="pt-BR" sz="2000" dirty="0" err="1">
-                <a:latin typeface="Times New Roman" panose="02020603050405020304" pitchFamily="18" charset="0"/>
-                <a:cs typeface="Times New Roman" panose="02020603050405020304" pitchFamily="18" charset="0"/>
-              </a:rPr>
-              <a:t>commit</a:t>
-            </a:r>
-            <a:r>
-              <a:rPr lang="pt-BR" sz="2000" dirty="0">
-                <a:latin typeface="Times New Roman" panose="02020603050405020304" pitchFamily="18" charset="0"/>
-                <a:cs typeface="Times New Roman" panose="02020603050405020304" pitchFamily="18" charset="0"/>
-              </a:rPr>
-              <a:t> -m "</a:t>
-            </a:r>
-            <a:r>
-              <a:rPr lang="pt-BR" sz="2000" dirty="0" err="1">
-                <a:latin typeface="Times New Roman" panose="02020603050405020304" pitchFamily="18" charset="0"/>
-                <a:cs typeface="Times New Roman" panose="02020603050405020304" pitchFamily="18" charset="0"/>
-              </a:rPr>
-              <a:t>first</a:t>
-            </a:r>
-            <a:r>
-              <a:rPr lang="pt-BR" sz="2000" dirty="0">
-                <a:latin typeface="Times New Roman" panose="02020603050405020304" pitchFamily="18" charset="0"/>
-                <a:cs typeface="Times New Roman" panose="02020603050405020304" pitchFamily="18" charset="0"/>
-              </a:rPr>
-              <a:t> </a:t>
-            </a:r>
-            <a:r>
-              <a:rPr lang="pt-BR" sz="2000" dirty="0" err="1">
-                <a:latin typeface="Times New Roman" panose="02020603050405020304" pitchFamily="18" charset="0"/>
-                <a:cs typeface="Times New Roman" panose="02020603050405020304" pitchFamily="18" charset="0"/>
-              </a:rPr>
-              <a:t>commit</a:t>
-            </a:r>
-            <a:r>
-              <a:rPr lang="pt-BR" sz="2000" dirty="0">
-                <a:latin typeface="Times New Roman" panose="02020603050405020304" pitchFamily="18" charset="0"/>
-                <a:cs typeface="Times New Roman" panose="02020603050405020304" pitchFamily="18" charset="0"/>
-              </a:rPr>
-              <a:t>"</a:t>
-            </a:r>
-          </a:p>
-          <a:p>
-            <a:pPr marL="0" indent="0" algn="just">
-              <a:buNone/>
-            </a:pPr>
-            <a:r>
-              <a:rPr lang="pt-BR" sz="2000" dirty="0" err="1">
-                <a:latin typeface="Times New Roman" panose="02020603050405020304" pitchFamily="18" charset="0"/>
-                <a:cs typeface="Times New Roman" panose="02020603050405020304" pitchFamily="18" charset="0"/>
-              </a:rPr>
-              <a:t>git</a:t>
-            </a:r>
-            <a:r>
-              <a:rPr lang="pt-BR" sz="2000" dirty="0">
-                <a:latin typeface="Times New Roman" panose="02020603050405020304" pitchFamily="18" charset="0"/>
-                <a:cs typeface="Times New Roman" panose="02020603050405020304" pitchFamily="18" charset="0"/>
-              </a:rPr>
-              <a:t> </a:t>
-            </a:r>
-            <a:r>
-              <a:rPr lang="pt-BR" sz="2000" dirty="0" err="1">
-                <a:latin typeface="Times New Roman" panose="02020603050405020304" pitchFamily="18" charset="0"/>
-                <a:cs typeface="Times New Roman" panose="02020603050405020304" pitchFamily="18" charset="0"/>
-              </a:rPr>
-              <a:t>remote</a:t>
-            </a:r>
-            <a:r>
-              <a:rPr lang="pt-BR" sz="2000" dirty="0">
-                <a:latin typeface="Times New Roman" panose="02020603050405020304" pitchFamily="18" charset="0"/>
-                <a:cs typeface="Times New Roman" panose="02020603050405020304" pitchFamily="18" charset="0"/>
-              </a:rPr>
-              <a:t> </a:t>
-            </a:r>
-            <a:r>
-              <a:rPr lang="pt-BR" sz="2000" dirty="0" err="1">
-                <a:latin typeface="Times New Roman" panose="02020603050405020304" pitchFamily="18" charset="0"/>
-                <a:cs typeface="Times New Roman" panose="02020603050405020304" pitchFamily="18" charset="0"/>
-              </a:rPr>
-              <a:t>add</a:t>
-            </a:r>
-            <a:r>
-              <a:rPr lang="pt-BR" sz="2000" dirty="0">
-                <a:latin typeface="Times New Roman" panose="02020603050405020304" pitchFamily="18" charset="0"/>
-                <a:cs typeface="Times New Roman" panose="02020603050405020304" pitchFamily="18" charset="0"/>
-              </a:rPr>
-              <a:t> </a:t>
-            </a:r>
-            <a:r>
-              <a:rPr lang="pt-BR" sz="2000" dirty="0" err="1">
-                <a:latin typeface="Times New Roman" panose="02020603050405020304" pitchFamily="18" charset="0"/>
-                <a:cs typeface="Times New Roman" panose="02020603050405020304" pitchFamily="18" charset="0"/>
-              </a:rPr>
-              <a:t>origin</a:t>
-            </a:r>
-            <a:r>
-              <a:rPr lang="pt-BR" sz="2000" dirty="0">
-                <a:latin typeface="Times New Roman" panose="02020603050405020304" pitchFamily="18" charset="0"/>
-                <a:cs typeface="Times New Roman" panose="02020603050405020304" pitchFamily="18" charset="0"/>
-              </a:rPr>
-              <a:t> https://github.com/CloudEducationBrazil/TESTEPYTHON.git</a:t>
-            </a:r>
-          </a:p>
-          <a:p>
-            <a:pPr marL="0" indent="0" algn="just">
-              <a:buNone/>
-            </a:pPr>
-            <a:r>
-              <a:rPr lang="pt-BR" sz="2000" dirty="0" err="1">
-                <a:latin typeface="Times New Roman" panose="02020603050405020304" pitchFamily="18" charset="0"/>
-                <a:cs typeface="Times New Roman" panose="02020603050405020304" pitchFamily="18" charset="0"/>
-              </a:rPr>
-              <a:t>git</a:t>
-            </a:r>
-            <a:r>
-              <a:rPr lang="pt-BR" sz="2000" dirty="0">
-                <a:latin typeface="Times New Roman" panose="02020603050405020304" pitchFamily="18" charset="0"/>
-                <a:cs typeface="Times New Roman" panose="02020603050405020304" pitchFamily="18" charset="0"/>
-              </a:rPr>
-              <a:t> </a:t>
-            </a:r>
-            <a:r>
-              <a:rPr lang="pt-BR" sz="2000" dirty="0" err="1">
-                <a:latin typeface="Times New Roman" panose="02020603050405020304" pitchFamily="18" charset="0"/>
-                <a:cs typeface="Times New Roman" panose="02020603050405020304" pitchFamily="18" charset="0"/>
-              </a:rPr>
-              <a:t>push</a:t>
-            </a:r>
-            <a:r>
-              <a:rPr lang="pt-BR" sz="2000" dirty="0">
-                <a:latin typeface="Times New Roman" panose="02020603050405020304" pitchFamily="18" charset="0"/>
-                <a:cs typeface="Times New Roman" panose="02020603050405020304" pitchFamily="18" charset="0"/>
-              </a:rPr>
-              <a:t> -u </a:t>
-            </a:r>
-            <a:r>
-              <a:rPr lang="pt-BR" sz="2000" dirty="0" err="1">
-                <a:latin typeface="Times New Roman" panose="02020603050405020304" pitchFamily="18" charset="0"/>
-                <a:cs typeface="Times New Roman" panose="02020603050405020304" pitchFamily="18" charset="0"/>
-              </a:rPr>
-              <a:t>origin</a:t>
-            </a:r>
-            <a:r>
-              <a:rPr lang="pt-BR" sz="2000" dirty="0">
-                <a:latin typeface="Times New Roman" panose="02020603050405020304" pitchFamily="18" charset="0"/>
-                <a:cs typeface="Times New Roman" panose="02020603050405020304" pitchFamily="18" charset="0"/>
-              </a:rPr>
-              <a:t> master</a:t>
-            </a:r>
-          </a:p>
-          <a:p>
-            <a:pPr marL="0" indent="0" algn="just">
-              <a:buNone/>
-            </a:pPr>
-            <a:endParaRPr lang="pt-BR" sz="2000" dirty="0">
-              <a:latin typeface="Times New Roman" panose="02020603050405020304" pitchFamily="18" charset="0"/>
-              <a:cs typeface="Times New Roman" panose="02020603050405020304" pitchFamily="18" charset="0"/>
-            </a:endParaRPr>
-          </a:p>
-          <a:p>
-            <a:pPr marL="0" indent="0" algn="just">
-              <a:buNone/>
-            </a:pPr>
-            <a:r>
-              <a:rPr lang="pt-BR" sz="2000" b="1" dirty="0">
-                <a:solidFill>
-                  <a:srgbClr val="FF0000"/>
-                </a:solidFill>
-                <a:latin typeface="Times New Roman" panose="02020603050405020304" pitchFamily="18" charset="0"/>
-                <a:cs typeface="Times New Roman" panose="02020603050405020304" pitchFamily="18" charset="0"/>
-              </a:rPr>
-              <a:t>Nota</a:t>
-            </a:r>
-            <a:r>
-              <a:rPr lang="pt-BR" sz="2000" dirty="0">
-                <a:latin typeface="Times New Roman" panose="02020603050405020304" pitchFamily="18" charset="0"/>
-                <a:cs typeface="Times New Roman" panose="02020603050405020304" pitchFamily="18" charset="0"/>
-              </a:rPr>
-              <a:t>: </a:t>
-            </a:r>
-            <a:r>
-              <a:rPr lang="pt-BR" sz="2000" b="1" dirty="0" err="1">
-                <a:latin typeface="Times New Roman" panose="02020603050405020304" pitchFamily="18" charset="0"/>
-                <a:cs typeface="Times New Roman" panose="02020603050405020304" pitchFamily="18" charset="0"/>
-              </a:rPr>
-              <a:t>git</a:t>
-            </a:r>
-            <a:r>
-              <a:rPr lang="pt-BR" sz="2000" b="1" dirty="0">
-                <a:latin typeface="Times New Roman" panose="02020603050405020304" pitchFamily="18" charset="0"/>
-                <a:cs typeface="Times New Roman" panose="02020603050405020304" pitchFamily="18" charset="0"/>
-              </a:rPr>
-              <a:t> status </a:t>
-            </a:r>
-            <a:r>
-              <a:rPr lang="pt-BR" sz="2000" dirty="0">
-                <a:latin typeface="Times New Roman" panose="02020603050405020304" pitchFamily="18" charset="0"/>
-                <a:cs typeface="Times New Roman" panose="02020603050405020304" pitchFamily="18" charset="0"/>
-              </a:rPr>
-              <a:t>(existe status </a:t>
-            </a:r>
-            <a:r>
-              <a:rPr lang="pt-BR" sz="2000" dirty="0" err="1">
-                <a:latin typeface="Times New Roman" panose="02020603050405020304" pitchFamily="18" charset="0"/>
-                <a:cs typeface="Times New Roman" panose="02020603050405020304" pitchFamily="18" charset="0"/>
-              </a:rPr>
-              <a:t>git</a:t>
-            </a:r>
-            <a:r>
-              <a:rPr lang="pt-BR" sz="2000" dirty="0">
+              <a:rPr lang="pt-BR" sz="3200" b="1" dirty="0">
+                <a:latin typeface="Times New Roman" panose="02020603050405020304" pitchFamily="18" charset="0"/>
+                <a:cs typeface="Times New Roman" panose="02020603050405020304" pitchFamily="18" charset="0"/>
+              </a:rPr>
+              <a:t>    (</a:t>
+            </a:r>
+            <a:r>
+              <a:rPr lang="pt-BR" sz="3200" b="1" dirty="0" err="1">
+                <a:latin typeface="Times New Roman" panose="02020603050405020304" pitchFamily="18" charset="0"/>
+                <a:cs typeface="Times New Roman" panose="02020603050405020304" pitchFamily="18" charset="0"/>
+              </a:rPr>
+              <a:t>CursoPython</a:t>
+            </a:r>
+            <a:r>
+              <a:rPr lang="pt-BR" sz="3200" b="1" dirty="0">
                 <a:latin typeface="Times New Roman" panose="02020603050405020304" pitchFamily="18" charset="0"/>
                 <a:cs typeface="Times New Roman" panose="02020603050405020304" pitchFamily="18" charset="0"/>
               </a:rPr>
               <a:t>)</a:t>
             </a:r>
-          </a:p>
-          <a:p>
-            <a:pPr marL="0" indent="0" algn="just">
-              <a:buNone/>
-            </a:pPr>
-            <a:endParaRPr lang="pt-BR" sz="2000" dirty="0">
-              <a:latin typeface="Times New Roman" panose="02020603050405020304" pitchFamily="18" charset="0"/>
-              <a:cs typeface="Times New Roman" panose="02020603050405020304" pitchFamily="18" charset="0"/>
-            </a:endParaRPr>
           </a:p>
         </p:txBody>
       </p:sp>
     </p:spTree>
     <p:extLst>
       <p:ext uri="{BB962C8B-B14F-4D97-AF65-F5344CB8AC3E}">
-        <p14:creationId xmlns:p14="http://schemas.microsoft.com/office/powerpoint/2010/main" val="2102522400"/>
+        <p14:creationId xmlns:p14="http://schemas.microsoft.com/office/powerpoint/2010/main" val="4199940148"/>
       </p:ext>
     </p:extLst>
   </p:cSld>
@@ -6679,9 +6235,7 @@
           </a:xfrm>
         </p:spPr>
         <p:txBody>
-          <a:bodyPr>
-            <a:normAutofit/>
-          </a:bodyPr>
+          <a:bodyPr/>
           <a:lstStyle/>
           <a:p>
             <a:r>
@@ -6690,7 +6244,7 @@
                   <a:srgbClr val="0070C0"/>
                 </a:solidFill>
               </a:rPr>
-              <a:t>Leitura</a:t>
+              <a:t>Configurar</a:t>
             </a:r>
             <a:r>
               <a:rPr lang="en-US" b="1" dirty="0">
@@ -6706,13 +6260,16 @@
                   <a:srgbClr val="0070C0"/>
                 </a:solidFill>
               </a:rPr>
-              <a:t>Específica</a:t>
-            </a:r>
-            <a:endParaRPr lang="en-US" b="1" dirty="0">
-              <a:solidFill>
-                <a:srgbClr val="0070C0"/>
-              </a:solidFill>
-            </a:endParaRPr>
+              <a:t>Ambiente</a:t>
+            </a:r>
+            <a:r>
+              <a:rPr lang="en-US" b="1" dirty="0">
+                <a:solidFill>
+                  <a:srgbClr val="0070C0"/>
+                </a:solidFill>
+              </a:rPr>
+              <a:t> Python</a:t>
+            </a:r>
           </a:p>
         </p:txBody>
       </p:sp>
@@ -6728,8 +6285,8 @@
         </p:nvSpPr>
         <p:spPr>
           <a:xfrm>
-            <a:off x="142865" y="1200151"/>
-            <a:ext cx="8865056" cy="3394472"/>
+            <a:off x="142865" y="974682"/>
+            <a:ext cx="8865056" cy="3962838"/>
           </a:xfrm>
         </p:spPr>
         <p:txBody>
@@ -6742,157 +6299,522 @@
               <a:buNone/>
             </a:pPr>
             <a:r>
-              <a:rPr lang="pt-BR" sz="1800" dirty="0">
-                <a:latin typeface="Times New Roman" panose="02020603050405020304" pitchFamily="18" charset="0"/>
-                <a:cs typeface="Times New Roman" panose="02020603050405020304" pitchFamily="18" charset="0"/>
-              </a:rPr>
-              <a:t>[1] SEBESTA, Robert W. Conceitos de Linguagens de Programação. 11. edição. Porto Alegre: Bookman, 2018., Capítulo 1 (Preliminares). Disponível em: </a:t>
-            </a:r>
-            <a:r>
-              <a:rPr lang="pt-BR" sz="1800" dirty="0">
-                <a:latin typeface="Times New Roman" panose="02020603050405020304" pitchFamily="18" charset="0"/>
-                <a:cs typeface="Times New Roman" panose="02020603050405020304" pitchFamily="18" charset="0"/>
-                <a:hlinkClick r:id="rId3"/>
-              </a:rPr>
-              <a:t>https://integrada.minhabiblioteca.com.br/#/books/9788582604694/</a:t>
-            </a:r>
-            <a:endParaRPr lang="pt-BR" sz="1800" dirty="0">
+              <a:rPr lang="pt-BR" sz="2000" dirty="0">
+                <a:latin typeface="Times New Roman" panose="02020603050405020304" pitchFamily="18" charset="0"/>
+                <a:cs typeface="Times New Roman" panose="02020603050405020304" pitchFamily="18" charset="0"/>
+              </a:rPr>
+              <a:t>8. </a:t>
+            </a:r>
+            <a:r>
+              <a:rPr lang="pt-BR" sz="2000" b="1" dirty="0" err="1">
+                <a:latin typeface="Times New Roman" panose="02020603050405020304" pitchFamily="18" charset="0"/>
+                <a:cs typeface="Times New Roman" panose="02020603050405020304" pitchFamily="18" charset="0"/>
+              </a:rPr>
+              <a:t>git</a:t>
+            </a:r>
+            <a:r>
+              <a:rPr lang="pt-BR" sz="2000" b="1" dirty="0">
+                <a:latin typeface="Times New Roman" panose="02020603050405020304" pitchFamily="18" charset="0"/>
+                <a:cs typeface="Times New Roman" panose="02020603050405020304" pitchFamily="18" charset="0"/>
+              </a:rPr>
+              <a:t> </a:t>
+            </a:r>
+            <a:r>
+              <a:rPr lang="pt-BR" sz="2000" b="1" dirty="0" err="1">
+                <a:latin typeface="Times New Roman" panose="02020603050405020304" pitchFamily="18" charset="0"/>
+                <a:cs typeface="Times New Roman" panose="02020603050405020304" pitchFamily="18" charset="0"/>
+              </a:rPr>
+              <a:t>init</a:t>
+            </a:r>
+            <a:r>
+              <a:rPr lang="pt-BR" sz="2000" dirty="0">
+                <a:latin typeface="Times New Roman" panose="02020603050405020304" pitchFamily="18" charset="0"/>
+                <a:cs typeface="Times New Roman" panose="02020603050405020304" pitchFamily="18" charset="0"/>
+              </a:rPr>
+              <a:t> (Cria ponteiro </a:t>
+            </a:r>
+            <a:r>
+              <a:rPr lang="pt-BR" sz="2000" b="1" dirty="0">
+                <a:solidFill>
+                  <a:srgbClr val="FF0000"/>
+                </a:solidFill>
+                <a:latin typeface="Times New Roman" panose="02020603050405020304" pitchFamily="18" charset="0"/>
+                <a:cs typeface="Times New Roman" panose="02020603050405020304" pitchFamily="18" charset="0"/>
+              </a:rPr>
+              <a:t>GIT</a:t>
+            </a:r>
+            <a:r>
+              <a:rPr lang="pt-BR" sz="2000" dirty="0">
+                <a:latin typeface="Times New Roman" panose="02020603050405020304" pitchFamily="18" charset="0"/>
+                <a:cs typeface="Times New Roman" panose="02020603050405020304" pitchFamily="18" charset="0"/>
+              </a:rPr>
+              <a:t> na pasta)</a:t>
+            </a:r>
+          </a:p>
+          <a:p>
+            <a:pPr marL="0" indent="0" algn="just">
+              <a:buNone/>
+            </a:pPr>
+            <a:r>
+              <a:rPr lang="pt-BR" sz="2000" dirty="0">
+                <a:latin typeface="Times New Roman" panose="02020603050405020304" pitchFamily="18" charset="0"/>
+                <a:cs typeface="Times New Roman" panose="02020603050405020304" pitchFamily="18" charset="0"/>
+              </a:rPr>
+              <a:t>9. </a:t>
+            </a:r>
+            <a:r>
+              <a:rPr lang="pt-BR" sz="2000" b="1" dirty="0" err="1">
+                <a:latin typeface="Times New Roman" panose="02020603050405020304" pitchFamily="18" charset="0"/>
+                <a:cs typeface="Times New Roman" panose="02020603050405020304" pitchFamily="18" charset="0"/>
+              </a:rPr>
+              <a:t>echo</a:t>
+            </a:r>
+            <a:r>
+              <a:rPr lang="pt-BR" sz="2000" b="1" dirty="0">
+                <a:latin typeface="Times New Roman" panose="02020603050405020304" pitchFamily="18" charset="0"/>
+                <a:cs typeface="Times New Roman" panose="02020603050405020304" pitchFamily="18" charset="0"/>
+              </a:rPr>
+              <a:t> "# </a:t>
+            </a:r>
+            <a:r>
+              <a:rPr lang="pt-BR" sz="2000" b="1" dirty="0" err="1">
+                <a:latin typeface="Times New Roman" panose="02020603050405020304" pitchFamily="18" charset="0"/>
+                <a:cs typeface="Times New Roman" panose="02020603050405020304" pitchFamily="18" charset="0"/>
+              </a:rPr>
+              <a:t>testePython</a:t>
+            </a:r>
+            <a:r>
+              <a:rPr lang="pt-BR" sz="2000" b="1" dirty="0">
+                <a:latin typeface="Times New Roman" panose="02020603050405020304" pitchFamily="18" charset="0"/>
+                <a:cs typeface="Times New Roman" panose="02020603050405020304" pitchFamily="18" charset="0"/>
+              </a:rPr>
+              <a:t>" &gt;&gt; README.md</a:t>
+            </a:r>
+          </a:p>
+          <a:p>
+            <a:pPr marL="0" indent="0" algn="just">
+              <a:buNone/>
+            </a:pPr>
+            <a:r>
+              <a:rPr lang="pt-BR" sz="2000" dirty="0">
+                <a:latin typeface="Times New Roman" panose="02020603050405020304" pitchFamily="18" charset="0"/>
+                <a:cs typeface="Times New Roman" panose="02020603050405020304" pitchFamily="18" charset="0"/>
+              </a:rPr>
+              <a:t>10. </a:t>
+            </a:r>
+            <a:r>
+              <a:rPr lang="pt-BR" sz="2000" b="1" dirty="0" err="1">
+                <a:latin typeface="Times New Roman" panose="02020603050405020304" pitchFamily="18" charset="0"/>
+                <a:cs typeface="Times New Roman" panose="02020603050405020304" pitchFamily="18" charset="0"/>
+              </a:rPr>
+              <a:t>git</a:t>
+            </a:r>
+            <a:r>
+              <a:rPr lang="pt-BR" sz="2000" b="1" dirty="0">
+                <a:latin typeface="Times New Roman" panose="02020603050405020304" pitchFamily="18" charset="0"/>
+                <a:cs typeface="Times New Roman" panose="02020603050405020304" pitchFamily="18" charset="0"/>
+              </a:rPr>
+              <a:t> </a:t>
+            </a:r>
+            <a:r>
+              <a:rPr lang="pt-BR" sz="2000" b="1" dirty="0" err="1">
+                <a:latin typeface="Times New Roman" panose="02020603050405020304" pitchFamily="18" charset="0"/>
+                <a:cs typeface="Times New Roman" panose="02020603050405020304" pitchFamily="18" charset="0"/>
+              </a:rPr>
+              <a:t>add</a:t>
+            </a:r>
+            <a:r>
+              <a:rPr lang="pt-BR" sz="2000" b="1" dirty="0">
+                <a:latin typeface="Times New Roman" panose="02020603050405020304" pitchFamily="18" charset="0"/>
+                <a:cs typeface="Times New Roman" panose="02020603050405020304" pitchFamily="18" charset="0"/>
+              </a:rPr>
+              <a:t> .</a:t>
+            </a:r>
+            <a:r>
+              <a:rPr lang="pt-BR" sz="2000" dirty="0">
+                <a:latin typeface="Times New Roman" panose="02020603050405020304" pitchFamily="18" charset="0"/>
+                <a:cs typeface="Times New Roman" panose="02020603050405020304" pitchFamily="18" charset="0"/>
+              </a:rPr>
+              <a:t> (Incluir todos os arquivos no HEAD do repositório GIT Local)</a:t>
+            </a:r>
+          </a:p>
+          <a:p>
+            <a:pPr marL="0" indent="0" algn="just">
+              <a:buNone/>
+            </a:pPr>
+            <a:r>
+              <a:rPr lang="pt-BR" sz="2000" dirty="0">
+                <a:latin typeface="Times New Roman" panose="02020603050405020304" pitchFamily="18" charset="0"/>
+                <a:cs typeface="Times New Roman" panose="02020603050405020304" pitchFamily="18" charset="0"/>
+              </a:rPr>
+              <a:t>11. </a:t>
+            </a:r>
+            <a:r>
+              <a:rPr lang="pt-BR" sz="2000" b="1" dirty="0" err="1">
+                <a:latin typeface="Times New Roman" panose="02020603050405020304" pitchFamily="18" charset="0"/>
+                <a:cs typeface="Times New Roman" panose="02020603050405020304" pitchFamily="18" charset="0"/>
+              </a:rPr>
+              <a:t>git</a:t>
+            </a:r>
+            <a:r>
+              <a:rPr lang="pt-BR" sz="2000" b="1" dirty="0">
+                <a:latin typeface="Times New Roman" panose="02020603050405020304" pitchFamily="18" charset="0"/>
+                <a:cs typeface="Times New Roman" panose="02020603050405020304" pitchFamily="18" charset="0"/>
+              </a:rPr>
+              <a:t> </a:t>
+            </a:r>
+            <a:r>
+              <a:rPr lang="pt-BR" sz="2000" b="1" dirty="0" err="1">
+                <a:latin typeface="Times New Roman" panose="02020603050405020304" pitchFamily="18" charset="0"/>
+                <a:cs typeface="Times New Roman" panose="02020603050405020304" pitchFamily="18" charset="0"/>
+              </a:rPr>
+              <a:t>commit</a:t>
+            </a:r>
+            <a:r>
+              <a:rPr lang="pt-BR" sz="2000" b="1" dirty="0">
+                <a:latin typeface="Times New Roman" panose="02020603050405020304" pitchFamily="18" charset="0"/>
+                <a:cs typeface="Times New Roman" panose="02020603050405020304" pitchFamily="18" charset="0"/>
+              </a:rPr>
+              <a:t> -m "Disciplina Python"</a:t>
+            </a:r>
+          </a:p>
+          <a:p>
+            <a:pPr marL="0" indent="0" algn="just">
+              <a:buNone/>
+            </a:pPr>
+            <a:r>
+              <a:rPr lang="pt-BR" sz="2000" dirty="0">
+                <a:latin typeface="Times New Roman" panose="02020603050405020304" pitchFamily="18" charset="0"/>
+                <a:cs typeface="Times New Roman" panose="02020603050405020304" pitchFamily="18" charset="0"/>
+              </a:rPr>
+              <a:t>12. </a:t>
+            </a:r>
+            <a:r>
+              <a:rPr lang="pt-BR" sz="2000" b="1" dirty="0" err="1">
+                <a:latin typeface="Times New Roman" panose="02020603050405020304" pitchFamily="18" charset="0"/>
+                <a:cs typeface="Times New Roman" panose="02020603050405020304" pitchFamily="18" charset="0"/>
+              </a:rPr>
+              <a:t>git</a:t>
+            </a:r>
+            <a:r>
+              <a:rPr lang="pt-BR" sz="2000" b="1" dirty="0">
+                <a:latin typeface="Times New Roman" panose="02020603050405020304" pitchFamily="18" charset="0"/>
+                <a:cs typeface="Times New Roman" panose="02020603050405020304" pitchFamily="18" charset="0"/>
+              </a:rPr>
+              <a:t> </a:t>
+            </a:r>
+            <a:r>
+              <a:rPr lang="pt-BR" sz="2000" b="1" dirty="0" err="1">
+                <a:latin typeface="Times New Roman" panose="02020603050405020304" pitchFamily="18" charset="0"/>
+                <a:cs typeface="Times New Roman" panose="02020603050405020304" pitchFamily="18" charset="0"/>
+              </a:rPr>
+              <a:t>remote</a:t>
+            </a:r>
+            <a:r>
+              <a:rPr lang="pt-BR" sz="2000" b="1" dirty="0">
+                <a:latin typeface="Times New Roman" panose="02020603050405020304" pitchFamily="18" charset="0"/>
+                <a:cs typeface="Times New Roman" panose="02020603050405020304" pitchFamily="18" charset="0"/>
+              </a:rPr>
+              <a:t> </a:t>
+            </a:r>
+            <a:r>
+              <a:rPr lang="pt-BR" sz="2000" b="1" dirty="0" err="1">
+                <a:latin typeface="Times New Roman" panose="02020603050405020304" pitchFamily="18" charset="0"/>
+                <a:cs typeface="Times New Roman" panose="02020603050405020304" pitchFamily="18" charset="0"/>
+              </a:rPr>
+              <a:t>add</a:t>
+            </a:r>
+            <a:r>
+              <a:rPr lang="pt-BR" sz="2000" b="1" dirty="0">
+                <a:latin typeface="Times New Roman" panose="02020603050405020304" pitchFamily="18" charset="0"/>
+                <a:cs typeface="Times New Roman" panose="02020603050405020304" pitchFamily="18" charset="0"/>
+              </a:rPr>
+              <a:t> </a:t>
+            </a:r>
+            <a:r>
+              <a:rPr lang="pt-BR" sz="2000" b="1" dirty="0" err="1">
+                <a:latin typeface="Times New Roman" panose="02020603050405020304" pitchFamily="18" charset="0"/>
+                <a:cs typeface="Times New Roman" panose="02020603050405020304" pitchFamily="18" charset="0"/>
+              </a:rPr>
+              <a:t>origin</a:t>
+            </a:r>
+            <a:r>
+              <a:rPr lang="pt-BR" sz="2000" b="1" dirty="0">
+                <a:latin typeface="Times New Roman" panose="02020603050405020304" pitchFamily="18" charset="0"/>
+                <a:cs typeface="Times New Roman" panose="02020603050405020304" pitchFamily="18" charset="0"/>
+              </a:rPr>
+              <a:t> </a:t>
+            </a:r>
+          </a:p>
+          <a:p>
+            <a:pPr marL="0" indent="0" algn="just">
+              <a:buNone/>
+            </a:pPr>
+            <a:r>
+              <a:rPr lang="pt-BR" sz="2000" b="1" dirty="0">
+                <a:latin typeface="Times New Roman" panose="02020603050405020304" pitchFamily="18" charset="0"/>
+                <a:cs typeface="Times New Roman" panose="02020603050405020304" pitchFamily="18" charset="0"/>
+              </a:rPr>
+              <a:t>      https://github.com/CloudEducationBrazil/TESTEPYTHON.git</a:t>
+            </a:r>
+            <a:r>
+              <a:rPr lang="pt-BR" sz="2000" dirty="0">
+                <a:latin typeface="Times New Roman" panose="02020603050405020304" pitchFamily="18" charset="0"/>
+                <a:cs typeface="Times New Roman" panose="02020603050405020304" pitchFamily="18" charset="0"/>
+              </a:rPr>
+              <a:t>   </a:t>
+            </a:r>
+          </a:p>
+          <a:p>
+            <a:pPr marL="0" indent="0" algn="just">
+              <a:buNone/>
+            </a:pPr>
+            <a:r>
+              <a:rPr lang="pt-BR" sz="2000" dirty="0">
+                <a:latin typeface="Times New Roman" panose="02020603050405020304" pitchFamily="18" charset="0"/>
+                <a:cs typeface="Times New Roman" panose="02020603050405020304" pitchFamily="18" charset="0"/>
+              </a:rPr>
+              <a:t>      (associar o seu repositório LOCAL com o REMOTO)</a:t>
+            </a:r>
+          </a:p>
+          <a:p>
+            <a:pPr marL="0" indent="0" algn="just">
+              <a:buNone/>
+            </a:pPr>
+            <a:r>
+              <a:rPr lang="pt-BR" sz="2000" dirty="0">
+                <a:latin typeface="Times New Roman" panose="02020603050405020304" pitchFamily="18" charset="0"/>
+                <a:cs typeface="Times New Roman" panose="02020603050405020304" pitchFamily="18" charset="0"/>
+              </a:rPr>
+              <a:t>13. </a:t>
+            </a:r>
+            <a:r>
+              <a:rPr lang="pt-BR" sz="2000" b="1" dirty="0" err="1">
+                <a:solidFill>
+                  <a:srgbClr val="FF0000"/>
+                </a:solidFill>
+                <a:latin typeface="Times New Roman" panose="02020603050405020304" pitchFamily="18" charset="0"/>
+                <a:cs typeface="Times New Roman" panose="02020603050405020304" pitchFamily="18" charset="0"/>
+              </a:rPr>
+              <a:t>git</a:t>
+            </a:r>
+            <a:r>
+              <a:rPr lang="pt-BR" sz="2000" b="1" dirty="0">
+                <a:solidFill>
+                  <a:srgbClr val="FF0000"/>
+                </a:solidFill>
+                <a:latin typeface="Times New Roman" panose="02020603050405020304" pitchFamily="18" charset="0"/>
+                <a:cs typeface="Times New Roman" panose="02020603050405020304" pitchFamily="18" charset="0"/>
+              </a:rPr>
+              <a:t> </a:t>
+            </a:r>
+            <a:r>
+              <a:rPr lang="pt-BR" sz="2000" b="1" dirty="0" err="1">
+                <a:solidFill>
+                  <a:srgbClr val="FF0000"/>
+                </a:solidFill>
+                <a:latin typeface="Times New Roman" panose="02020603050405020304" pitchFamily="18" charset="0"/>
+                <a:cs typeface="Times New Roman" panose="02020603050405020304" pitchFamily="18" charset="0"/>
+              </a:rPr>
+              <a:t>push</a:t>
+            </a:r>
+            <a:r>
+              <a:rPr lang="pt-BR" sz="2000" b="1" dirty="0">
+                <a:solidFill>
+                  <a:srgbClr val="FF0000"/>
+                </a:solidFill>
+                <a:latin typeface="Times New Roman" panose="02020603050405020304" pitchFamily="18" charset="0"/>
+                <a:cs typeface="Times New Roman" panose="02020603050405020304" pitchFamily="18" charset="0"/>
+              </a:rPr>
+              <a:t> -u </a:t>
+            </a:r>
+            <a:r>
+              <a:rPr lang="pt-BR" sz="2000" b="1" dirty="0" err="1">
+                <a:solidFill>
+                  <a:srgbClr val="FF0000"/>
+                </a:solidFill>
+                <a:latin typeface="Times New Roman" panose="02020603050405020304" pitchFamily="18" charset="0"/>
+                <a:cs typeface="Times New Roman" panose="02020603050405020304" pitchFamily="18" charset="0"/>
+              </a:rPr>
+              <a:t>origin</a:t>
+            </a:r>
+            <a:r>
+              <a:rPr lang="pt-BR" sz="2000" b="1" dirty="0">
+                <a:solidFill>
+                  <a:srgbClr val="FF0000"/>
+                </a:solidFill>
+                <a:latin typeface="Times New Roman" panose="02020603050405020304" pitchFamily="18" charset="0"/>
+                <a:cs typeface="Times New Roman" panose="02020603050405020304" pitchFamily="18" charset="0"/>
+              </a:rPr>
+              <a:t> master</a:t>
+            </a:r>
+            <a:r>
+              <a:rPr lang="pt-BR" sz="2000" dirty="0">
+                <a:latin typeface="Times New Roman" panose="02020603050405020304" pitchFamily="18" charset="0"/>
+                <a:cs typeface="Times New Roman" panose="02020603050405020304" pitchFamily="18" charset="0"/>
+              </a:rPr>
+              <a:t> (sincronizar o repositório LOCAL com o repositório REMOTO, lembre-se, deve existir pelo menos um arquivo para sincronizar, </a:t>
+            </a:r>
+            <a:r>
+              <a:rPr lang="pt-BR" sz="2000" b="1" dirty="0">
+                <a:latin typeface="Times New Roman" panose="02020603050405020304" pitchFamily="18" charset="0"/>
+                <a:cs typeface="Times New Roman" panose="02020603050405020304" pitchFamily="18" charset="0"/>
+              </a:rPr>
+              <a:t>no caso, README.md</a:t>
+            </a:r>
+            <a:r>
+              <a:rPr lang="pt-BR" sz="2000" dirty="0">
+                <a:latin typeface="Times New Roman" panose="02020603050405020304" pitchFamily="18" charset="0"/>
+                <a:cs typeface="Times New Roman" panose="02020603050405020304" pitchFamily="18" charset="0"/>
+              </a:rPr>
+              <a:t>)</a:t>
+            </a:r>
+          </a:p>
+          <a:p>
+            <a:pPr marL="0" indent="0" algn="just">
+              <a:buNone/>
+            </a:pPr>
+            <a:r>
+              <a:rPr lang="pt-BR" sz="2000" b="1" dirty="0">
+                <a:solidFill>
+                  <a:srgbClr val="FF0000"/>
+                </a:solidFill>
+                <a:latin typeface="Times New Roman" panose="02020603050405020304" pitchFamily="18" charset="0"/>
+                <a:cs typeface="Times New Roman" panose="02020603050405020304" pitchFamily="18" charset="0"/>
+              </a:rPr>
+              <a:t>Atenção</a:t>
+            </a:r>
+            <a:r>
+              <a:rPr lang="pt-BR" sz="2000" dirty="0">
+                <a:latin typeface="Times New Roman" panose="02020603050405020304" pitchFamily="18" charset="0"/>
+                <a:cs typeface="Times New Roman" panose="02020603050405020304" pitchFamily="18" charset="0"/>
+              </a:rPr>
+              <a:t>: </a:t>
+            </a:r>
+            <a:r>
+              <a:rPr lang="pt-BR" sz="2000" b="1" dirty="0" err="1">
+                <a:solidFill>
+                  <a:srgbClr val="FF0000"/>
+                </a:solidFill>
+                <a:latin typeface="Times New Roman" panose="02020603050405020304" pitchFamily="18" charset="0"/>
+                <a:cs typeface="Times New Roman" panose="02020603050405020304" pitchFamily="18" charset="0"/>
+              </a:rPr>
+              <a:t>Branch</a:t>
+            </a:r>
+            <a:r>
+              <a:rPr lang="pt-BR" sz="2000" b="1" dirty="0">
+                <a:solidFill>
+                  <a:srgbClr val="FF0000"/>
+                </a:solidFill>
+                <a:latin typeface="Times New Roman" panose="02020603050405020304" pitchFamily="18" charset="0"/>
+                <a:cs typeface="Times New Roman" panose="02020603050405020304" pitchFamily="18" charset="0"/>
+              </a:rPr>
+              <a:t> </a:t>
+            </a:r>
+            <a:r>
+              <a:rPr lang="pt-BR" sz="2000" b="1" dirty="0">
+                <a:solidFill>
+                  <a:srgbClr val="0070C0"/>
+                </a:solidFill>
+                <a:latin typeface="Times New Roman" panose="02020603050405020304" pitchFamily="18" charset="0"/>
+                <a:cs typeface="Times New Roman" panose="02020603050405020304" pitchFamily="18" charset="0"/>
+              </a:rPr>
+              <a:t>master ou </a:t>
+            </a:r>
+            <a:r>
+              <a:rPr lang="pt-BR" sz="2000" b="1" dirty="0" err="1">
+                <a:solidFill>
+                  <a:srgbClr val="0070C0"/>
+                </a:solidFill>
+                <a:latin typeface="Times New Roman" panose="02020603050405020304" pitchFamily="18" charset="0"/>
+                <a:cs typeface="Times New Roman" panose="02020603050405020304" pitchFamily="18" charset="0"/>
+              </a:rPr>
+              <a:t>main</a:t>
+            </a:r>
+            <a:r>
+              <a:rPr lang="pt-BR" sz="2000" b="1" dirty="0">
+                <a:solidFill>
+                  <a:srgbClr val="0070C0"/>
+                </a:solidFill>
+                <a:latin typeface="Times New Roman" panose="02020603050405020304" pitchFamily="18" charset="0"/>
+                <a:cs typeface="Times New Roman" panose="02020603050405020304" pitchFamily="18" charset="0"/>
+              </a:rPr>
+              <a:t>, </a:t>
+            </a:r>
+            <a:r>
+              <a:rPr lang="pt-BR" sz="2000" dirty="0">
+                <a:latin typeface="Times New Roman" panose="02020603050405020304" pitchFamily="18" charset="0"/>
+                <a:cs typeface="Times New Roman" panose="02020603050405020304" pitchFamily="18" charset="0"/>
+              </a:rPr>
+              <a:t>aonde será </a:t>
+            </a:r>
+            <a:r>
+              <a:rPr lang="pt-BR" sz="2000" dirty="0" err="1">
+                <a:latin typeface="Times New Roman" panose="02020603050405020304" pitchFamily="18" charset="0"/>
+                <a:cs typeface="Times New Roman" panose="02020603050405020304" pitchFamily="18" charset="0"/>
+              </a:rPr>
+              <a:t>excutado</a:t>
+            </a:r>
+            <a:r>
+              <a:rPr lang="pt-BR" sz="2000" dirty="0">
+                <a:latin typeface="Times New Roman" panose="02020603050405020304" pitchFamily="18" charset="0"/>
+                <a:cs typeface="Times New Roman" panose="02020603050405020304" pitchFamily="18" charset="0"/>
+              </a:rPr>
+              <a:t> o, </a:t>
+            </a:r>
+            <a:r>
+              <a:rPr lang="pt-BR" sz="2000" b="1" dirty="0" err="1">
+                <a:solidFill>
+                  <a:srgbClr val="FF0000"/>
+                </a:solidFill>
+                <a:latin typeface="Times New Roman" panose="02020603050405020304" pitchFamily="18" charset="0"/>
+                <a:cs typeface="Times New Roman" panose="02020603050405020304" pitchFamily="18" charset="0"/>
+              </a:rPr>
+              <a:t>git</a:t>
+            </a:r>
+            <a:r>
+              <a:rPr lang="pt-BR" sz="2000" b="1" dirty="0">
+                <a:solidFill>
+                  <a:srgbClr val="FF0000"/>
+                </a:solidFill>
+                <a:latin typeface="Times New Roman" panose="02020603050405020304" pitchFamily="18" charset="0"/>
+                <a:cs typeface="Times New Roman" panose="02020603050405020304" pitchFamily="18" charset="0"/>
+              </a:rPr>
+              <a:t> </a:t>
+            </a:r>
+            <a:r>
+              <a:rPr lang="pt-BR" sz="2000" b="1" dirty="0" err="1">
+                <a:solidFill>
+                  <a:srgbClr val="FF0000"/>
+                </a:solidFill>
+                <a:latin typeface="Times New Roman" panose="02020603050405020304" pitchFamily="18" charset="0"/>
+                <a:cs typeface="Times New Roman" panose="02020603050405020304" pitchFamily="18" charset="0"/>
+              </a:rPr>
+              <a:t>push</a:t>
+            </a:r>
+            <a:r>
+              <a:rPr lang="pt-BR" sz="2000" b="1" dirty="0">
+                <a:solidFill>
+                  <a:srgbClr val="FF0000"/>
+                </a:solidFill>
+                <a:latin typeface="Times New Roman" panose="02020603050405020304" pitchFamily="18" charset="0"/>
+                <a:cs typeface="Times New Roman" panose="02020603050405020304" pitchFamily="18" charset="0"/>
+              </a:rPr>
+              <a:t> –u origin</a:t>
+            </a:r>
+            <a:r>
+              <a:rPr lang="pt-BR" sz="2000" dirty="0">
+                <a:latin typeface="Times New Roman" panose="02020603050405020304" pitchFamily="18" charset="0"/>
+                <a:cs typeface="Times New Roman" panose="02020603050405020304" pitchFamily="18" charset="0"/>
+              </a:rPr>
+              <a:t>.</a:t>
+            </a:r>
+            <a:endParaRPr lang="pt-BR" sz="2000" b="1" dirty="0">
+              <a:solidFill>
+                <a:srgbClr val="FF0000"/>
+              </a:solidFill>
               <a:latin typeface="Times New Roman" panose="02020603050405020304" pitchFamily="18" charset="0"/>
               <a:cs typeface="Times New Roman" panose="02020603050405020304" pitchFamily="18" charset="0"/>
-            </a:endParaRPr>
-          </a:p>
-          <a:p>
-            <a:pPr marL="0" indent="0" algn="just">
-              <a:buNone/>
-            </a:pPr>
-            <a:endParaRPr lang="pt-BR" sz="1800" dirty="0">
-              <a:latin typeface="Times New Roman" panose="02020603050405020304" pitchFamily="18" charset="0"/>
-              <a:cs typeface="Times New Roman" panose="02020603050405020304" pitchFamily="18" charset="0"/>
-            </a:endParaRPr>
-          </a:p>
-          <a:p>
-            <a:pPr marL="0" indent="0" algn="just">
-              <a:buNone/>
-            </a:pPr>
-            <a:endParaRPr lang="pt-BR" sz="1800" dirty="0">
-              <a:latin typeface="Times New Roman" panose="02020603050405020304" pitchFamily="18" charset="0"/>
-              <a:cs typeface="Times New Roman" panose="02020603050405020304" pitchFamily="18" charset="0"/>
-            </a:endParaRPr>
-          </a:p>
-          <a:p>
-            <a:pPr marL="0" indent="0" algn="just">
-              <a:buNone/>
-            </a:pPr>
-            <a:r>
-              <a:rPr lang="pt-BR" sz="1800" dirty="0">
-                <a:latin typeface="Times New Roman" panose="02020603050405020304" pitchFamily="18" charset="0"/>
-                <a:cs typeface="Times New Roman" panose="02020603050405020304" pitchFamily="18" charset="0"/>
-              </a:rPr>
-              <a:t>[2</a:t>
-            </a:r>
-            <a:r>
-              <a:rPr lang="pt-BR" sz="1800">
-                <a:latin typeface="Times New Roman" panose="02020603050405020304" pitchFamily="18" charset="0"/>
-                <a:cs typeface="Times New Roman" panose="02020603050405020304" pitchFamily="18" charset="0"/>
-              </a:rPr>
-              <a:t>] Site: </a:t>
-            </a:r>
-            <a:r>
-              <a:rPr lang="pt-BR" sz="1800">
-                <a:latin typeface="Times New Roman" panose="02020603050405020304" pitchFamily="18" charset="0"/>
-                <a:cs typeface="Times New Roman" panose="02020603050405020304" pitchFamily="18" charset="0"/>
-                <a:hlinkClick r:id="rId4"/>
-              </a:rPr>
-              <a:t>https</a:t>
-            </a:r>
-            <a:r>
-              <a:rPr lang="pt-BR" sz="1800" dirty="0">
-                <a:latin typeface="Times New Roman" panose="02020603050405020304" pitchFamily="18" charset="0"/>
-                <a:cs typeface="Times New Roman" panose="02020603050405020304" pitchFamily="18" charset="0"/>
-                <a:hlinkClick r:id="rId4"/>
-              </a:rPr>
-              <a:t>://www.w3schools.com/python/python_variables.asp</a:t>
-            </a:r>
-            <a:endParaRPr lang="pt-BR" sz="1800" dirty="0">
-              <a:latin typeface="Times New Roman" panose="02020603050405020304" pitchFamily="18" charset="0"/>
-              <a:cs typeface="Times New Roman" panose="02020603050405020304" pitchFamily="18" charset="0"/>
-            </a:endParaRPr>
-          </a:p>
-          <a:p>
-            <a:pPr marL="0" indent="0" algn="just">
-              <a:buNone/>
-            </a:pPr>
-            <a:endParaRPr lang="pt-BR" sz="1800" dirty="0">
-              <a:latin typeface="Times New Roman" panose="02020603050405020304" pitchFamily="18" charset="0"/>
-              <a:cs typeface="Times New Roman" panose="02020603050405020304" pitchFamily="18" charset="0"/>
-            </a:endParaRPr>
-          </a:p>
-          <a:p>
-            <a:pPr marL="0" indent="0" algn="just">
-              <a:buNone/>
-            </a:pPr>
-            <a:endParaRPr lang="pt-BR" sz="1800" dirty="0">
-              <a:latin typeface="Times New Roman" panose="02020603050405020304" pitchFamily="18" charset="0"/>
-              <a:cs typeface="Times New Roman" panose="02020603050405020304" pitchFamily="18" charset="0"/>
-            </a:endParaRPr>
-          </a:p>
-          <a:p>
-            <a:pPr marL="0" indent="0" algn="just">
-              <a:buNone/>
-            </a:pPr>
-            <a:r>
-              <a:rPr lang="pt-BR" sz="1800" dirty="0">
-                <a:latin typeface="Times New Roman" panose="02020603050405020304" pitchFamily="18" charset="0"/>
-                <a:cs typeface="Times New Roman" panose="02020603050405020304" pitchFamily="18" charset="0"/>
-              </a:rPr>
-              <a:t>[3] Site: </a:t>
-            </a:r>
-            <a:r>
-              <a:rPr lang="pt-BR" sz="1800" dirty="0">
-                <a:latin typeface="Times New Roman" panose="02020603050405020304" pitchFamily="18" charset="0"/>
-                <a:cs typeface="Times New Roman" panose="02020603050405020304" pitchFamily="18" charset="0"/>
-                <a:hlinkClick r:id="rId5"/>
-              </a:rPr>
-              <a:t>https://docs.python.org/pt-br/3/tutorial/</a:t>
-            </a:r>
-            <a:endParaRPr lang="pt-BR" sz="1800" dirty="0">
-              <a:latin typeface="Times New Roman" panose="02020603050405020304" pitchFamily="18" charset="0"/>
-              <a:cs typeface="Times New Roman" panose="02020603050405020304" pitchFamily="18" charset="0"/>
-            </a:endParaRPr>
-          </a:p>
-          <a:p>
-            <a:pPr marL="0" indent="0" algn="just">
-              <a:buNone/>
-            </a:pPr>
-            <a:endParaRPr lang="pt-BR" sz="1800" dirty="0">
-              <a:latin typeface="Times New Roman" panose="02020603050405020304" pitchFamily="18" charset="0"/>
-              <a:cs typeface="Times New Roman" panose="02020603050405020304" pitchFamily="18" charset="0"/>
-            </a:endParaRPr>
-          </a:p>
-          <a:p>
-            <a:pPr marL="0" indent="0" algn="just">
-              <a:buNone/>
-            </a:pPr>
-            <a:endParaRPr lang="pt-BR" sz="1800" dirty="0">
-              <a:latin typeface="Times New Roman" panose="02020603050405020304" pitchFamily="18" charset="0"/>
-              <a:cs typeface="Times New Roman" panose="02020603050405020304" pitchFamily="18" charset="0"/>
-            </a:endParaRPr>
-          </a:p>
-          <a:p>
-            <a:pPr marL="0" indent="0" algn="just">
-              <a:buNone/>
-            </a:pPr>
-            <a:endParaRPr lang="pt-BR" sz="1800" dirty="0">
-              <a:latin typeface="Times New Roman" panose="02020603050405020304" pitchFamily="18" charset="0"/>
-              <a:cs typeface="Times New Roman" panose="02020603050405020304" pitchFamily="18" charset="0"/>
-            </a:endParaRPr>
-          </a:p>
-          <a:p>
-            <a:pPr marL="0" indent="0" algn="just">
-              <a:buNone/>
-            </a:pPr>
-            <a:endParaRPr lang="pt-BR" sz="1800" dirty="0">
-              <a:latin typeface="Calibri" panose="020F0502020204030204" pitchFamily="34" charset="0"/>
             </a:endParaRPr>
           </a:p>
         </p:txBody>
@@ -6900,7 +6822,7 @@
     </p:spTree>
     <p:extLst>
       <p:ext uri="{BB962C8B-B14F-4D97-AF65-F5344CB8AC3E}">
-        <p14:creationId xmlns:p14="http://schemas.microsoft.com/office/powerpoint/2010/main" val="3680270425"/>
+        <p14:creationId xmlns:p14="http://schemas.microsoft.com/office/powerpoint/2010/main" val="2331477641"/>
       </p:ext>
     </p:extLst>
   </p:cSld>
@@ -6956,7 +6878,7 @@
                   <a:srgbClr val="0070C0"/>
                 </a:solidFill>
               </a:rPr>
-              <a:t>Aprenda</a:t>
+              <a:t>Leitura</a:t>
             </a:r>
             <a:r>
               <a:rPr lang="en-US" b="1" dirty="0">
@@ -6964,8 +6886,21 @@
                   <a:srgbClr val="0070C0"/>
                 </a:solidFill>
               </a:rPr>
-              <a:t>+</a:t>
-            </a:r>
+              <a:t> </a:t>
+            </a:r>
+            <a:r>
+              <a:rPr lang="en-US" b="1" dirty="0" err="1">
+                <a:solidFill>
+                  <a:srgbClr val="0070C0"/>
+                </a:solidFill>
+              </a:rPr>
+              <a:t>Específica</a:t>
+            </a:r>
+            <a:endParaRPr lang="en-US" b="1" dirty="0">
+              <a:solidFill>
+                <a:srgbClr val="0070C0"/>
+              </a:solidFill>
+            </a:endParaRPr>
           </a:p>
         </p:txBody>
       </p:sp>
@@ -6981,8 +6916,8 @@
         </p:nvSpPr>
         <p:spPr>
           <a:xfrm>
-            <a:off x="142865" y="1200150"/>
-            <a:ext cx="8865056" cy="3572265"/>
+            <a:off x="142865" y="1200151"/>
+            <a:ext cx="8865056" cy="3394472"/>
           </a:xfrm>
         </p:spPr>
         <p:txBody>
@@ -6999,7 +6934,7 @@
                 <a:latin typeface="Times New Roman" panose="02020603050405020304" pitchFamily="18" charset="0"/>
                 <a:cs typeface="Times New Roman" panose="02020603050405020304" pitchFamily="18" charset="0"/>
               </a:rPr>
-              <a:t>[1] Artigo: "9 razões para aprender programação". Disponível em: </a:t>
+              <a:t>[1] SEBESTA, Robert W. Conceitos de Linguagens de Programação. 11. edição. Porto Alegre: Bookman, 2018., Capítulo 1 (Preliminares). Disponível em: </a:t>
             </a:r>
             <a:r>
               <a:rPr lang="pt-BR" sz="1800" dirty="0">
@@ -7007,31 +6942,12 @@
                 <a:cs typeface="Times New Roman" panose="02020603050405020304" pitchFamily="18" charset="0"/>
                 <a:hlinkClick r:id="rId3"/>
               </a:rPr>
-              <a:t>https://www.digitalhouse.com/</a:t>
-            </a:r>
-            <a:r>
-              <a:rPr lang="pt-BR" sz="1800" dirty="0" err="1">
-                <a:latin typeface="Times New Roman" panose="02020603050405020304" pitchFamily="18" charset="0"/>
-                <a:cs typeface="Times New Roman" panose="02020603050405020304" pitchFamily="18" charset="0"/>
-                <a:hlinkClick r:id="rId3"/>
-              </a:rPr>
-              <a:t>br</a:t>
-            </a:r>
-            <a:r>
-              <a:rPr lang="pt-BR" sz="1800" dirty="0">
-                <a:latin typeface="Times New Roman" panose="02020603050405020304" pitchFamily="18" charset="0"/>
-                <a:cs typeface="Times New Roman" panose="02020603050405020304" pitchFamily="18" charset="0"/>
-                <a:hlinkClick r:id="rId3"/>
-              </a:rPr>
-              <a:t>/blog/9-motivos-aprender-programar-programador</a:t>
-            </a:r>
-            <a:r>
-              <a:rPr lang="pt-BR" sz="1800" dirty="0">
-                <a:latin typeface="Times New Roman" panose="02020603050405020304" pitchFamily="18" charset="0"/>
-                <a:cs typeface="Times New Roman" panose="02020603050405020304" pitchFamily="18" charset="0"/>
-              </a:rPr>
-              <a:t>.</a:t>
-            </a:r>
+              <a:t>https://integrada.minhabiblioteca.com.br/#/books/9788582604694/</a:t>
+            </a:r>
+            <a:endParaRPr lang="pt-BR" sz="1800" dirty="0">
+              <a:latin typeface="Times New Roman" panose="02020603050405020304" pitchFamily="18" charset="0"/>
+              <a:cs typeface="Times New Roman" panose="02020603050405020304" pitchFamily="18" charset="0"/>
+            </a:endParaRPr>
           </a:p>
           <a:p>
             <a:pPr marL="0" indent="0" algn="just">
@@ -7046,25 +6962,44 @@
             <a:pPr marL="0" indent="0" algn="just">
               <a:buNone/>
             </a:pPr>
+            <a:endParaRPr lang="pt-BR" sz="1800" dirty="0">
+              <a:latin typeface="Times New Roman" panose="02020603050405020304" pitchFamily="18" charset="0"/>
+              <a:cs typeface="Times New Roman" panose="02020603050405020304" pitchFamily="18" charset="0"/>
+            </a:endParaRPr>
+          </a:p>
+          <a:p>
+            <a:pPr marL="0" indent="0" algn="just">
+              <a:buNone/>
+            </a:pPr>
             <a:r>
               <a:rPr lang="pt-BR" sz="1800" dirty="0">
                 <a:latin typeface="Times New Roman" panose="02020603050405020304" pitchFamily="18" charset="0"/>
                 <a:cs typeface="Times New Roman" panose="02020603050405020304" pitchFamily="18" charset="0"/>
               </a:rPr>
-              <a:t>[2] </a:t>
-            </a:r>
-          </a:p>
-          <a:p>
-            <a:pPr marL="0" indent="0" algn="just">
-              <a:buNone/>
-            </a:pPr>
+              <a:t>[2</a:t>
+            </a:r>
+            <a:r>
+              <a:rPr lang="pt-BR" sz="1800">
+                <a:latin typeface="Times New Roman" panose="02020603050405020304" pitchFamily="18" charset="0"/>
+                <a:cs typeface="Times New Roman" panose="02020603050405020304" pitchFamily="18" charset="0"/>
+              </a:rPr>
+              <a:t>] Site: </a:t>
+            </a:r>
+            <a:r>
+              <a:rPr lang="pt-BR" sz="1800">
+                <a:latin typeface="Times New Roman" panose="02020603050405020304" pitchFamily="18" charset="0"/>
+                <a:cs typeface="Times New Roman" panose="02020603050405020304" pitchFamily="18" charset="0"/>
+                <a:hlinkClick r:id="rId4"/>
+              </a:rPr>
+              <a:t>https</a:t>
+            </a:r>
             <a:r>
               <a:rPr lang="pt-BR" sz="1800" dirty="0">
                 <a:latin typeface="Times New Roman" panose="02020603050405020304" pitchFamily="18" charset="0"/>
                 <a:cs typeface="Times New Roman" panose="02020603050405020304" pitchFamily="18" charset="0"/>
                 <a:hlinkClick r:id="rId4"/>
               </a:rPr>
-              <a:t>https://www.treinaweb.com.br/blog/quais-as-diferencas-entre-tipagens-estatica-ou-dinamica-e-forte-ou-fraca?gclid=CjwKCAiAvOeQBhBkEiwAxutUVJAITKYmBgabusxcdVhB2GMAIC9CT_L4Cj7WGbSVhfoYbDq1T_oqqBoCbGMQAvD_BwE</a:t>
+              <a:t>://www.w3schools.com/python/python_variables.asp</a:t>
             </a:r>
             <a:endParaRPr lang="pt-BR" sz="1800" dirty="0">
               <a:latin typeface="Times New Roman" panose="02020603050405020304" pitchFamily="18" charset="0"/>
@@ -7084,12 +7019,21 @@
             <a:pPr marL="0" indent="0" algn="just">
               <a:buNone/>
             </a:pPr>
+            <a:endParaRPr lang="pt-BR" sz="1800" dirty="0">
+              <a:latin typeface="Times New Roman" panose="02020603050405020304" pitchFamily="18" charset="0"/>
+              <a:cs typeface="Times New Roman" panose="02020603050405020304" pitchFamily="18" charset="0"/>
+            </a:endParaRPr>
+          </a:p>
+          <a:p>
+            <a:pPr marL="0" indent="0" algn="just">
+              <a:buNone/>
+            </a:pPr>
             <a:r>
               <a:rPr lang="pt-BR" sz="1800" dirty="0">
                 <a:latin typeface="Times New Roman" panose="02020603050405020304" pitchFamily="18" charset="0"/>
                 <a:cs typeface="Times New Roman" panose="02020603050405020304" pitchFamily="18" charset="0"/>
               </a:rPr>
-              <a:t>[3] Vídeo "Por que todos deveriam aprender a programar?". Disponível em:  </a:t>
+              <a:t>[3] Site: </a:t>
             </a:r>
             <a:r>
               <a:rPr lang="pt-BR" sz="1800" dirty="0">
@@ -7097,7 +7041,7 @@
                 <a:cs typeface="Times New Roman" panose="02020603050405020304" pitchFamily="18" charset="0"/>
                 <a:hlinkClick r:id="rId5"/>
               </a:rPr>
-              <a:t>https://www.youtube.com/watch?v=mHW1Hsqlp6A</a:t>
+              <a:t>https://docs.python.org/pt-br/3/tutorial/</a:t>
             </a:r>
             <a:endParaRPr lang="pt-BR" sz="1800" dirty="0">
               <a:latin typeface="Times New Roman" panose="02020603050405020304" pitchFamily="18" charset="0"/>
@@ -7136,24 +7080,6 @@
               <a:buNone/>
             </a:pPr>
             <a:endParaRPr lang="pt-BR" sz="1800" dirty="0">
-              <a:latin typeface="Times New Roman" panose="02020603050405020304" pitchFamily="18" charset="0"/>
-              <a:cs typeface="Times New Roman" panose="02020603050405020304" pitchFamily="18" charset="0"/>
-            </a:endParaRPr>
-          </a:p>
-          <a:p>
-            <a:pPr marL="0" indent="0" algn="just">
-              <a:buNone/>
-            </a:pPr>
-            <a:endParaRPr lang="pt-BR" sz="1800" dirty="0">
-              <a:latin typeface="Times New Roman" panose="02020603050405020304" pitchFamily="18" charset="0"/>
-              <a:cs typeface="Times New Roman" panose="02020603050405020304" pitchFamily="18" charset="0"/>
-            </a:endParaRPr>
-          </a:p>
-          <a:p>
-            <a:pPr marL="0" indent="0" algn="just">
-              <a:buNone/>
-            </a:pPr>
-            <a:endParaRPr lang="pt-BR" sz="1800" dirty="0">
               <a:latin typeface="Calibri" panose="020F0502020204030204" pitchFamily="34" charset="0"/>
             </a:endParaRPr>
           </a:p>
@@ -7162,7 +7088,7 @@
     </p:spTree>
     <p:extLst>
       <p:ext uri="{BB962C8B-B14F-4D97-AF65-F5344CB8AC3E}">
-        <p14:creationId xmlns:p14="http://schemas.microsoft.com/office/powerpoint/2010/main" val="2747596967"/>
+        <p14:creationId xmlns:p14="http://schemas.microsoft.com/office/powerpoint/2010/main" val="3680270425"/>
       </p:ext>
     </p:extLst>
   </p:cSld>
@@ -7218,7 +7144,7 @@
                   <a:srgbClr val="0070C0"/>
                 </a:solidFill>
               </a:rPr>
-              <a:t>Dinâmica</a:t>
+              <a:t>Aprenda</a:t>
             </a:r>
             <a:r>
               <a:rPr lang="en-US" b="1" dirty="0">
@@ -7226,21 +7152,8 @@
                   <a:srgbClr val="0070C0"/>
                 </a:solidFill>
               </a:rPr>
-              <a:t>/</a:t>
-            </a:r>
-            <a:r>
-              <a:rPr lang="en-US" b="1" dirty="0" err="1">
-                <a:solidFill>
-                  <a:srgbClr val="0070C0"/>
-                </a:solidFill>
-              </a:rPr>
-              <a:t>Atividades</a:t>
-            </a:r>
-            <a:endParaRPr lang="en-US" b="1" dirty="0">
-              <a:solidFill>
-                <a:srgbClr val="0070C0"/>
-              </a:solidFill>
-            </a:endParaRPr>
+              <a:t>+</a:t>
+            </a:r>
           </a:p>
         </p:txBody>
       </p:sp>
@@ -7256,8 +7169,8 @@
         </p:nvSpPr>
         <p:spPr>
           <a:xfrm>
-            <a:off x="139472" y="1063230"/>
-            <a:ext cx="8865056" cy="3606305"/>
+            <a:off x="142865" y="1200150"/>
+            <a:ext cx="8865056" cy="3572265"/>
           </a:xfrm>
         </p:spPr>
         <p:txBody>
@@ -7270,58 +7183,49 @@
               <a:buNone/>
             </a:pPr>
             <a:r>
-              <a:rPr lang="pt-BR" dirty="0">
-                <a:latin typeface="Times New Roman" panose="02020603050405020304" pitchFamily="18" charset="0"/>
-                <a:cs typeface="Times New Roman" panose="02020603050405020304" pitchFamily="18" charset="0"/>
-              </a:rPr>
-              <a:t>- Imprimir </a:t>
-            </a:r>
-            <a:r>
-              <a:rPr lang="pt-BR" dirty="0" err="1">
-                <a:latin typeface="Times New Roman" panose="02020603050405020304" pitchFamily="18" charset="0"/>
-                <a:cs typeface="Times New Roman" panose="02020603050405020304" pitchFamily="18" charset="0"/>
-              </a:rPr>
-              <a:t>Hello</a:t>
-            </a:r>
-            <a:r>
-              <a:rPr lang="pt-BR" dirty="0">
-                <a:latin typeface="Times New Roman" panose="02020603050405020304" pitchFamily="18" charset="0"/>
-                <a:cs typeface="Times New Roman" panose="02020603050405020304" pitchFamily="18" charset="0"/>
-              </a:rPr>
-              <a:t> World em Python.</a:t>
+              <a:rPr lang="pt-BR" sz="1800" dirty="0">
+                <a:latin typeface="Times New Roman" panose="02020603050405020304" pitchFamily="18" charset="0"/>
+                <a:cs typeface="Times New Roman" panose="02020603050405020304" pitchFamily="18" charset="0"/>
+              </a:rPr>
+              <a:t>[1] Artigo: "9 razões para aprender programação". Disponível em: </a:t>
+            </a:r>
+            <a:r>
+              <a:rPr lang="pt-BR" sz="1800" dirty="0">
+                <a:latin typeface="Times New Roman" panose="02020603050405020304" pitchFamily="18" charset="0"/>
+                <a:cs typeface="Times New Roman" panose="02020603050405020304" pitchFamily="18" charset="0"/>
+                <a:hlinkClick r:id="rId3"/>
+              </a:rPr>
+              <a:t>https://www.digitalhouse.com/</a:t>
+            </a:r>
+            <a:r>
+              <a:rPr lang="pt-BR" sz="1800" dirty="0" err="1">
+                <a:latin typeface="Times New Roman" panose="02020603050405020304" pitchFamily="18" charset="0"/>
+                <a:cs typeface="Times New Roman" panose="02020603050405020304" pitchFamily="18" charset="0"/>
+                <a:hlinkClick r:id="rId3"/>
+              </a:rPr>
+              <a:t>br</a:t>
+            </a:r>
+            <a:r>
+              <a:rPr lang="pt-BR" sz="1800" dirty="0">
+                <a:latin typeface="Times New Roman" panose="02020603050405020304" pitchFamily="18" charset="0"/>
+                <a:cs typeface="Times New Roman" panose="02020603050405020304" pitchFamily="18" charset="0"/>
+                <a:hlinkClick r:id="rId3"/>
+              </a:rPr>
+              <a:t>/blog/9-motivos-aprender-programar-programador</a:t>
+            </a:r>
+            <a:r>
+              <a:rPr lang="pt-BR" sz="1800" dirty="0">
+                <a:latin typeface="Times New Roman" panose="02020603050405020304" pitchFamily="18" charset="0"/>
+                <a:cs typeface="Times New Roman" panose="02020603050405020304" pitchFamily="18" charset="0"/>
+              </a:rPr>
+              <a:t>.</a:t>
             </a:r>
           </a:p>
           <a:p>
             <a:pPr marL="0" indent="0" algn="just">
               <a:buNone/>
             </a:pPr>
-            <a:r>
-              <a:rPr lang="pt-BR" dirty="0">
-                <a:latin typeface="Times New Roman" panose="02020603050405020304" pitchFamily="18" charset="0"/>
-                <a:cs typeface="Times New Roman" panose="02020603050405020304" pitchFamily="18" charset="0"/>
-              </a:rPr>
-              <a:t>  Utilizar comando print(‘</a:t>
-            </a:r>
-            <a:r>
-              <a:rPr lang="pt-BR" dirty="0" err="1">
-                <a:latin typeface="Times New Roman" panose="02020603050405020304" pitchFamily="18" charset="0"/>
-                <a:cs typeface="Times New Roman" panose="02020603050405020304" pitchFamily="18" charset="0"/>
-              </a:rPr>
-              <a:t>Hello</a:t>
-            </a:r>
-            <a:r>
-              <a:rPr lang="pt-BR" dirty="0">
-                <a:latin typeface="Times New Roman" panose="02020603050405020304" pitchFamily="18" charset="0"/>
-                <a:cs typeface="Times New Roman" panose="02020603050405020304" pitchFamily="18" charset="0"/>
-              </a:rPr>
-              <a:t> World’);</a:t>
-            </a:r>
-          </a:p>
-          <a:p>
-            <a:pPr marL="0" indent="0" algn="just">
-              <a:buNone/>
-            </a:pPr>
-            <a:endParaRPr lang="pt-BR" dirty="0">
+            <a:endParaRPr lang="pt-BR" sz="1800" dirty="0">
               <a:latin typeface="Times New Roman" panose="02020603050405020304" pitchFamily="18" charset="0"/>
               <a:cs typeface="Times New Roman" panose="02020603050405020304" pitchFamily="18" charset="0"/>
             </a:endParaRPr>
@@ -7331,21 +7235,26 @@
               <a:buNone/>
             </a:pPr>
             <a:r>
-              <a:rPr lang="pt-BR" dirty="0">
-                <a:latin typeface="Times New Roman" panose="02020603050405020304" pitchFamily="18" charset="0"/>
-                <a:cs typeface="Times New Roman" panose="02020603050405020304" pitchFamily="18" charset="0"/>
-              </a:rPr>
-              <a:t>Nota: Acessar </a:t>
-            </a:r>
-            <a:r>
-              <a:rPr lang="pt-BR" dirty="0">
-                <a:latin typeface="Times New Roman" panose="02020603050405020304" pitchFamily="18" charset="0"/>
-                <a:cs typeface="Times New Roman" panose="02020603050405020304" pitchFamily="18" charset="0"/>
-                <a:hlinkClick r:id="rId3"/>
-              </a:rPr>
-              <a:t>https://onlinegdb.com</a:t>
-            </a:r>
-            <a:endParaRPr lang="pt-BR" dirty="0">
+              <a:rPr lang="pt-BR" sz="1800" dirty="0">
+                <a:latin typeface="Times New Roman" panose="02020603050405020304" pitchFamily="18" charset="0"/>
+                <a:cs typeface="Times New Roman" panose="02020603050405020304" pitchFamily="18" charset="0"/>
+              </a:rPr>
+              <a:t>[2] </a:t>
+            </a:r>
+          </a:p>
+          <a:p>
+            <a:pPr marL="0" indent="0" algn="just">
+              <a:buNone/>
+            </a:pPr>
+            <a:r>
+              <a:rPr lang="pt-BR" sz="1800" dirty="0">
+                <a:latin typeface="Times New Roman" panose="02020603050405020304" pitchFamily="18" charset="0"/>
+                <a:cs typeface="Times New Roman" panose="02020603050405020304" pitchFamily="18" charset="0"/>
+                <a:hlinkClick r:id="rId4"/>
+              </a:rPr>
+              <a:t>https://www.treinaweb.com.br/blog/quais-as-diferencas-entre-tipagens-estatica-ou-dinamica-e-forte-ou-fraca?gclid=CjwKCAiAvOeQBhBkEiwAxutUVJAITKYmBgabusxcdVhB2GMAIC9CT_L4Cj7WGbSVhfoYbDq1T_oqqBoCbGMQAvD_BwE</a:t>
+            </a:r>
+            <a:endParaRPr lang="pt-BR" sz="1800" dirty="0">
               <a:latin typeface="Times New Roman" panose="02020603050405020304" pitchFamily="18" charset="0"/>
               <a:cs typeface="Times New Roman" panose="02020603050405020304" pitchFamily="18" charset="0"/>
             </a:endParaRPr>
@@ -7354,7 +7263,7 @@
             <a:pPr marL="0" indent="0" algn="just">
               <a:buNone/>
             </a:pPr>
-            <a:endParaRPr lang="pt-BR" dirty="0">
+            <a:endParaRPr lang="pt-BR" sz="1800" dirty="0">
               <a:latin typeface="Times New Roman" panose="02020603050405020304" pitchFamily="18" charset="0"/>
               <a:cs typeface="Times New Roman" panose="02020603050405020304" pitchFamily="18" charset="0"/>
             </a:endParaRPr>
@@ -7363,7 +7272,22 @@
             <a:pPr marL="0" indent="0" algn="just">
               <a:buNone/>
             </a:pPr>
-            <a:endParaRPr lang="pt-BR" dirty="0">
+            <a:r>
+              <a:rPr lang="pt-BR" sz="1800" dirty="0">
+                <a:latin typeface="Times New Roman" panose="02020603050405020304" pitchFamily="18" charset="0"/>
+                <a:cs typeface="Times New Roman" panose="02020603050405020304" pitchFamily="18" charset="0"/>
+              </a:rPr>
+              <a:t>[3] Vídeo "Por que todos deveriam aprender a programar?". Disponível em:  </a:t>
+            </a:r>
+            <a:r>
+              <a:rPr lang="pt-BR" sz="1800" dirty="0">
+                <a:latin typeface="Times New Roman" panose="02020603050405020304" pitchFamily="18" charset="0"/>
+                <a:cs typeface="Times New Roman" panose="02020603050405020304" pitchFamily="18" charset="0"/>
+                <a:hlinkClick r:id="rId5"/>
+              </a:rPr>
+              <a:t>https://www.youtube.com/watch?v=mHW1Hsqlp6A</a:t>
+            </a:r>
+            <a:endParaRPr lang="pt-BR" sz="1800" dirty="0">
               <a:latin typeface="Times New Roman" panose="02020603050405020304" pitchFamily="18" charset="0"/>
               <a:cs typeface="Times New Roman" panose="02020603050405020304" pitchFamily="18" charset="0"/>
             </a:endParaRPr>
@@ -7372,28 +7296,52 @@
             <a:pPr marL="0" indent="0" algn="just">
               <a:buNone/>
             </a:pPr>
-            <a:endParaRPr lang="pt-BR" dirty="0">
+            <a:endParaRPr lang="pt-BR" sz="1800" dirty="0">
               <a:latin typeface="Times New Roman" panose="02020603050405020304" pitchFamily="18" charset="0"/>
               <a:cs typeface="Times New Roman" panose="02020603050405020304" pitchFamily="18" charset="0"/>
             </a:endParaRPr>
           </a:p>
           <a:p>
-            <a:pPr algn="just"/>
-            <a:endParaRPr lang="pt-BR" dirty="0">
+            <a:pPr marL="0" indent="0" algn="just">
+              <a:buNone/>
+            </a:pPr>
+            <a:endParaRPr lang="pt-BR" sz="1800" dirty="0">
               <a:latin typeface="Times New Roman" panose="02020603050405020304" pitchFamily="18" charset="0"/>
               <a:cs typeface="Times New Roman" panose="02020603050405020304" pitchFamily="18" charset="0"/>
             </a:endParaRPr>
           </a:p>
           <a:p>
-            <a:pPr algn="just"/>
-            <a:endParaRPr lang="pt-BR" dirty="0">
+            <a:pPr marL="0" indent="0" algn="just">
+              <a:buNone/>
+            </a:pPr>
+            <a:endParaRPr lang="pt-BR" sz="1800" dirty="0">
               <a:latin typeface="Times New Roman" panose="02020603050405020304" pitchFamily="18" charset="0"/>
               <a:cs typeface="Times New Roman" panose="02020603050405020304" pitchFamily="18" charset="0"/>
             </a:endParaRPr>
           </a:p>
           <a:p>
-            <a:pPr algn="just"/>
-            <a:endParaRPr lang="pt-BR" dirty="0">
+            <a:pPr marL="0" indent="0" algn="just">
+              <a:buNone/>
+            </a:pPr>
+            <a:endParaRPr lang="pt-BR" sz="1800" dirty="0">
+              <a:latin typeface="Times New Roman" panose="02020603050405020304" pitchFamily="18" charset="0"/>
+              <a:cs typeface="Times New Roman" panose="02020603050405020304" pitchFamily="18" charset="0"/>
+            </a:endParaRPr>
+          </a:p>
+          <a:p>
+            <a:pPr marL="0" indent="0" algn="just">
+              <a:buNone/>
+            </a:pPr>
+            <a:endParaRPr lang="pt-BR" sz="1800" dirty="0">
+              <a:latin typeface="Times New Roman" panose="02020603050405020304" pitchFamily="18" charset="0"/>
+              <a:cs typeface="Times New Roman" panose="02020603050405020304" pitchFamily="18" charset="0"/>
+            </a:endParaRPr>
+          </a:p>
+          <a:p>
+            <a:pPr marL="0" indent="0" algn="just">
+              <a:buNone/>
+            </a:pPr>
+            <a:endParaRPr lang="pt-BR" sz="1800" dirty="0">
               <a:latin typeface="Calibri" panose="020F0502020204030204" pitchFamily="34" charset="0"/>
             </a:endParaRPr>
           </a:p>
@@ -7402,7 +7350,7 @@
     </p:spTree>
     <p:extLst>
       <p:ext uri="{BB962C8B-B14F-4D97-AF65-F5344CB8AC3E}">
-        <p14:creationId xmlns:p14="http://schemas.microsoft.com/office/powerpoint/2010/main" val="2470652989"/>
+        <p14:creationId xmlns:p14="http://schemas.microsoft.com/office/powerpoint/2010/main" val="2747596967"/>
       </p:ext>
     </p:extLst>
   </p:cSld>
@@ -7458,7 +7406,7 @@
                   <a:srgbClr val="0070C0"/>
                 </a:solidFill>
               </a:rPr>
-              <a:t>Referências</a:t>
+              <a:t>Dinâmica</a:t>
             </a:r>
             <a:r>
               <a:rPr lang="en-US" b="1" dirty="0">
@@ -7466,7 +7414,7 @@
                   <a:srgbClr val="0070C0"/>
                 </a:solidFill>
               </a:rPr>
-              <a:t> </a:t>
+              <a:t>/</a:t>
             </a:r>
             <a:r>
               <a:rPr lang="en-US" b="1" dirty="0" err="1">
@@ -7474,7 +7422,7 @@
                   <a:srgbClr val="0070C0"/>
                 </a:solidFill>
               </a:rPr>
-              <a:t>Bibliográficas</a:t>
+              <a:t>Atividades</a:t>
             </a:r>
             <a:endParaRPr lang="en-US" b="1" dirty="0">
               <a:solidFill>
@@ -7496,8 +7444,8 @@
         </p:nvSpPr>
         <p:spPr>
           <a:xfrm>
-            <a:off x="142865" y="1200151"/>
-            <a:ext cx="8865056" cy="3394472"/>
+            <a:off x="139472" y="1063230"/>
+            <a:ext cx="8865056" cy="3606305"/>
           </a:xfrm>
         </p:spPr>
         <p:txBody>
@@ -7510,18 +7458,58 @@
               <a:buNone/>
             </a:pPr>
             <a:r>
-              <a:rPr lang="pt-BR" sz="2400" dirty="0">
-                <a:latin typeface="Times New Roman" panose="02020603050405020304" pitchFamily="18" charset="0"/>
-                <a:cs typeface="Times New Roman" panose="02020603050405020304" pitchFamily="18" charset="0"/>
-              </a:rPr>
-              <a:t>[1] SEBESTA, Robert W. Conceitos de Linguagens de Programação. 11. edição. Porto Alegre: Bookman, 2018., Capítulo 1 (Preliminares).</a:t>
+              <a:rPr lang="pt-BR" dirty="0">
+                <a:latin typeface="Times New Roman" panose="02020603050405020304" pitchFamily="18" charset="0"/>
+                <a:cs typeface="Times New Roman" panose="02020603050405020304" pitchFamily="18" charset="0"/>
+              </a:rPr>
+              <a:t>- Imprimir </a:t>
+            </a:r>
+            <a:r>
+              <a:rPr lang="pt-BR" dirty="0" err="1">
+                <a:latin typeface="Times New Roman" panose="02020603050405020304" pitchFamily="18" charset="0"/>
+                <a:cs typeface="Times New Roman" panose="02020603050405020304" pitchFamily="18" charset="0"/>
+              </a:rPr>
+              <a:t>Hello</a:t>
+            </a:r>
+            <a:r>
+              <a:rPr lang="pt-BR" dirty="0">
+                <a:latin typeface="Times New Roman" panose="02020603050405020304" pitchFamily="18" charset="0"/>
+                <a:cs typeface="Times New Roman" panose="02020603050405020304" pitchFamily="18" charset="0"/>
+              </a:rPr>
+              <a:t> World em Python.</a:t>
             </a:r>
           </a:p>
           <a:p>
             <a:pPr marL="0" indent="0" algn="just">
               <a:buNone/>
             </a:pPr>
-            <a:endParaRPr lang="pt-BR" sz="2400" dirty="0">
+            <a:r>
+              <a:rPr lang="pt-BR" dirty="0">
+                <a:latin typeface="Times New Roman" panose="02020603050405020304" pitchFamily="18" charset="0"/>
+                <a:cs typeface="Times New Roman" panose="02020603050405020304" pitchFamily="18" charset="0"/>
+              </a:rPr>
+              <a:t>  Utilizar comando print(‘</a:t>
+            </a:r>
+            <a:r>
+              <a:rPr lang="pt-BR" dirty="0" err="1">
+                <a:latin typeface="Times New Roman" panose="02020603050405020304" pitchFamily="18" charset="0"/>
+                <a:cs typeface="Times New Roman" panose="02020603050405020304" pitchFamily="18" charset="0"/>
+              </a:rPr>
+              <a:t>Hello</a:t>
+            </a:r>
+            <a:r>
+              <a:rPr lang="pt-BR" dirty="0">
+                <a:latin typeface="Times New Roman" panose="02020603050405020304" pitchFamily="18" charset="0"/>
+                <a:cs typeface="Times New Roman" panose="02020603050405020304" pitchFamily="18" charset="0"/>
+              </a:rPr>
+              <a:t> World’);</a:t>
+            </a:r>
+          </a:p>
+          <a:p>
+            <a:pPr marL="0" indent="0" algn="just">
+              <a:buNone/>
+            </a:pPr>
+            <a:endParaRPr lang="pt-BR" dirty="0">
               <a:latin typeface="Times New Roman" panose="02020603050405020304" pitchFamily="18" charset="0"/>
               <a:cs typeface="Times New Roman" panose="02020603050405020304" pitchFamily="18" charset="0"/>
             </a:endParaRPr>
@@ -7531,18 +7519,21 @@
               <a:buNone/>
             </a:pPr>
             <a:r>
-              <a:rPr lang="pt-BR" sz="2400" dirty="0">
-                <a:latin typeface="Times New Roman" panose="02020603050405020304" pitchFamily="18" charset="0"/>
-                <a:cs typeface="Times New Roman" panose="02020603050405020304" pitchFamily="18" charset="0"/>
-              </a:rPr>
-              <a:t>[2] Artigo: "9 razões para aprender programação".</a:t>
-            </a:r>
-          </a:p>
-          <a:p>
-            <a:pPr marL="0" indent="0" algn="just">
-              <a:buNone/>
-            </a:pPr>
-            <a:endParaRPr lang="pt-BR" sz="2400" dirty="0">
+              <a:rPr lang="pt-BR" dirty="0">
+                <a:latin typeface="Times New Roman" panose="02020603050405020304" pitchFamily="18" charset="0"/>
+                <a:cs typeface="Times New Roman" panose="02020603050405020304" pitchFamily="18" charset="0"/>
+              </a:rPr>
+              <a:t>Nota: Acessar </a:t>
+            </a:r>
+            <a:r>
+              <a:rPr lang="pt-BR" dirty="0">
+                <a:latin typeface="Times New Roman" panose="02020603050405020304" pitchFamily="18" charset="0"/>
+                <a:cs typeface="Times New Roman" panose="02020603050405020304" pitchFamily="18" charset="0"/>
+                <a:hlinkClick r:id="rId3"/>
+              </a:rPr>
+              <a:t>https://onlinegdb.com</a:t>
+            </a:r>
+            <a:endParaRPr lang="pt-BR" dirty="0">
               <a:latin typeface="Times New Roman" panose="02020603050405020304" pitchFamily="18" charset="0"/>
               <a:cs typeface="Times New Roman" panose="02020603050405020304" pitchFamily="18" charset="0"/>
             </a:endParaRPr>
@@ -7551,7 +7542,7 @@
             <a:pPr marL="0" indent="0" algn="just">
               <a:buNone/>
             </a:pPr>
-            <a:endParaRPr lang="pt-BR" sz="2400" dirty="0">
+            <a:endParaRPr lang="pt-BR" dirty="0">
               <a:latin typeface="Times New Roman" panose="02020603050405020304" pitchFamily="18" charset="0"/>
               <a:cs typeface="Times New Roman" panose="02020603050405020304" pitchFamily="18" charset="0"/>
             </a:endParaRPr>
@@ -7560,7 +7551,37 @@
             <a:pPr marL="0" indent="0" algn="just">
               <a:buNone/>
             </a:pPr>
-            <a:endParaRPr lang="pt-BR" sz="2400" dirty="0">
+            <a:endParaRPr lang="pt-BR" dirty="0">
+              <a:latin typeface="Times New Roman" panose="02020603050405020304" pitchFamily="18" charset="0"/>
+              <a:cs typeface="Times New Roman" panose="02020603050405020304" pitchFamily="18" charset="0"/>
+            </a:endParaRPr>
+          </a:p>
+          <a:p>
+            <a:pPr marL="0" indent="0" algn="just">
+              <a:buNone/>
+            </a:pPr>
+            <a:endParaRPr lang="pt-BR" dirty="0">
+              <a:latin typeface="Times New Roman" panose="02020603050405020304" pitchFamily="18" charset="0"/>
+              <a:cs typeface="Times New Roman" panose="02020603050405020304" pitchFamily="18" charset="0"/>
+            </a:endParaRPr>
+          </a:p>
+          <a:p>
+            <a:pPr algn="just"/>
+            <a:endParaRPr lang="pt-BR" dirty="0">
+              <a:latin typeface="Times New Roman" panose="02020603050405020304" pitchFamily="18" charset="0"/>
+              <a:cs typeface="Times New Roman" panose="02020603050405020304" pitchFamily="18" charset="0"/>
+            </a:endParaRPr>
+          </a:p>
+          <a:p>
+            <a:pPr algn="just"/>
+            <a:endParaRPr lang="pt-BR" dirty="0">
+              <a:latin typeface="Times New Roman" panose="02020603050405020304" pitchFamily="18" charset="0"/>
+              <a:cs typeface="Times New Roman" panose="02020603050405020304" pitchFamily="18" charset="0"/>
+            </a:endParaRPr>
+          </a:p>
+          <a:p>
+            <a:pPr algn="just"/>
+            <a:endParaRPr lang="pt-BR" dirty="0">
               <a:latin typeface="Calibri" panose="020F0502020204030204" pitchFamily="34" charset="0"/>
             </a:endParaRPr>
           </a:p>
@@ -7569,7 +7590,7 @@
     </p:spTree>
     <p:extLst>
       <p:ext uri="{BB962C8B-B14F-4D97-AF65-F5344CB8AC3E}">
-        <p14:creationId xmlns:p14="http://schemas.microsoft.com/office/powerpoint/2010/main" val="1115311843"/>
+        <p14:creationId xmlns:p14="http://schemas.microsoft.com/office/powerpoint/2010/main" val="2470652989"/>
       </p:ext>
     </p:extLst>
   </p:cSld>
@@ -7597,96 +7618,9 @@
           <a:chExt cx="0" cy="0"/>
         </a:xfrm>
       </p:grpSpPr>
-      <p:pic>
-        <p:nvPicPr>
-          <p:cNvPr id="112" name="Picture 6" descr="Picture 6"/>
-          <p:cNvPicPr>
-            <a:picLocks noChangeAspect="1"/>
-          </p:cNvPicPr>
-          <p:nvPr/>
-        </p:nvPicPr>
-        <p:blipFill>
-          <a:blip r:embed="rId2"/>
-          <a:stretch>
-            <a:fillRect/>
-          </a:stretch>
-        </p:blipFill>
-        <p:spPr>
-          <a:xfrm>
-            <a:off x="0" y="0"/>
-            <a:ext cx="9144000" cy="5143500"/>
-          </a:xfrm>
-          <a:prstGeom prst="rect">
-            <a:avLst/>
-          </a:prstGeom>
-          <a:ln w="12700">
-            <a:miter lim="400000"/>
-            <a:headEnd/>
-            <a:tailEnd/>
-          </a:ln>
-        </p:spPr>
-      </p:pic>
-      <p:pic>
-        <p:nvPicPr>
-          <p:cNvPr id="114" name="Picture 5" descr="Picture 5"/>
-          <p:cNvPicPr>
-            <a:picLocks noChangeAspect="1"/>
-          </p:cNvPicPr>
-          <p:nvPr/>
-        </p:nvPicPr>
-        <p:blipFill>
-          <a:blip r:embed="rId3"/>
-          <a:stretch>
-            <a:fillRect/>
-          </a:stretch>
-        </p:blipFill>
-        <p:spPr>
-          <a:xfrm>
-            <a:off x="469900" y="0"/>
-            <a:ext cx="4391984" cy="171450"/>
-          </a:xfrm>
-          <a:prstGeom prst="rect">
-            <a:avLst/>
-          </a:prstGeom>
-          <a:ln w="12700">
-            <a:miter lim="400000"/>
-            <a:headEnd/>
-            <a:tailEnd/>
-          </a:ln>
-        </p:spPr>
-      </p:pic>
-      <p:pic>
-        <p:nvPicPr>
-          <p:cNvPr id="115" name="Imagem" descr="Imagem"/>
-          <p:cNvPicPr>
-            <a:picLocks noChangeAspect="1"/>
-          </p:cNvPicPr>
-          <p:nvPr/>
-        </p:nvPicPr>
-        <p:blipFill>
-          <a:blip r:embed="rId4"/>
-          <a:stretch>
-            <a:fillRect/>
-          </a:stretch>
-        </p:blipFill>
-        <p:spPr>
-          <a:xfrm>
-            <a:off x="823046" y="300823"/>
-            <a:ext cx="3685692" cy="1189055"/>
-          </a:xfrm>
-          <a:prstGeom prst="rect">
-            <a:avLst/>
-          </a:prstGeom>
-          <a:ln w="12700">
-            <a:miter lim="400000"/>
-            <a:headEnd/>
-            <a:tailEnd/>
-          </a:ln>
-        </p:spPr>
-      </p:pic>
       <p:sp>
         <p:nvSpPr>
-          <p:cNvPr id="3" name="Título 2"/>
+          <p:cNvPr id="6" name="Title 1"/>
           <p:cNvSpPr>
             <a:spLocks noGrp="1"/>
           </p:cNvSpPr>
@@ -7696,8 +7630,62 @@
         </p:nvSpPr>
         <p:spPr>
           <a:xfrm>
-            <a:off x="285751" y="2386770"/>
-            <a:ext cx="8615364" cy="1102519"/>
+            <a:off x="457200" y="205980"/>
+            <a:ext cx="8229600" cy="857251"/>
+          </a:xfrm>
+        </p:spPr>
+        <p:txBody>
+          <a:bodyPr>
+            <a:normAutofit/>
+          </a:bodyPr>
+          <a:lstStyle/>
+          <a:p>
+            <a:r>
+              <a:rPr lang="en-US" b="1" dirty="0" err="1">
+                <a:solidFill>
+                  <a:srgbClr val="0070C0"/>
+                </a:solidFill>
+              </a:rPr>
+              <a:t>Referências</a:t>
+            </a:r>
+            <a:r>
+              <a:rPr lang="en-US" b="1" dirty="0">
+                <a:solidFill>
+                  <a:srgbClr val="0070C0"/>
+                </a:solidFill>
+              </a:rPr>
+              <a:t> </a:t>
+            </a:r>
+            <a:r>
+              <a:rPr lang="en-US" b="1" dirty="0" err="1">
+                <a:solidFill>
+                  <a:srgbClr val="0070C0"/>
+                </a:solidFill>
+              </a:rPr>
+              <a:t>Bibliográficas</a:t>
+            </a:r>
+            <a:endParaRPr lang="en-US" b="1" dirty="0">
+              <a:solidFill>
+                <a:srgbClr val="0070C0"/>
+              </a:solidFill>
+            </a:endParaRPr>
+          </a:p>
+        </p:txBody>
+      </p:sp>
+      <p:sp>
+        <p:nvSpPr>
+          <p:cNvPr id="8" name="Text Placeholder 2"/>
+          <p:cNvSpPr>
+            <a:spLocks noGrp="1"/>
+          </p:cNvSpPr>
+          <p:nvPr>
+            <p:ph type="body" sz="half" idx="1"/>
+          </p:nvPr>
+        </p:nvSpPr>
+        <p:spPr>
+          <a:xfrm>
+            <a:off x="142865" y="1200151"/>
+            <a:ext cx="8865056" cy="3394472"/>
           </a:xfrm>
         </p:spPr>
         <p:txBody>
@@ -7706,323 +7694,72 @@
           </a:bodyPr>
           <a:lstStyle/>
           <a:p>
-            <a:r>
-              <a:rPr lang="pt-BR" sz="4800" b="1" dirty="0">
-                <a:solidFill>
-                  <a:schemeClr val="bg1"/>
-                </a:solidFill>
-              </a:rPr>
-              <a:t>Programação Python</a:t>
-            </a:r>
-          </a:p>
-        </p:txBody>
-      </p:sp>
-      <p:sp>
-        <p:nvSpPr>
-          <p:cNvPr id="6" name="Título 2"/>
-          <p:cNvSpPr txBox="1"/>
-          <p:nvPr/>
-        </p:nvSpPr>
-        <p:spPr>
-          <a:xfrm>
-            <a:off x="975683" y="3866663"/>
-            <a:ext cx="7772400" cy="1102519"/>
-          </a:xfrm>
-          <a:prstGeom prst="rect">
-            <a:avLst/>
-          </a:prstGeom>
-          <a:ln w="12700">
-            <a:miter lim="400000"/>
-          </a:ln>
-        </p:spPr>
-        <p:txBody>
-          <a:bodyPr lIns="45718" tIns="45718" rIns="45718" bIns="45718" anchor="ctr">
-            <a:noAutofit/>
-          </a:bodyPr>
-          <a:lstStyle>
-            <a:lvl1pPr marL="0" marR="0" indent="0" algn="ctr" defTabSz="457200" rtl="0" latinLnBrk="0">
-              <a:lnSpc>
-                <a:spcPct val="100000"/>
-              </a:lnSpc>
-              <a:spcBef>
-                <a:spcPts val="0"/>
-              </a:spcBef>
-              <a:spcAft>
-                <a:spcPts val="0"/>
-              </a:spcAft>
-              <a:buClrTx/>
-              <a:buSzTx/>
-              <a:buFontTx/>
-              <a:buNone/>
-              <a:defRPr sz="4400" b="0" i="0" u="none" strike="noStrike" cap="none" spc="0" baseline="0">
-                <a:ln>
-                  <a:noFill/>
-                </a:ln>
-                <a:solidFill>
-                  <a:srgbClr val="000000"/>
-                </a:solidFill>
-                <a:uFillTx/>
-                <a:latin typeface="+mj-lt"/>
-                <a:ea typeface="+mj-ea"/>
-                <a:cs typeface="+mj-cs"/>
-                <a:sym typeface="Calibri"/>
-              </a:defRPr>
-            </a:lvl1pPr>
-            <a:lvl2pPr marL="0" marR="0" indent="0" algn="ctr" defTabSz="457200" rtl="0" latinLnBrk="0">
-              <a:lnSpc>
-                <a:spcPct val="100000"/>
-              </a:lnSpc>
-              <a:spcBef>
-                <a:spcPts val="0"/>
-              </a:spcBef>
-              <a:spcAft>
-                <a:spcPts val="0"/>
-              </a:spcAft>
-              <a:buClrTx/>
-              <a:buSzTx/>
-              <a:buFontTx/>
-              <a:buNone/>
-              <a:defRPr sz="4400" b="0" i="0" u="none" strike="noStrike" cap="none" spc="0" baseline="0">
-                <a:ln>
-                  <a:noFill/>
-                </a:ln>
-                <a:solidFill>
-                  <a:srgbClr val="000000"/>
-                </a:solidFill>
-                <a:uFillTx/>
-                <a:latin typeface="+mj-lt"/>
-                <a:ea typeface="+mj-ea"/>
-                <a:cs typeface="+mj-cs"/>
-                <a:sym typeface="Calibri"/>
-              </a:defRPr>
-            </a:lvl2pPr>
-            <a:lvl3pPr marL="0" marR="0" indent="0" algn="ctr" defTabSz="457200" rtl="0" latinLnBrk="0">
-              <a:lnSpc>
-                <a:spcPct val="100000"/>
-              </a:lnSpc>
-              <a:spcBef>
-                <a:spcPts val="0"/>
-              </a:spcBef>
-              <a:spcAft>
-                <a:spcPts val="0"/>
-              </a:spcAft>
-              <a:buClrTx/>
-              <a:buSzTx/>
-              <a:buFontTx/>
-              <a:buNone/>
-              <a:defRPr sz="4400" b="0" i="0" u="none" strike="noStrike" cap="none" spc="0" baseline="0">
-                <a:ln>
-                  <a:noFill/>
-                </a:ln>
-                <a:solidFill>
-                  <a:srgbClr val="000000"/>
-                </a:solidFill>
-                <a:uFillTx/>
-                <a:latin typeface="+mj-lt"/>
-                <a:ea typeface="+mj-ea"/>
-                <a:cs typeface="+mj-cs"/>
-                <a:sym typeface="Calibri"/>
-              </a:defRPr>
-            </a:lvl3pPr>
-            <a:lvl4pPr marL="0" marR="0" indent="0" algn="ctr" defTabSz="457200" rtl="0" latinLnBrk="0">
-              <a:lnSpc>
-                <a:spcPct val="100000"/>
-              </a:lnSpc>
-              <a:spcBef>
-                <a:spcPts val="0"/>
-              </a:spcBef>
-              <a:spcAft>
-                <a:spcPts val="0"/>
-              </a:spcAft>
-              <a:buClrTx/>
-              <a:buSzTx/>
-              <a:buFontTx/>
-              <a:buNone/>
-              <a:defRPr sz="4400" b="0" i="0" u="none" strike="noStrike" cap="none" spc="0" baseline="0">
-                <a:ln>
-                  <a:noFill/>
-                </a:ln>
-                <a:solidFill>
-                  <a:srgbClr val="000000"/>
-                </a:solidFill>
-                <a:uFillTx/>
-                <a:latin typeface="+mj-lt"/>
-                <a:ea typeface="+mj-ea"/>
-                <a:cs typeface="+mj-cs"/>
-                <a:sym typeface="Calibri"/>
-              </a:defRPr>
-            </a:lvl4pPr>
-            <a:lvl5pPr marL="0" marR="0" indent="0" algn="ctr" defTabSz="457200" rtl="0" latinLnBrk="0">
-              <a:lnSpc>
-                <a:spcPct val="100000"/>
-              </a:lnSpc>
-              <a:spcBef>
-                <a:spcPts val="0"/>
-              </a:spcBef>
-              <a:spcAft>
-                <a:spcPts val="0"/>
-              </a:spcAft>
-              <a:buClrTx/>
-              <a:buSzTx/>
-              <a:buFontTx/>
-              <a:buNone/>
-              <a:defRPr sz="4400" b="0" i="0" u="none" strike="noStrike" cap="none" spc="0" baseline="0">
-                <a:ln>
-                  <a:noFill/>
-                </a:ln>
-                <a:solidFill>
-                  <a:srgbClr val="000000"/>
-                </a:solidFill>
-                <a:uFillTx/>
-                <a:latin typeface="+mj-lt"/>
-                <a:ea typeface="+mj-ea"/>
-                <a:cs typeface="+mj-cs"/>
-                <a:sym typeface="Calibri"/>
-              </a:defRPr>
-            </a:lvl5pPr>
-            <a:lvl6pPr marL="0" marR="0" indent="0" algn="ctr" defTabSz="457200" rtl="0" latinLnBrk="0">
-              <a:lnSpc>
-                <a:spcPct val="100000"/>
-              </a:lnSpc>
-              <a:spcBef>
-                <a:spcPts val="0"/>
-              </a:spcBef>
-              <a:spcAft>
-                <a:spcPts val="0"/>
-              </a:spcAft>
-              <a:buClrTx/>
-              <a:buSzTx/>
-              <a:buFontTx/>
-              <a:buNone/>
-              <a:defRPr sz="4400" b="0" i="0" u="none" strike="noStrike" cap="none" spc="0" baseline="0">
-                <a:ln>
-                  <a:noFill/>
-                </a:ln>
-                <a:solidFill>
-                  <a:srgbClr val="000000"/>
-                </a:solidFill>
-                <a:uFillTx/>
-                <a:latin typeface="+mj-lt"/>
-                <a:ea typeface="+mj-ea"/>
-                <a:cs typeface="+mj-cs"/>
-                <a:sym typeface="Calibri"/>
-              </a:defRPr>
-            </a:lvl6pPr>
-            <a:lvl7pPr marL="0" marR="0" indent="0" algn="ctr" defTabSz="457200" rtl="0" latinLnBrk="0">
-              <a:lnSpc>
-                <a:spcPct val="100000"/>
-              </a:lnSpc>
-              <a:spcBef>
-                <a:spcPts val="0"/>
-              </a:spcBef>
-              <a:spcAft>
-                <a:spcPts val="0"/>
-              </a:spcAft>
-              <a:buClrTx/>
-              <a:buSzTx/>
-              <a:buFontTx/>
-              <a:buNone/>
-              <a:defRPr sz="4400" b="0" i="0" u="none" strike="noStrike" cap="none" spc="0" baseline="0">
-                <a:ln>
-                  <a:noFill/>
-                </a:ln>
-                <a:solidFill>
-                  <a:srgbClr val="000000"/>
-                </a:solidFill>
-                <a:uFillTx/>
-                <a:latin typeface="+mj-lt"/>
-                <a:ea typeface="+mj-ea"/>
-                <a:cs typeface="+mj-cs"/>
-                <a:sym typeface="Calibri"/>
-              </a:defRPr>
-            </a:lvl7pPr>
-            <a:lvl8pPr marL="0" marR="0" indent="0" algn="ctr" defTabSz="457200" rtl="0" latinLnBrk="0">
-              <a:lnSpc>
-                <a:spcPct val="100000"/>
-              </a:lnSpc>
-              <a:spcBef>
-                <a:spcPts val="0"/>
-              </a:spcBef>
-              <a:spcAft>
-                <a:spcPts val="0"/>
-              </a:spcAft>
-              <a:buClrTx/>
-              <a:buSzTx/>
-              <a:buFontTx/>
-              <a:buNone/>
-              <a:defRPr sz="4400" b="0" i="0" u="none" strike="noStrike" cap="none" spc="0" baseline="0">
-                <a:ln>
-                  <a:noFill/>
-                </a:ln>
-                <a:solidFill>
-                  <a:srgbClr val="000000"/>
-                </a:solidFill>
-                <a:uFillTx/>
-                <a:latin typeface="+mj-lt"/>
-                <a:ea typeface="+mj-ea"/>
-                <a:cs typeface="+mj-cs"/>
-                <a:sym typeface="Calibri"/>
-              </a:defRPr>
-            </a:lvl8pPr>
-            <a:lvl9pPr marL="0" marR="0" indent="0" algn="ctr" defTabSz="457200" rtl="0" latinLnBrk="0">
-              <a:lnSpc>
-                <a:spcPct val="100000"/>
-              </a:lnSpc>
-              <a:spcBef>
-                <a:spcPts val="0"/>
-              </a:spcBef>
-              <a:spcAft>
-                <a:spcPts val="0"/>
-              </a:spcAft>
-              <a:buClrTx/>
-              <a:buSzTx/>
-              <a:buFontTx/>
-              <a:buNone/>
-              <a:defRPr sz="4400" b="0" i="0" u="none" strike="noStrike" cap="none" spc="0" baseline="0">
-                <a:ln>
-                  <a:noFill/>
-                </a:ln>
-                <a:solidFill>
-                  <a:srgbClr val="000000"/>
-                </a:solidFill>
-                <a:uFillTx/>
-                <a:latin typeface="+mj-lt"/>
-                <a:ea typeface="+mj-ea"/>
-                <a:cs typeface="+mj-cs"/>
-                <a:sym typeface="Calibri"/>
-              </a:defRPr>
-            </a:lvl9pPr>
-          </a:lstStyle>
-          <a:p>
-            <a:pPr algn="r" hangingPunct="1"/>
-            <a:r>
-              <a:rPr lang="pt-BR" sz="2000" b="1" dirty="0">
-                <a:solidFill>
-                  <a:schemeClr val="bg1"/>
-                </a:solidFill>
-              </a:rPr>
-              <a:t>Professor </a:t>
-            </a:r>
-            <a:r>
-              <a:rPr lang="pt-BR" sz="2000" b="1">
-                <a:solidFill>
-                  <a:schemeClr val="bg1"/>
-                </a:solidFill>
-              </a:rPr>
-              <a:t>M.Sc</a:t>
-            </a:r>
-            <a:r>
-              <a:rPr lang="pt-BR" sz="2000" b="1" dirty="0">
-                <a:solidFill>
-                  <a:schemeClr val="bg1"/>
-                </a:solidFill>
-              </a:rPr>
-              <a:t>. Heleno Cardoso</a:t>
-            </a:r>
+            <a:pPr marL="0" indent="0" algn="just">
+              <a:buNone/>
+            </a:pPr>
+            <a:r>
+              <a:rPr lang="pt-BR" sz="2400" dirty="0">
+                <a:latin typeface="Times New Roman" panose="02020603050405020304" pitchFamily="18" charset="0"/>
+                <a:cs typeface="Times New Roman" panose="02020603050405020304" pitchFamily="18" charset="0"/>
+              </a:rPr>
+              <a:t>[1] SEBESTA, Robert W. Conceitos de Linguagens de Programação. 11. edição. Porto Alegre: Bookman, 2018., Capítulo 1 (Preliminares).</a:t>
+            </a:r>
+          </a:p>
+          <a:p>
+            <a:pPr marL="0" indent="0" algn="just">
+              <a:buNone/>
+            </a:pPr>
+            <a:endParaRPr lang="pt-BR" sz="2400" dirty="0">
+              <a:latin typeface="Times New Roman" panose="02020603050405020304" pitchFamily="18" charset="0"/>
+              <a:cs typeface="Times New Roman" panose="02020603050405020304" pitchFamily="18" charset="0"/>
+            </a:endParaRPr>
+          </a:p>
+          <a:p>
+            <a:pPr marL="0" indent="0" algn="just">
+              <a:buNone/>
+            </a:pPr>
+            <a:r>
+              <a:rPr lang="pt-BR" sz="2400" dirty="0">
+                <a:latin typeface="Times New Roman" panose="02020603050405020304" pitchFamily="18" charset="0"/>
+                <a:cs typeface="Times New Roman" panose="02020603050405020304" pitchFamily="18" charset="0"/>
+              </a:rPr>
+              <a:t>[2] Artigo: "9 razões para aprender programação".</a:t>
+            </a:r>
+          </a:p>
+          <a:p>
+            <a:pPr marL="0" indent="0" algn="just">
+              <a:buNone/>
+            </a:pPr>
+            <a:endParaRPr lang="pt-BR" sz="2400" dirty="0">
+              <a:latin typeface="Times New Roman" panose="02020603050405020304" pitchFamily="18" charset="0"/>
+              <a:cs typeface="Times New Roman" panose="02020603050405020304" pitchFamily="18" charset="0"/>
+            </a:endParaRPr>
+          </a:p>
+          <a:p>
+            <a:pPr marL="0" indent="0" algn="just">
+              <a:buNone/>
+            </a:pPr>
+            <a:endParaRPr lang="pt-BR" sz="2400" dirty="0">
+              <a:latin typeface="Times New Roman" panose="02020603050405020304" pitchFamily="18" charset="0"/>
+              <a:cs typeface="Times New Roman" panose="02020603050405020304" pitchFamily="18" charset="0"/>
+            </a:endParaRPr>
+          </a:p>
+          <a:p>
+            <a:pPr marL="0" indent="0" algn="just">
+              <a:buNone/>
+            </a:pPr>
+            <a:endParaRPr lang="pt-BR" sz="2400" dirty="0">
+              <a:latin typeface="Calibri" panose="020F0502020204030204" pitchFamily="34" charset="0"/>
+            </a:endParaRPr>
           </a:p>
         </p:txBody>
       </p:sp>
     </p:spTree>
+    <p:extLst>
+      <p:ext uri="{BB962C8B-B14F-4D97-AF65-F5344CB8AC3E}">
+        <p14:creationId xmlns:p14="http://schemas.microsoft.com/office/powerpoint/2010/main" val="1115311843"/>
+      </p:ext>
+    </p:extLst>
   </p:cSld>
   <p:clrMapOvr>
     <a:masterClrMapping/>
@@ -8537,6 +8274,457 @@
                 </a:solidFill>
               </a:rPr>
               <a:t>MSc</a:t>
+            </a:r>
+            <a:r>
+              <a:rPr lang="pt-BR" sz="2000" b="1" dirty="0">
+                <a:solidFill>
+                  <a:schemeClr val="bg1"/>
+                </a:solidFill>
+              </a:rPr>
+              <a:t>. Heleno Cardoso</a:t>
+            </a:r>
+          </a:p>
+        </p:txBody>
+      </p:sp>
+    </p:spTree>
+  </p:cSld>
+  <p:clrMapOvr>
+    <a:masterClrMapping/>
+  </p:clrMapOvr>
+  <p:transition spd="med"/>
+</p:sld>
+</file>
+
+<file path=ppt/slides/slide20.xml><?xml version="1.0" encoding="utf-8"?>
+<p:sld xmlns:a="http://schemas.openxmlformats.org/drawingml/2006/main" xmlns:r="http://schemas.openxmlformats.org/officeDocument/2006/relationships" xmlns:p="http://schemas.openxmlformats.org/presentationml/2006/main">
+  <p:cSld>
+    <p:spTree>
+      <p:nvGrpSpPr>
+        <p:cNvPr id="1" name=""/>
+        <p:cNvGrpSpPr/>
+        <p:nvPr/>
+      </p:nvGrpSpPr>
+      <p:grpSpPr>
+        <a:xfrm>
+          <a:off x="0" y="0"/>
+          <a:ext cx="0" cy="0"/>
+          <a:chOff x="0" y="0"/>
+          <a:chExt cx="0" cy="0"/>
+        </a:xfrm>
+      </p:grpSpPr>
+      <p:pic>
+        <p:nvPicPr>
+          <p:cNvPr id="112" name="Picture 6" descr="Picture 6"/>
+          <p:cNvPicPr>
+            <a:picLocks noChangeAspect="1"/>
+          </p:cNvPicPr>
+          <p:nvPr/>
+        </p:nvPicPr>
+        <p:blipFill>
+          <a:blip r:embed="rId2"/>
+          <a:stretch>
+            <a:fillRect/>
+          </a:stretch>
+        </p:blipFill>
+        <p:spPr>
+          <a:xfrm>
+            <a:off x="0" y="0"/>
+            <a:ext cx="9144000" cy="5143500"/>
+          </a:xfrm>
+          <a:prstGeom prst="rect">
+            <a:avLst/>
+          </a:prstGeom>
+          <a:ln w="12700">
+            <a:miter lim="400000"/>
+            <a:headEnd/>
+            <a:tailEnd/>
+          </a:ln>
+        </p:spPr>
+      </p:pic>
+      <p:pic>
+        <p:nvPicPr>
+          <p:cNvPr id="114" name="Picture 5" descr="Picture 5"/>
+          <p:cNvPicPr>
+            <a:picLocks noChangeAspect="1"/>
+          </p:cNvPicPr>
+          <p:nvPr/>
+        </p:nvPicPr>
+        <p:blipFill>
+          <a:blip r:embed="rId3"/>
+          <a:stretch>
+            <a:fillRect/>
+          </a:stretch>
+        </p:blipFill>
+        <p:spPr>
+          <a:xfrm>
+            <a:off x="469900" y="0"/>
+            <a:ext cx="4391984" cy="171450"/>
+          </a:xfrm>
+          <a:prstGeom prst="rect">
+            <a:avLst/>
+          </a:prstGeom>
+          <a:ln w="12700">
+            <a:miter lim="400000"/>
+            <a:headEnd/>
+            <a:tailEnd/>
+          </a:ln>
+        </p:spPr>
+      </p:pic>
+      <p:pic>
+        <p:nvPicPr>
+          <p:cNvPr id="115" name="Imagem" descr="Imagem"/>
+          <p:cNvPicPr>
+            <a:picLocks noChangeAspect="1"/>
+          </p:cNvPicPr>
+          <p:nvPr/>
+        </p:nvPicPr>
+        <p:blipFill>
+          <a:blip r:embed="rId4"/>
+          <a:stretch>
+            <a:fillRect/>
+          </a:stretch>
+        </p:blipFill>
+        <p:spPr>
+          <a:xfrm>
+            <a:off x="823046" y="300823"/>
+            <a:ext cx="3685692" cy="1189055"/>
+          </a:xfrm>
+          <a:prstGeom prst="rect">
+            <a:avLst/>
+          </a:prstGeom>
+          <a:ln w="12700">
+            <a:miter lim="400000"/>
+            <a:headEnd/>
+            <a:tailEnd/>
+          </a:ln>
+        </p:spPr>
+      </p:pic>
+      <p:sp>
+        <p:nvSpPr>
+          <p:cNvPr id="3" name="Título 2"/>
+          <p:cNvSpPr>
+            <a:spLocks noGrp="1"/>
+          </p:cNvSpPr>
+          <p:nvPr>
+            <p:ph type="title"/>
+          </p:nvPr>
+        </p:nvSpPr>
+        <p:spPr>
+          <a:xfrm>
+            <a:off x="285751" y="2386770"/>
+            <a:ext cx="8615364" cy="1102519"/>
+          </a:xfrm>
+        </p:spPr>
+        <p:txBody>
+          <a:bodyPr>
+            <a:noAutofit/>
+          </a:bodyPr>
+          <a:lstStyle/>
+          <a:p>
+            <a:r>
+              <a:rPr lang="pt-BR" sz="4800" b="1" dirty="0">
+                <a:solidFill>
+                  <a:schemeClr val="bg1"/>
+                </a:solidFill>
+              </a:rPr>
+              <a:t>Programação Python</a:t>
+            </a:r>
+          </a:p>
+        </p:txBody>
+      </p:sp>
+      <p:sp>
+        <p:nvSpPr>
+          <p:cNvPr id="6" name="Título 2"/>
+          <p:cNvSpPr txBox="1"/>
+          <p:nvPr/>
+        </p:nvSpPr>
+        <p:spPr>
+          <a:xfrm>
+            <a:off x="975683" y="3866663"/>
+            <a:ext cx="7772400" cy="1102519"/>
+          </a:xfrm>
+          <a:prstGeom prst="rect">
+            <a:avLst/>
+          </a:prstGeom>
+          <a:ln w="12700">
+            <a:miter lim="400000"/>
+          </a:ln>
+        </p:spPr>
+        <p:txBody>
+          <a:bodyPr lIns="45718" tIns="45718" rIns="45718" bIns="45718" anchor="ctr">
+            <a:noAutofit/>
+          </a:bodyPr>
+          <a:lstStyle>
+            <a:lvl1pPr marL="0" marR="0" indent="0" algn="ctr" defTabSz="457200" rtl="0" latinLnBrk="0">
+              <a:lnSpc>
+                <a:spcPct val="100000"/>
+              </a:lnSpc>
+              <a:spcBef>
+                <a:spcPts val="0"/>
+              </a:spcBef>
+              <a:spcAft>
+                <a:spcPts val="0"/>
+              </a:spcAft>
+              <a:buClrTx/>
+              <a:buSzTx/>
+              <a:buFontTx/>
+              <a:buNone/>
+              <a:defRPr sz="4400" b="0" i="0" u="none" strike="noStrike" cap="none" spc="0" baseline="0">
+                <a:ln>
+                  <a:noFill/>
+                </a:ln>
+                <a:solidFill>
+                  <a:srgbClr val="000000"/>
+                </a:solidFill>
+                <a:uFillTx/>
+                <a:latin typeface="+mj-lt"/>
+                <a:ea typeface="+mj-ea"/>
+                <a:cs typeface="+mj-cs"/>
+                <a:sym typeface="Calibri"/>
+              </a:defRPr>
+            </a:lvl1pPr>
+            <a:lvl2pPr marL="0" marR="0" indent="0" algn="ctr" defTabSz="457200" rtl="0" latinLnBrk="0">
+              <a:lnSpc>
+                <a:spcPct val="100000"/>
+              </a:lnSpc>
+              <a:spcBef>
+                <a:spcPts val="0"/>
+              </a:spcBef>
+              <a:spcAft>
+                <a:spcPts val="0"/>
+              </a:spcAft>
+              <a:buClrTx/>
+              <a:buSzTx/>
+              <a:buFontTx/>
+              <a:buNone/>
+              <a:defRPr sz="4400" b="0" i="0" u="none" strike="noStrike" cap="none" spc="0" baseline="0">
+                <a:ln>
+                  <a:noFill/>
+                </a:ln>
+                <a:solidFill>
+                  <a:srgbClr val="000000"/>
+                </a:solidFill>
+                <a:uFillTx/>
+                <a:latin typeface="+mj-lt"/>
+                <a:ea typeface="+mj-ea"/>
+                <a:cs typeface="+mj-cs"/>
+                <a:sym typeface="Calibri"/>
+              </a:defRPr>
+            </a:lvl2pPr>
+            <a:lvl3pPr marL="0" marR="0" indent="0" algn="ctr" defTabSz="457200" rtl="0" latinLnBrk="0">
+              <a:lnSpc>
+                <a:spcPct val="100000"/>
+              </a:lnSpc>
+              <a:spcBef>
+                <a:spcPts val="0"/>
+              </a:spcBef>
+              <a:spcAft>
+                <a:spcPts val="0"/>
+              </a:spcAft>
+              <a:buClrTx/>
+              <a:buSzTx/>
+              <a:buFontTx/>
+              <a:buNone/>
+              <a:defRPr sz="4400" b="0" i="0" u="none" strike="noStrike" cap="none" spc="0" baseline="0">
+                <a:ln>
+                  <a:noFill/>
+                </a:ln>
+                <a:solidFill>
+                  <a:srgbClr val="000000"/>
+                </a:solidFill>
+                <a:uFillTx/>
+                <a:latin typeface="+mj-lt"/>
+                <a:ea typeface="+mj-ea"/>
+                <a:cs typeface="+mj-cs"/>
+                <a:sym typeface="Calibri"/>
+              </a:defRPr>
+            </a:lvl3pPr>
+            <a:lvl4pPr marL="0" marR="0" indent="0" algn="ctr" defTabSz="457200" rtl="0" latinLnBrk="0">
+              <a:lnSpc>
+                <a:spcPct val="100000"/>
+              </a:lnSpc>
+              <a:spcBef>
+                <a:spcPts val="0"/>
+              </a:spcBef>
+              <a:spcAft>
+                <a:spcPts val="0"/>
+              </a:spcAft>
+              <a:buClrTx/>
+              <a:buSzTx/>
+              <a:buFontTx/>
+              <a:buNone/>
+              <a:defRPr sz="4400" b="0" i="0" u="none" strike="noStrike" cap="none" spc="0" baseline="0">
+                <a:ln>
+                  <a:noFill/>
+                </a:ln>
+                <a:solidFill>
+                  <a:srgbClr val="000000"/>
+                </a:solidFill>
+                <a:uFillTx/>
+                <a:latin typeface="+mj-lt"/>
+                <a:ea typeface="+mj-ea"/>
+                <a:cs typeface="+mj-cs"/>
+                <a:sym typeface="Calibri"/>
+              </a:defRPr>
+            </a:lvl4pPr>
+            <a:lvl5pPr marL="0" marR="0" indent="0" algn="ctr" defTabSz="457200" rtl="0" latinLnBrk="0">
+              <a:lnSpc>
+                <a:spcPct val="100000"/>
+              </a:lnSpc>
+              <a:spcBef>
+                <a:spcPts val="0"/>
+              </a:spcBef>
+              <a:spcAft>
+                <a:spcPts val="0"/>
+              </a:spcAft>
+              <a:buClrTx/>
+              <a:buSzTx/>
+              <a:buFontTx/>
+              <a:buNone/>
+              <a:defRPr sz="4400" b="0" i="0" u="none" strike="noStrike" cap="none" spc="0" baseline="0">
+                <a:ln>
+                  <a:noFill/>
+                </a:ln>
+                <a:solidFill>
+                  <a:srgbClr val="000000"/>
+                </a:solidFill>
+                <a:uFillTx/>
+                <a:latin typeface="+mj-lt"/>
+                <a:ea typeface="+mj-ea"/>
+                <a:cs typeface="+mj-cs"/>
+                <a:sym typeface="Calibri"/>
+              </a:defRPr>
+            </a:lvl5pPr>
+            <a:lvl6pPr marL="0" marR="0" indent="0" algn="ctr" defTabSz="457200" rtl="0" latinLnBrk="0">
+              <a:lnSpc>
+                <a:spcPct val="100000"/>
+              </a:lnSpc>
+              <a:spcBef>
+                <a:spcPts val="0"/>
+              </a:spcBef>
+              <a:spcAft>
+                <a:spcPts val="0"/>
+              </a:spcAft>
+              <a:buClrTx/>
+              <a:buSzTx/>
+              <a:buFontTx/>
+              <a:buNone/>
+              <a:defRPr sz="4400" b="0" i="0" u="none" strike="noStrike" cap="none" spc="0" baseline="0">
+                <a:ln>
+                  <a:noFill/>
+                </a:ln>
+                <a:solidFill>
+                  <a:srgbClr val="000000"/>
+                </a:solidFill>
+                <a:uFillTx/>
+                <a:latin typeface="+mj-lt"/>
+                <a:ea typeface="+mj-ea"/>
+                <a:cs typeface="+mj-cs"/>
+                <a:sym typeface="Calibri"/>
+              </a:defRPr>
+            </a:lvl6pPr>
+            <a:lvl7pPr marL="0" marR="0" indent="0" algn="ctr" defTabSz="457200" rtl="0" latinLnBrk="0">
+              <a:lnSpc>
+                <a:spcPct val="100000"/>
+              </a:lnSpc>
+              <a:spcBef>
+                <a:spcPts val="0"/>
+              </a:spcBef>
+              <a:spcAft>
+                <a:spcPts val="0"/>
+              </a:spcAft>
+              <a:buClrTx/>
+              <a:buSzTx/>
+              <a:buFontTx/>
+              <a:buNone/>
+              <a:defRPr sz="4400" b="0" i="0" u="none" strike="noStrike" cap="none" spc="0" baseline="0">
+                <a:ln>
+                  <a:noFill/>
+                </a:ln>
+                <a:solidFill>
+                  <a:srgbClr val="000000"/>
+                </a:solidFill>
+                <a:uFillTx/>
+                <a:latin typeface="+mj-lt"/>
+                <a:ea typeface="+mj-ea"/>
+                <a:cs typeface="+mj-cs"/>
+                <a:sym typeface="Calibri"/>
+              </a:defRPr>
+            </a:lvl7pPr>
+            <a:lvl8pPr marL="0" marR="0" indent="0" algn="ctr" defTabSz="457200" rtl="0" latinLnBrk="0">
+              <a:lnSpc>
+                <a:spcPct val="100000"/>
+              </a:lnSpc>
+              <a:spcBef>
+                <a:spcPts val="0"/>
+              </a:spcBef>
+              <a:spcAft>
+                <a:spcPts val="0"/>
+              </a:spcAft>
+              <a:buClrTx/>
+              <a:buSzTx/>
+              <a:buFontTx/>
+              <a:buNone/>
+              <a:defRPr sz="4400" b="0" i="0" u="none" strike="noStrike" cap="none" spc="0" baseline="0">
+                <a:ln>
+                  <a:noFill/>
+                </a:ln>
+                <a:solidFill>
+                  <a:srgbClr val="000000"/>
+                </a:solidFill>
+                <a:uFillTx/>
+                <a:latin typeface="+mj-lt"/>
+                <a:ea typeface="+mj-ea"/>
+                <a:cs typeface="+mj-cs"/>
+                <a:sym typeface="Calibri"/>
+              </a:defRPr>
+            </a:lvl8pPr>
+            <a:lvl9pPr marL="0" marR="0" indent="0" algn="ctr" defTabSz="457200" rtl="0" latinLnBrk="0">
+              <a:lnSpc>
+                <a:spcPct val="100000"/>
+              </a:lnSpc>
+              <a:spcBef>
+                <a:spcPts val="0"/>
+              </a:spcBef>
+              <a:spcAft>
+                <a:spcPts val="0"/>
+              </a:spcAft>
+              <a:buClrTx/>
+              <a:buSzTx/>
+              <a:buFontTx/>
+              <a:buNone/>
+              <a:defRPr sz="4400" b="0" i="0" u="none" strike="noStrike" cap="none" spc="0" baseline="0">
+                <a:ln>
+                  <a:noFill/>
+                </a:ln>
+                <a:solidFill>
+                  <a:srgbClr val="000000"/>
+                </a:solidFill>
+                <a:uFillTx/>
+                <a:latin typeface="+mj-lt"/>
+                <a:ea typeface="+mj-ea"/>
+                <a:cs typeface="+mj-cs"/>
+                <a:sym typeface="Calibri"/>
+              </a:defRPr>
+            </a:lvl9pPr>
+          </a:lstStyle>
+          <a:p>
+            <a:pPr algn="r" hangingPunct="1"/>
+            <a:r>
+              <a:rPr lang="pt-BR" sz="2000" b="1" dirty="0">
+                <a:solidFill>
+                  <a:schemeClr val="bg1"/>
+                </a:solidFill>
+              </a:rPr>
+              <a:t>Professor </a:t>
+            </a:r>
+            <a:r>
+              <a:rPr lang="pt-BR" sz="2000" b="1">
+                <a:solidFill>
+                  <a:schemeClr val="bg1"/>
+                </a:solidFill>
+              </a:rPr>
+              <a:t>M.Sc</a:t>
             </a:r>
             <a:r>
               <a:rPr lang="pt-BR" sz="2000" b="1" dirty="0">

</xml_diff>